<commit_message>
Charte finie et diapo avancé
</commit_message>
<xml_diff>
--- a/Présentation projet.pptx
+++ b/Présentation projet.pptx
@@ -19,7 +19,8 @@
     <p:sldId id="269" r:id="rId13"/>
     <p:sldId id="266" r:id="rId14"/>
     <p:sldId id="262" r:id="rId15"/>
-    <p:sldId id="265" r:id="rId16"/>
+    <p:sldId id="274" r:id="rId16"/>
+    <p:sldId id="265" r:id="rId17"/>
   </p:sldIdLst>
   <p:sldSz cx="12192000" cy="6858000"/>
   <p:notesSz cx="6858000" cy="9144000"/>
@@ -180,7 +181,7 @@
           <a:noFill/>
           <a:extLst>
             <a:ext uri="{909E8E84-426E-40dd-AFC4-6F175D3DCCD1}">
-              <a14:hiddenFill xmlns:a14="http://schemas.microsoft.com/office/drawing/2010/main" xmlns="">
+              <a14:hiddenFill xmlns="" xmlns:a14="http://schemas.microsoft.com/office/drawing/2010/main">
                 <a:solidFill>
                   <a:srgbClr val="FFFFFF"/>
                 </a:solidFill>
@@ -240,7 +241,7 @@
             </a:ln>
             <a:extLst>
               <a:ext uri="{91240B29-F687-4f45-9708-019B960494DF}">
-                <a14:hiddenLine xmlns:a14="http://schemas.microsoft.com/office/drawing/2010/main" xmlns="" w="9525">
+                <a14:hiddenLine xmlns="" xmlns:a14="http://schemas.microsoft.com/office/drawing/2010/main" w="9525">
                   <a:solidFill>
                     <a:srgbClr val="000000"/>
                   </a:solidFill>
@@ -330,7 +331,7 @@
             </a:ln>
             <a:extLst>
               <a:ext uri="{91240B29-F687-4f45-9708-019B960494DF}">
-                <a14:hiddenLine xmlns:a14="http://schemas.microsoft.com/office/drawing/2010/main" xmlns="" w="9525">
+                <a14:hiddenLine xmlns="" xmlns:a14="http://schemas.microsoft.com/office/drawing/2010/main" w="9525">
                   <a:solidFill>
                     <a:srgbClr val="000000"/>
                   </a:solidFill>
@@ -420,7 +421,7 @@
             </a:ln>
             <a:extLst>
               <a:ext uri="{91240B29-F687-4f45-9708-019B960494DF}">
-                <a14:hiddenLine xmlns:a14="http://schemas.microsoft.com/office/drawing/2010/main" xmlns="" w="9525">
+                <a14:hiddenLine xmlns="" xmlns:a14="http://schemas.microsoft.com/office/drawing/2010/main" w="9525">
                   <a:solidFill>
                     <a:srgbClr val="000000"/>
                   </a:solidFill>
@@ -454,7 +455,7 @@
             </a:ln>
             <a:extLst>
               <a:ext uri="{91240B29-F687-4f45-9708-019B960494DF}">
-                <a14:hiddenLine xmlns:a14="http://schemas.microsoft.com/office/drawing/2010/main" xmlns="" w="9525">
+                <a14:hiddenLine xmlns="" xmlns:a14="http://schemas.microsoft.com/office/drawing/2010/main" w="9525">
                   <a:solidFill>
                     <a:srgbClr val="000000"/>
                   </a:solidFill>
@@ -544,7 +545,7 @@
             </a:ln>
             <a:extLst>
               <a:ext uri="{91240B29-F687-4f45-9708-019B960494DF}">
-                <a14:hiddenLine xmlns:a14="http://schemas.microsoft.com/office/drawing/2010/main" xmlns="" w="9525">
+                <a14:hiddenLine xmlns="" xmlns:a14="http://schemas.microsoft.com/office/drawing/2010/main" w="9525">
                   <a:solidFill>
                     <a:srgbClr val="000000"/>
                   </a:solidFill>
@@ -606,7 +607,7 @@
             </a:ln>
             <a:extLst>
               <a:ext uri="{91240B29-F687-4f45-9708-019B960494DF}">
-                <a14:hiddenLine xmlns:a14="http://schemas.microsoft.com/office/drawing/2010/main" xmlns="" w="9525">
+                <a14:hiddenLine xmlns="" xmlns:a14="http://schemas.microsoft.com/office/drawing/2010/main" w="9525">
                   <a:solidFill>
                     <a:srgbClr val="000000"/>
                   </a:solidFill>
@@ -668,7 +669,7 @@
             </a:ln>
             <a:extLst>
               <a:ext uri="{91240B29-F687-4f45-9708-019B960494DF}">
-                <a14:hiddenLine xmlns:a14="http://schemas.microsoft.com/office/drawing/2010/main" xmlns="" w="9525">
+                <a14:hiddenLine xmlns="" xmlns:a14="http://schemas.microsoft.com/office/drawing/2010/main" w="9525">
                   <a:solidFill>
                     <a:srgbClr val="000000"/>
                   </a:solidFill>
@@ -758,7 +759,7 @@
             </a:ln>
             <a:extLst>
               <a:ext uri="{91240B29-F687-4f45-9708-019B960494DF}">
-                <a14:hiddenLine xmlns:a14="http://schemas.microsoft.com/office/drawing/2010/main" xmlns="" w="9525">
+                <a14:hiddenLine xmlns="" xmlns:a14="http://schemas.microsoft.com/office/drawing/2010/main" w="9525">
                   <a:solidFill>
                     <a:srgbClr val="000000"/>
                   </a:solidFill>
@@ -820,7 +821,7 @@
             </a:ln>
             <a:extLst>
               <a:ext uri="{91240B29-F687-4f45-9708-019B960494DF}">
-                <a14:hiddenLine xmlns:a14="http://schemas.microsoft.com/office/drawing/2010/main" xmlns="" w="9525">
+                <a14:hiddenLine xmlns="" xmlns:a14="http://schemas.microsoft.com/office/drawing/2010/main" w="9525">
                   <a:solidFill>
                     <a:srgbClr val="000000"/>
                   </a:solidFill>
@@ -882,7 +883,7 @@
             </a:ln>
             <a:extLst>
               <a:ext uri="{91240B29-F687-4f45-9708-019B960494DF}">
-                <a14:hiddenLine xmlns:a14="http://schemas.microsoft.com/office/drawing/2010/main" xmlns="" w="9525">
+                <a14:hiddenLine xmlns="" xmlns:a14="http://schemas.microsoft.com/office/drawing/2010/main" w="9525">
                   <a:solidFill>
                     <a:srgbClr val="000000"/>
                   </a:solidFill>
@@ -972,7 +973,7 @@
             </a:ln>
             <a:extLst>
               <a:ext uri="{91240B29-F687-4f45-9708-019B960494DF}">
-                <a14:hiddenLine xmlns:a14="http://schemas.microsoft.com/office/drawing/2010/main" xmlns="" w="9525">
+                <a14:hiddenLine xmlns="" xmlns:a14="http://schemas.microsoft.com/office/drawing/2010/main" w="9525">
                   <a:solidFill>
                     <a:srgbClr val="000000"/>
                   </a:solidFill>
@@ -1062,7 +1063,7 @@
             </a:ln>
             <a:extLst>
               <a:ext uri="{91240B29-F687-4f45-9708-019B960494DF}">
-                <a14:hiddenLine xmlns:a14="http://schemas.microsoft.com/office/drawing/2010/main" xmlns="" w="9525">
+                <a14:hiddenLine xmlns="" xmlns:a14="http://schemas.microsoft.com/office/drawing/2010/main" w="9525">
                   <a:solidFill>
                     <a:srgbClr val="000000"/>
                   </a:solidFill>
@@ -1124,7 +1125,7 @@
             </a:ln>
             <a:extLst>
               <a:ext uri="{91240B29-F687-4f45-9708-019B960494DF}">
-                <a14:hiddenLine xmlns:a14="http://schemas.microsoft.com/office/drawing/2010/main" xmlns="" w="9525">
+                <a14:hiddenLine xmlns="" xmlns:a14="http://schemas.microsoft.com/office/drawing/2010/main" w="9525">
                   <a:solidFill>
                     <a:srgbClr val="000000"/>
                   </a:solidFill>
@@ -1234,7 +1235,7 @@
             </a:ln>
             <a:extLst>
               <a:ext uri="{91240B29-F687-4f45-9708-019B960494DF}">
-                <a14:hiddenLine xmlns:a14="http://schemas.microsoft.com/office/drawing/2010/main" xmlns="" w="9525">
+                <a14:hiddenLine xmlns="" xmlns:a14="http://schemas.microsoft.com/office/drawing/2010/main" w="9525">
                   <a:solidFill>
                     <a:srgbClr val="000000"/>
                   </a:solidFill>
@@ -1296,7 +1297,7 @@
             </a:ln>
             <a:extLst>
               <a:ext uri="{91240B29-F687-4f45-9708-019B960494DF}">
-                <a14:hiddenLine xmlns:a14="http://schemas.microsoft.com/office/drawing/2010/main" xmlns="" w="9525">
+                <a14:hiddenLine xmlns="" xmlns:a14="http://schemas.microsoft.com/office/drawing/2010/main" w="9525">
                   <a:solidFill>
                     <a:srgbClr val="000000"/>
                   </a:solidFill>
@@ -1386,7 +1387,7 @@
             </a:ln>
             <a:extLst>
               <a:ext uri="{91240B29-F687-4f45-9708-019B960494DF}">
-                <a14:hiddenLine xmlns:a14="http://schemas.microsoft.com/office/drawing/2010/main" xmlns="" w="9525">
+                <a14:hiddenLine xmlns="" xmlns:a14="http://schemas.microsoft.com/office/drawing/2010/main" w="9525">
                   <a:solidFill>
                     <a:srgbClr val="000000"/>
                   </a:solidFill>
@@ -1476,7 +1477,7 @@
             </a:ln>
             <a:extLst>
               <a:ext uri="{91240B29-F687-4f45-9708-019B960494DF}">
-                <a14:hiddenLine xmlns:a14="http://schemas.microsoft.com/office/drawing/2010/main" xmlns="" w="9525">
+                <a14:hiddenLine xmlns="" xmlns:a14="http://schemas.microsoft.com/office/drawing/2010/main" w="9525">
                   <a:solidFill>
                     <a:srgbClr val="000000"/>
                   </a:solidFill>
@@ -1538,7 +1539,7 @@
             </a:ln>
             <a:extLst>
               <a:ext uri="{91240B29-F687-4f45-9708-019B960494DF}">
-                <a14:hiddenLine xmlns:a14="http://schemas.microsoft.com/office/drawing/2010/main" xmlns="" w="9525">
+                <a14:hiddenLine xmlns="" xmlns:a14="http://schemas.microsoft.com/office/drawing/2010/main" w="9525">
                   <a:solidFill>
                     <a:srgbClr val="000000"/>
                   </a:solidFill>
@@ -1628,7 +1629,7 @@
             </a:ln>
             <a:extLst>
               <a:ext uri="{91240B29-F687-4f45-9708-019B960494DF}">
-                <a14:hiddenLine xmlns:a14="http://schemas.microsoft.com/office/drawing/2010/main" xmlns="" w="9525">
+                <a14:hiddenLine xmlns="" xmlns:a14="http://schemas.microsoft.com/office/drawing/2010/main" w="9525">
                   <a:solidFill>
                     <a:srgbClr val="000000"/>
                   </a:solidFill>
@@ -1718,7 +1719,7 @@
             </a:ln>
             <a:extLst>
               <a:ext uri="{91240B29-F687-4f45-9708-019B960494DF}">
-                <a14:hiddenLine xmlns:a14="http://schemas.microsoft.com/office/drawing/2010/main" xmlns="" w="9525">
+                <a14:hiddenLine xmlns="" xmlns:a14="http://schemas.microsoft.com/office/drawing/2010/main" w="9525">
                   <a:solidFill>
                     <a:srgbClr val="000000"/>
                   </a:solidFill>
@@ -1774,7 +1775,7 @@
             </a:ln>
             <a:extLst>
               <a:ext uri="{91240B29-F687-4f45-9708-019B960494DF}">
-                <a14:hiddenLine xmlns:a14="http://schemas.microsoft.com/office/drawing/2010/main" xmlns="" w="9525">
+                <a14:hiddenLine xmlns="" xmlns:a14="http://schemas.microsoft.com/office/drawing/2010/main" w="9525">
                   <a:solidFill>
                     <a:srgbClr val="000000"/>
                   </a:solidFill>
@@ -1864,7 +1865,7 @@
             </a:ln>
             <a:extLst>
               <a:ext uri="{91240B29-F687-4f45-9708-019B960494DF}">
-                <a14:hiddenLine xmlns:a14="http://schemas.microsoft.com/office/drawing/2010/main" xmlns="" w="9525">
+                <a14:hiddenLine xmlns="" xmlns:a14="http://schemas.microsoft.com/office/drawing/2010/main" w="9525">
                   <a:solidFill>
                     <a:srgbClr val="000000"/>
                   </a:solidFill>
@@ -1920,7 +1921,7 @@
             </a:ln>
             <a:extLst>
               <a:ext uri="{91240B29-F687-4f45-9708-019B960494DF}">
-                <a14:hiddenLine xmlns:a14="http://schemas.microsoft.com/office/drawing/2010/main" xmlns="" w="9525">
+                <a14:hiddenLine xmlns="" xmlns:a14="http://schemas.microsoft.com/office/drawing/2010/main" w="9525">
                   <a:solidFill>
                     <a:srgbClr val="000000"/>
                   </a:solidFill>
@@ -2010,7 +2011,7 @@
             </a:ln>
             <a:extLst>
               <a:ext uri="{91240B29-F687-4f45-9708-019B960494DF}">
-                <a14:hiddenLine xmlns:a14="http://schemas.microsoft.com/office/drawing/2010/main" xmlns="" w="9525">
+                <a14:hiddenLine xmlns="" xmlns:a14="http://schemas.microsoft.com/office/drawing/2010/main" w="9525">
                   <a:solidFill>
                     <a:srgbClr val="000000"/>
                   </a:solidFill>
@@ -2078,7 +2079,7 @@
             </a:ln>
             <a:extLst>
               <a:ext uri="{91240B29-F687-4f45-9708-019B960494DF}">
-                <a14:hiddenLine xmlns:a14="http://schemas.microsoft.com/office/drawing/2010/main" xmlns="" w="9525">
+                <a14:hiddenLine xmlns="" xmlns:a14="http://schemas.microsoft.com/office/drawing/2010/main" w="9525">
                   <a:solidFill>
                     <a:srgbClr val="000000"/>
                   </a:solidFill>
@@ -2168,7 +2169,7 @@
             </a:ln>
             <a:extLst>
               <a:ext uri="{91240B29-F687-4f45-9708-019B960494DF}">
-                <a14:hiddenLine xmlns:a14="http://schemas.microsoft.com/office/drawing/2010/main" xmlns="" w="9525">
+                <a14:hiddenLine xmlns="" xmlns:a14="http://schemas.microsoft.com/office/drawing/2010/main" w="9525">
                   <a:solidFill>
                     <a:srgbClr val="000000"/>
                   </a:solidFill>
@@ -2236,7 +2237,7 @@
             </a:ln>
             <a:extLst>
               <a:ext uri="{91240B29-F687-4f45-9708-019B960494DF}">
-                <a14:hiddenLine xmlns:a14="http://schemas.microsoft.com/office/drawing/2010/main" xmlns="" w="9525">
+                <a14:hiddenLine xmlns="" xmlns:a14="http://schemas.microsoft.com/office/drawing/2010/main" w="9525">
                   <a:solidFill>
                     <a:srgbClr val="000000"/>
                   </a:solidFill>
@@ -2326,7 +2327,7 @@
             </a:ln>
             <a:extLst>
               <a:ext uri="{91240B29-F687-4f45-9708-019B960494DF}">
-                <a14:hiddenLine xmlns:a14="http://schemas.microsoft.com/office/drawing/2010/main" xmlns="" w="9525">
+                <a14:hiddenLine xmlns="" xmlns:a14="http://schemas.microsoft.com/office/drawing/2010/main" w="9525">
                   <a:solidFill>
                     <a:srgbClr val="000000"/>
                   </a:solidFill>
@@ -2360,7 +2361,7 @@
             </a:ln>
             <a:extLst>
               <a:ext uri="{91240B29-F687-4f45-9708-019B960494DF}">
-                <a14:hiddenLine xmlns:a14="http://schemas.microsoft.com/office/drawing/2010/main" xmlns="" w="9525">
+                <a14:hiddenLine xmlns="" xmlns:a14="http://schemas.microsoft.com/office/drawing/2010/main" w="9525">
                   <a:solidFill>
                     <a:srgbClr val="000000"/>
                   </a:solidFill>
@@ -2450,7 +2451,7 @@
             </a:ln>
             <a:extLst>
               <a:ext uri="{91240B29-F687-4f45-9708-019B960494DF}">
-                <a14:hiddenLine xmlns:a14="http://schemas.microsoft.com/office/drawing/2010/main" xmlns="" w="9525">
+                <a14:hiddenLine xmlns="" xmlns:a14="http://schemas.microsoft.com/office/drawing/2010/main" w="9525">
                   <a:solidFill>
                     <a:srgbClr val="000000"/>
                   </a:solidFill>
@@ -2512,7 +2513,7 @@
             </a:ln>
             <a:extLst>
               <a:ext uri="{91240B29-F687-4f45-9708-019B960494DF}">
-                <a14:hiddenLine xmlns:a14="http://schemas.microsoft.com/office/drawing/2010/main" xmlns="" w="9525">
+                <a14:hiddenLine xmlns="" xmlns:a14="http://schemas.microsoft.com/office/drawing/2010/main" w="9525">
                   <a:solidFill>
                     <a:srgbClr val="000000"/>
                   </a:solidFill>
@@ -2574,7 +2575,7 @@
             </a:ln>
             <a:extLst>
               <a:ext uri="{91240B29-F687-4f45-9708-019B960494DF}">
-                <a14:hiddenLine xmlns:a14="http://schemas.microsoft.com/office/drawing/2010/main" xmlns="" w="9525">
+                <a14:hiddenLine xmlns="" xmlns:a14="http://schemas.microsoft.com/office/drawing/2010/main" w="9525">
                   <a:solidFill>
                     <a:srgbClr val="000000"/>
                   </a:solidFill>
@@ -2664,7 +2665,7 @@
             </a:ln>
             <a:extLst>
               <a:ext uri="{91240B29-F687-4f45-9708-019B960494DF}">
-                <a14:hiddenLine xmlns:a14="http://schemas.microsoft.com/office/drawing/2010/main" xmlns="" w="9525">
+                <a14:hiddenLine xmlns="" xmlns:a14="http://schemas.microsoft.com/office/drawing/2010/main" w="9525">
                   <a:solidFill>
                     <a:srgbClr val="000000"/>
                   </a:solidFill>
@@ -2732,7 +2733,7 @@
             </a:ln>
             <a:extLst>
               <a:ext uri="{91240B29-F687-4f45-9708-019B960494DF}">
-                <a14:hiddenLine xmlns:a14="http://schemas.microsoft.com/office/drawing/2010/main" xmlns="" w="9525">
+                <a14:hiddenLine xmlns="" xmlns:a14="http://schemas.microsoft.com/office/drawing/2010/main" w="9525">
                   <a:solidFill>
                     <a:srgbClr val="000000"/>
                   </a:solidFill>
@@ -2794,7 +2795,7 @@
             </a:ln>
             <a:extLst>
               <a:ext uri="{91240B29-F687-4f45-9708-019B960494DF}">
-                <a14:hiddenLine xmlns:a14="http://schemas.microsoft.com/office/drawing/2010/main" xmlns="" w="9525">
+                <a14:hiddenLine xmlns="" xmlns:a14="http://schemas.microsoft.com/office/drawing/2010/main" w="9525">
                   <a:solidFill>
                     <a:srgbClr val="000000"/>
                   </a:solidFill>
@@ -2884,7 +2885,7 @@
             </a:ln>
             <a:extLst>
               <a:ext uri="{91240B29-F687-4f45-9708-019B960494DF}">
-                <a14:hiddenLine xmlns:a14="http://schemas.microsoft.com/office/drawing/2010/main" xmlns="" w="9525">
+                <a14:hiddenLine xmlns="" xmlns:a14="http://schemas.microsoft.com/office/drawing/2010/main" w="9525">
                   <a:solidFill>
                     <a:srgbClr val="000000"/>
                   </a:solidFill>
@@ -2946,7 +2947,7 @@
             </a:ln>
             <a:extLst>
               <a:ext uri="{91240B29-F687-4f45-9708-019B960494DF}">
-                <a14:hiddenLine xmlns:a14="http://schemas.microsoft.com/office/drawing/2010/main" xmlns="" w="9525">
+                <a14:hiddenLine xmlns="" xmlns:a14="http://schemas.microsoft.com/office/drawing/2010/main" w="9525">
                   <a:solidFill>
                     <a:srgbClr val="000000"/>
                   </a:solidFill>
@@ -3036,7 +3037,7 @@
             </a:ln>
             <a:extLst>
               <a:ext uri="{91240B29-F687-4f45-9708-019B960494DF}">
-                <a14:hiddenLine xmlns:a14="http://schemas.microsoft.com/office/drawing/2010/main" xmlns="" w="9525">
+                <a14:hiddenLine xmlns="" xmlns:a14="http://schemas.microsoft.com/office/drawing/2010/main" w="9525">
                   <a:solidFill>
                     <a:srgbClr val="000000"/>
                   </a:solidFill>
@@ -3098,7 +3099,7 @@
             </a:ln>
             <a:extLst>
               <a:ext uri="{91240B29-F687-4f45-9708-019B960494DF}">
-                <a14:hiddenLine xmlns:a14="http://schemas.microsoft.com/office/drawing/2010/main" xmlns="" w="9525">
+                <a14:hiddenLine xmlns="" xmlns:a14="http://schemas.microsoft.com/office/drawing/2010/main" w="9525">
                   <a:solidFill>
                     <a:srgbClr val="000000"/>
                   </a:solidFill>
@@ -3188,7 +3189,7 @@
             </a:ln>
             <a:extLst>
               <a:ext uri="{91240B29-F687-4f45-9708-019B960494DF}">
-                <a14:hiddenLine xmlns:a14="http://schemas.microsoft.com/office/drawing/2010/main" xmlns="" w="9525">
+                <a14:hiddenLine xmlns="" xmlns:a14="http://schemas.microsoft.com/office/drawing/2010/main" w="9525">
                   <a:solidFill>
                     <a:srgbClr val="000000"/>
                   </a:solidFill>
@@ -3222,7 +3223,7 @@
             </a:ln>
             <a:extLst>
               <a:ext uri="{91240B29-F687-4f45-9708-019B960494DF}">
-                <a14:hiddenLine xmlns:a14="http://schemas.microsoft.com/office/drawing/2010/main" xmlns="" w="9525">
+                <a14:hiddenLine xmlns="" xmlns:a14="http://schemas.microsoft.com/office/drawing/2010/main" w="9525">
                   <a:solidFill>
                     <a:srgbClr val="000000"/>
                   </a:solidFill>
@@ -3287,7 +3288,7 @@
             </a:ln>
             <a:extLst>
               <a:ext uri="{91240B29-F687-4f45-9708-019B960494DF}">
-                <a14:hiddenLine xmlns:a14="http://schemas.microsoft.com/office/drawing/2010/main" xmlns="" w="9525">
+                <a14:hiddenLine xmlns="" xmlns:a14="http://schemas.microsoft.com/office/drawing/2010/main" w="9525">
                   <a:solidFill>
                     <a:srgbClr val="000000"/>
                   </a:solidFill>
@@ -3377,7 +3378,7 @@
             </a:ln>
             <a:extLst>
               <a:ext uri="{91240B29-F687-4f45-9708-019B960494DF}">
-                <a14:hiddenLine xmlns:a14="http://schemas.microsoft.com/office/drawing/2010/main" xmlns="" w="9525">
+                <a14:hiddenLine xmlns="" xmlns:a14="http://schemas.microsoft.com/office/drawing/2010/main" w="9525">
                   <a:solidFill>
                     <a:srgbClr val="000000"/>
                   </a:solidFill>
@@ -3439,7 +3440,7 @@
             </a:ln>
             <a:extLst>
               <a:ext uri="{91240B29-F687-4f45-9708-019B960494DF}">
-                <a14:hiddenLine xmlns:a14="http://schemas.microsoft.com/office/drawing/2010/main" xmlns="" w="9525">
+                <a14:hiddenLine xmlns="" xmlns:a14="http://schemas.microsoft.com/office/drawing/2010/main" w="9525">
                   <a:solidFill>
                     <a:srgbClr val="000000"/>
                   </a:solidFill>
@@ -3529,7 +3530,7 @@
             </a:ln>
             <a:extLst>
               <a:ext uri="{91240B29-F687-4f45-9708-019B960494DF}">
-                <a14:hiddenLine xmlns:a14="http://schemas.microsoft.com/office/drawing/2010/main" xmlns="" w="9525">
+                <a14:hiddenLine xmlns="" xmlns:a14="http://schemas.microsoft.com/office/drawing/2010/main" w="9525">
                   <a:solidFill>
                     <a:srgbClr val="000000"/>
                   </a:solidFill>
@@ -3619,7 +3620,7 @@
             </a:ln>
             <a:extLst>
               <a:ext uri="{91240B29-F687-4f45-9708-019B960494DF}">
-                <a14:hiddenLine xmlns:a14="http://schemas.microsoft.com/office/drawing/2010/main" xmlns="" w="9525">
+                <a14:hiddenLine xmlns="" xmlns:a14="http://schemas.microsoft.com/office/drawing/2010/main" w="9525">
                   <a:solidFill>
                     <a:srgbClr val="000000"/>
                   </a:solidFill>
@@ -3684,7 +3685,7 @@
             </a:ln>
             <a:extLst>
               <a:ext uri="{91240B29-F687-4f45-9708-019B960494DF}">
-                <a14:hiddenLine xmlns:a14="http://schemas.microsoft.com/office/drawing/2010/main" xmlns="" w="9525">
+                <a14:hiddenLine xmlns="" xmlns:a14="http://schemas.microsoft.com/office/drawing/2010/main" w="9525">
                   <a:solidFill>
                     <a:srgbClr val="000000"/>
                   </a:solidFill>
@@ -3746,7 +3747,7 @@
             </a:ln>
             <a:extLst>
               <a:ext uri="{91240B29-F687-4f45-9708-019B960494DF}">
-                <a14:hiddenLine xmlns:a14="http://schemas.microsoft.com/office/drawing/2010/main" xmlns="" w="9525">
+                <a14:hiddenLine xmlns="" xmlns:a14="http://schemas.microsoft.com/office/drawing/2010/main" w="9525">
                   <a:solidFill>
                     <a:srgbClr val="000000"/>
                   </a:solidFill>
@@ -3836,7 +3837,7 @@
             </a:ln>
             <a:extLst>
               <a:ext uri="{91240B29-F687-4f45-9708-019B960494DF}">
-                <a14:hiddenLine xmlns:a14="http://schemas.microsoft.com/office/drawing/2010/main" xmlns="" w="9525">
+                <a14:hiddenLine xmlns="" xmlns:a14="http://schemas.microsoft.com/office/drawing/2010/main" w="9525">
                   <a:solidFill>
                     <a:srgbClr val="000000"/>
                   </a:solidFill>
@@ -3926,7 +3927,7 @@
             </a:ln>
             <a:extLst>
               <a:ext uri="{91240B29-F687-4f45-9708-019B960494DF}">
-                <a14:hiddenLine xmlns:a14="http://schemas.microsoft.com/office/drawing/2010/main" xmlns="" w="9525">
+                <a14:hiddenLine xmlns="" xmlns:a14="http://schemas.microsoft.com/office/drawing/2010/main" w="9525">
                   <a:solidFill>
                     <a:srgbClr val="000000"/>
                   </a:solidFill>
@@ -3988,7 +3989,7 @@
             </a:ln>
             <a:extLst>
               <a:ext uri="{91240B29-F687-4f45-9708-019B960494DF}">
-                <a14:hiddenLine xmlns:a14="http://schemas.microsoft.com/office/drawing/2010/main" xmlns="" w="9525">
+                <a14:hiddenLine xmlns="" xmlns:a14="http://schemas.microsoft.com/office/drawing/2010/main" w="9525">
                   <a:solidFill>
                     <a:srgbClr val="000000"/>
                   </a:solidFill>
@@ -4108,7 +4109,7 @@
             </a:ln>
             <a:extLst>
               <a:ext uri="{91240B29-F687-4f45-9708-019B960494DF}">
-                <a14:hiddenLine xmlns:a14="http://schemas.microsoft.com/office/drawing/2010/main" xmlns="" w="9525">
+                <a14:hiddenLine xmlns="" xmlns:a14="http://schemas.microsoft.com/office/drawing/2010/main" w="9525">
                   <a:solidFill>
                     <a:srgbClr val="000000"/>
                   </a:solidFill>
@@ -4176,7 +4177,7 @@
             </a:ln>
             <a:extLst>
               <a:ext uri="{91240B29-F687-4f45-9708-019B960494DF}">
-                <a14:hiddenLine xmlns:a14="http://schemas.microsoft.com/office/drawing/2010/main" xmlns="" w="9525">
+                <a14:hiddenLine xmlns="" xmlns:a14="http://schemas.microsoft.com/office/drawing/2010/main" w="9525">
                   <a:solidFill>
                     <a:srgbClr val="000000"/>
                   </a:solidFill>
@@ -4266,7 +4267,7 @@
             </a:ln>
             <a:extLst>
               <a:ext uri="{91240B29-F687-4f45-9708-019B960494DF}">
-                <a14:hiddenLine xmlns:a14="http://schemas.microsoft.com/office/drawing/2010/main" xmlns="" w="9525">
+                <a14:hiddenLine xmlns="" xmlns:a14="http://schemas.microsoft.com/office/drawing/2010/main" w="9525">
                   <a:solidFill>
                     <a:srgbClr val="000000"/>
                   </a:solidFill>
@@ -8988,7 +8989,7 @@
           <a:noFill/>
           <a:extLst>
             <a:ext uri="{909E8E84-426E-40dd-AFC4-6F175D3DCCD1}">
-              <a14:hiddenFill xmlns:a14="http://schemas.microsoft.com/office/drawing/2010/main" xmlns="">
+              <a14:hiddenFill xmlns="" xmlns:a14="http://schemas.microsoft.com/office/drawing/2010/main">
                 <a:solidFill>
                   <a:srgbClr val="FFFFFF"/>
                 </a:solidFill>
@@ -9062,7 +9063,7 @@
               </a:ln>
               <a:extLst>
                 <a:ext uri="{91240B29-F687-4f45-9708-019B960494DF}">
-                  <a14:hiddenLine xmlns:a14="http://schemas.microsoft.com/office/drawing/2010/main" xmlns="" w="9525">
+                  <a14:hiddenLine xmlns="" xmlns:a14="http://schemas.microsoft.com/office/drawing/2010/main" w="9525">
                     <a:solidFill>
                       <a:srgbClr val="000000"/>
                     </a:solidFill>
@@ -9152,7 +9153,7 @@
               </a:ln>
               <a:extLst>
                 <a:ext uri="{91240B29-F687-4f45-9708-019B960494DF}">
-                  <a14:hiddenLine xmlns:a14="http://schemas.microsoft.com/office/drawing/2010/main" xmlns="" w="9525">
+                  <a14:hiddenLine xmlns="" xmlns:a14="http://schemas.microsoft.com/office/drawing/2010/main" w="9525">
                     <a:solidFill>
                       <a:srgbClr val="000000"/>
                     </a:solidFill>
@@ -9242,7 +9243,7 @@
               </a:ln>
               <a:extLst>
                 <a:ext uri="{91240B29-F687-4f45-9708-019B960494DF}">
-                  <a14:hiddenLine xmlns:a14="http://schemas.microsoft.com/office/drawing/2010/main" xmlns="" w="9525">
+                  <a14:hiddenLine xmlns="" xmlns:a14="http://schemas.microsoft.com/office/drawing/2010/main" w="9525">
                     <a:solidFill>
                       <a:srgbClr val="000000"/>
                     </a:solidFill>
@@ -9304,7 +9305,7 @@
               </a:ln>
               <a:extLst>
                 <a:ext uri="{91240B29-F687-4f45-9708-019B960494DF}">
-                  <a14:hiddenLine xmlns:a14="http://schemas.microsoft.com/office/drawing/2010/main" xmlns="" w="9525">
+                  <a14:hiddenLine xmlns="" xmlns:a14="http://schemas.microsoft.com/office/drawing/2010/main" w="9525">
                     <a:solidFill>
                       <a:srgbClr val="000000"/>
                     </a:solidFill>
@@ -9394,7 +9395,7 @@
               </a:ln>
               <a:extLst>
                 <a:ext uri="{91240B29-F687-4f45-9708-019B960494DF}">
-                  <a14:hiddenLine xmlns:a14="http://schemas.microsoft.com/office/drawing/2010/main" xmlns="" w="9525">
+                  <a14:hiddenLine xmlns="" xmlns:a14="http://schemas.microsoft.com/office/drawing/2010/main" w="9525">
                     <a:solidFill>
                       <a:srgbClr val="000000"/>
                     </a:solidFill>
@@ -9456,7 +9457,7 @@
               </a:ln>
               <a:extLst>
                 <a:ext uri="{91240B29-F687-4f45-9708-019B960494DF}">
-                  <a14:hiddenLine xmlns:a14="http://schemas.microsoft.com/office/drawing/2010/main" xmlns="" w="9525">
+                  <a14:hiddenLine xmlns="" xmlns:a14="http://schemas.microsoft.com/office/drawing/2010/main" w="9525">
                     <a:solidFill>
                       <a:srgbClr val="000000"/>
                     </a:solidFill>
@@ -9518,7 +9519,7 @@
               </a:ln>
               <a:extLst>
                 <a:ext uri="{91240B29-F687-4f45-9708-019B960494DF}">
-                  <a14:hiddenLine xmlns:a14="http://schemas.microsoft.com/office/drawing/2010/main" xmlns="" w="9525">
+                  <a14:hiddenLine xmlns="" xmlns:a14="http://schemas.microsoft.com/office/drawing/2010/main" w="9525">
                     <a:solidFill>
                       <a:srgbClr val="000000"/>
                     </a:solidFill>
@@ -9608,7 +9609,7 @@
               </a:ln>
               <a:extLst>
                 <a:ext uri="{91240B29-F687-4f45-9708-019B960494DF}">
-                  <a14:hiddenLine xmlns:a14="http://schemas.microsoft.com/office/drawing/2010/main" xmlns="" w="9525">
+                  <a14:hiddenLine xmlns="" xmlns:a14="http://schemas.microsoft.com/office/drawing/2010/main" w="9525">
                     <a:solidFill>
                       <a:srgbClr val="000000"/>
                     </a:solidFill>
@@ -9698,7 +9699,7 @@
               </a:ln>
               <a:extLst>
                 <a:ext uri="{91240B29-F687-4f45-9708-019B960494DF}">
-                  <a14:hiddenLine xmlns:a14="http://schemas.microsoft.com/office/drawing/2010/main" xmlns="" w="9525">
+                  <a14:hiddenLine xmlns="" xmlns:a14="http://schemas.microsoft.com/office/drawing/2010/main" w="9525">
                     <a:solidFill>
                       <a:srgbClr val="000000"/>
                     </a:solidFill>
@@ -9760,7 +9761,7 @@
               </a:ln>
               <a:extLst>
                 <a:ext uri="{91240B29-F687-4f45-9708-019B960494DF}">
-                  <a14:hiddenLine xmlns:a14="http://schemas.microsoft.com/office/drawing/2010/main" xmlns="" w="9525">
+                  <a14:hiddenLine xmlns="" xmlns:a14="http://schemas.microsoft.com/office/drawing/2010/main" w="9525">
                     <a:solidFill>
                       <a:srgbClr val="000000"/>
                     </a:solidFill>
@@ -9870,7 +9871,7 @@
               </a:ln>
               <a:extLst>
                 <a:ext uri="{91240B29-F687-4f45-9708-019B960494DF}">
-                  <a14:hiddenLine xmlns:a14="http://schemas.microsoft.com/office/drawing/2010/main" xmlns="" w="9525">
+                  <a14:hiddenLine xmlns="" xmlns:a14="http://schemas.microsoft.com/office/drawing/2010/main" w="9525">
                     <a:solidFill>
                       <a:srgbClr val="000000"/>
                     </a:solidFill>
@@ -9954,7 +9955,7 @@
               </a:ln>
               <a:extLst>
                 <a:ext uri="{91240B29-F687-4f45-9708-019B960494DF}">
-                  <a14:hiddenLine xmlns:a14="http://schemas.microsoft.com/office/drawing/2010/main" xmlns="" w="9525">
+                  <a14:hiddenLine xmlns="" xmlns:a14="http://schemas.microsoft.com/office/drawing/2010/main" w="9525">
                     <a:solidFill>
                       <a:srgbClr val="000000"/>
                     </a:solidFill>
@@ -10016,7 +10017,7 @@
               </a:ln>
               <a:extLst>
                 <a:ext uri="{91240B29-F687-4f45-9708-019B960494DF}">
-                  <a14:hiddenLine xmlns:a14="http://schemas.microsoft.com/office/drawing/2010/main" xmlns="" w="9525">
+                  <a14:hiddenLine xmlns="" xmlns:a14="http://schemas.microsoft.com/office/drawing/2010/main" w="9525">
                     <a:solidFill>
                       <a:srgbClr val="000000"/>
                     </a:solidFill>
@@ -10078,7 +10079,7 @@
               </a:ln>
               <a:extLst>
                 <a:ext uri="{91240B29-F687-4f45-9708-019B960494DF}">
-                  <a14:hiddenLine xmlns:a14="http://schemas.microsoft.com/office/drawing/2010/main" xmlns="" w="9525">
+                  <a14:hiddenLine xmlns="" xmlns:a14="http://schemas.microsoft.com/office/drawing/2010/main" w="9525">
                     <a:solidFill>
                       <a:srgbClr val="000000"/>
                     </a:solidFill>
@@ -10168,7 +10169,7 @@
               </a:ln>
               <a:extLst>
                 <a:ext uri="{91240B29-F687-4f45-9708-019B960494DF}">
-                  <a14:hiddenLine xmlns:a14="http://schemas.microsoft.com/office/drawing/2010/main" xmlns="" w="9525">
+                  <a14:hiddenLine xmlns="" xmlns:a14="http://schemas.microsoft.com/office/drawing/2010/main" w="9525">
                     <a:solidFill>
                       <a:srgbClr val="000000"/>
                     </a:solidFill>
@@ -10202,7 +10203,7 @@
               </a:ln>
               <a:extLst>
                 <a:ext uri="{91240B29-F687-4f45-9708-019B960494DF}">
-                  <a14:hiddenLine xmlns:a14="http://schemas.microsoft.com/office/drawing/2010/main" xmlns="" w="9525">
+                  <a14:hiddenLine xmlns="" xmlns:a14="http://schemas.microsoft.com/office/drawing/2010/main" w="9525">
                     <a:solidFill>
                       <a:srgbClr val="000000"/>
                     </a:solidFill>
@@ -10267,7 +10268,7 @@
               </a:ln>
               <a:extLst>
                 <a:ext uri="{91240B29-F687-4f45-9708-019B960494DF}">
-                  <a14:hiddenLine xmlns:a14="http://schemas.microsoft.com/office/drawing/2010/main" xmlns="" w="9525">
+                  <a14:hiddenLine xmlns="" xmlns:a14="http://schemas.microsoft.com/office/drawing/2010/main" w="9525">
                     <a:solidFill>
                       <a:srgbClr val="000000"/>
                     </a:solidFill>
@@ -10357,7 +10358,7 @@
               </a:ln>
               <a:extLst>
                 <a:ext uri="{91240B29-F687-4f45-9708-019B960494DF}">
-                  <a14:hiddenLine xmlns:a14="http://schemas.microsoft.com/office/drawing/2010/main" xmlns="" w="9525">
+                  <a14:hiddenLine xmlns="" xmlns:a14="http://schemas.microsoft.com/office/drawing/2010/main" w="9525">
                     <a:solidFill>
                       <a:srgbClr val="000000"/>
                     </a:solidFill>
@@ -10419,7 +10420,7 @@
               </a:ln>
               <a:extLst>
                 <a:ext uri="{91240B29-F687-4f45-9708-019B960494DF}">
-                  <a14:hiddenLine xmlns:a14="http://schemas.microsoft.com/office/drawing/2010/main" xmlns="" w="9525">
+                  <a14:hiddenLine xmlns="" xmlns:a14="http://schemas.microsoft.com/office/drawing/2010/main" w="9525">
                     <a:solidFill>
                       <a:srgbClr val="000000"/>
                     </a:solidFill>
@@ -10509,7 +10510,7 @@
               </a:ln>
               <a:extLst>
                 <a:ext uri="{91240B29-F687-4f45-9708-019B960494DF}">
-                  <a14:hiddenLine xmlns:a14="http://schemas.microsoft.com/office/drawing/2010/main" xmlns="" w="9525">
+                  <a14:hiddenLine xmlns="" xmlns:a14="http://schemas.microsoft.com/office/drawing/2010/main" w="9525">
                     <a:solidFill>
                       <a:srgbClr val="000000"/>
                     </a:solidFill>
@@ -10574,7 +10575,7 @@
               </a:ln>
               <a:extLst>
                 <a:ext uri="{91240B29-F687-4f45-9708-019B960494DF}">
-                  <a14:hiddenLine xmlns:a14="http://schemas.microsoft.com/office/drawing/2010/main" xmlns="" w="9525">
+                  <a14:hiddenLine xmlns="" xmlns:a14="http://schemas.microsoft.com/office/drawing/2010/main" w="9525">
                     <a:solidFill>
                       <a:srgbClr val="000000"/>
                     </a:solidFill>
@@ -10636,7 +10637,7 @@
               </a:ln>
               <a:extLst>
                 <a:ext uri="{91240B29-F687-4f45-9708-019B960494DF}">
-                  <a14:hiddenLine xmlns:a14="http://schemas.microsoft.com/office/drawing/2010/main" xmlns="" w="9525">
+                  <a14:hiddenLine xmlns="" xmlns:a14="http://schemas.microsoft.com/office/drawing/2010/main" w="9525">
                     <a:solidFill>
                       <a:srgbClr val="000000"/>
                     </a:solidFill>
@@ -10726,7 +10727,7 @@
               </a:ln>
               <a:extLst>
                 <a:ext uri="{91240B29-F687-4f45-9708-019B960494DF}">
-                  <a14:hiddenLine xmlns:a14="http://schemas.microsoft.com/office/drawing/2010/main" xmlns="" w="9525">
+                  <a14:hiddenLine xmlns="" xmlns:a14="http://schemas.microsoft.com/office/drawing/2010/main" w="9525">
                     <a:solidFill>
                       <a:srgbClr val="000000"/>
                     </a:solidFill>
@@ -10816,7 +10817,7 @@
               </a:ln>
               <a:extLst>
                 <a:ext uri="{91240B29-F687-4f45-9708-019B960494DF}">
-                  <a14:hiddenLine xmlns:a14="http://schemas.microsoft.com/office/drawing/2010/main" xmlns="" w="9525">
+                  <a14:hiddenLine xmlns="" xmlns:a14="http://schemas.microsoft.com/office/drawing/2010/main" w="9525">
                     <a:solidFill>
                       <a:srgbClr val="000000"/>
                     </a:solidFill>
@@ -10881,7 +10882,7 @@
               </a:ln>
               <a:extLst>
                 <a:ext uri="{91240B29-F687-4f45-9708-019B960494DF}">
-                  <a14:hiddenLine xmlns:a14="http://schemas.microsoft.com/office/drawing/2010/main" xmlns="" w="9525">
+                  <a14:hiddenLine xmlns="" xmlns:a14="http://schemas.microsoft.com/office/drawing/2010/main" w="9525">
                     <a:solidFill>
                       <a:srgbClr val="000000"/>
                     </a:solidFill>
@@ -11001,7 +11002,7 @@
               </a:ln>
               <a:extLst>
                 <a:ext uri="{91240B29-F687-4f45-9708-019B960494DF}">
-                  <a14:hiddenLine xmlns:a14="http://schemas.microsoft.com/office/drawing/2010/main" xmlns="" w="9525">
+                  <a14:hiddenLine xmlns="" xmlns:a14="http://schemas.microsoft.com/office/drawing/2010/main" w="9525">
                     <a:solidFill>
                       <a:srgbClr val="000000"/>
                     </a:solidFill>
@@ -11099,7 +11100,7 @@
               </a:ln>
               <a:extLst>
                 <a:ext uri="{91240B29-F687-4f45-9708-019B960494DF}">
-                  <a14:hiddenLine xmlns:a14="http://schemas.microsoft.com/office/drawing/2010/main" xmlns="" w="9525">
+                  <a14:hiddenLine xmlns="" xmlns:a14="http://schemas.microsoft.com/office/drawing/2010/main" w="9525">
                     <a:solidFill>
                       <a:srgbClr val="000000"/>
                     </a:solidFill>
@@ -11214,7 +11215,7 @@
               </a:ln>
               <a:extLst>
                 <a:ext uri="{91240B29-F687-4f45-9708-019B960494DF}">
-                  <a14:hiddenLine xmlns:a14="http://schemas.microsoft.com/office/drawing/2010/main" xmlns="" w="9525">
+                  <a14:hiddenLine xmlns="" xmlns:a14="http://schemas.microsoft.com/office/drawing/2010/main" w="9525">
                     <a:solidFill>
                       <a:srgbClr val="000000"/>
                     </a:solidFill>
@@ -11304,7 +11305,7 @@
               </a:ln>
               <a:extLst>
                 <a:ext uri="{91240B29-F687-4f45-9708-019B960494DF}">
-                  <a14:hiddenLine xmlns:a14="http://schemas.microsoft.com/office/drawing/2010/main" xmlns="" w="9525">
+                  <a14:hiddenLine xmlns="" xmlns:a14="http://schemas.microsoft.com/office/drawing/2010/main" w="9525">
                     <a:solidFill>
                       <a:srgbClr val="000000"/>
                     </a:solidFill>
@@ -11369,7 +11370,7 @@
               </a:ln>
               <a:extLst>
                 <a:ext uri="{91240B29-F687-4f45-9708-019B960494DF}">
-                  <a14:hiddenLine xmlns:a14="http://schemas.microsoft.com/office/drawing/2010/main" xmlns="" w="9525">
+                  <a14:hiddenLine xmlns="" xmlns:a14="http://schemas.microsoft.com/office/drawing/2010/main" w="9525">
                     <a:solidFill>
                       <a:srgbClr val="000000"/>
                     </a:solidFill>
@@ -11459,7 +11460,7 @@
               </a:ln>
               <a:extLst>
                 <a:ext uri="{91240B29-F687-4f45-9708-019B960494DF}">
-                  <a14:hiddenLine xmlns:a14="http://schemas.microsoft.com/office/drawing/2010/main" xmlns="" w="9525">
+                  <a14:hiddenLine xmlns="" xmlns:a14="http://schemas.microsoft.com/office/drawing/2010/main" w="9525">
                     <a:solidFill>
                       <a:srgbClr val="000000"/>
                     </a:solidFill>
@@ -11527,7 +11528,7 @@
               </a:ln>
               <a:extLst>
                 <a:ext uri="{91240B29-F687-4f45-9708-019B960494DF}">
-                  <a14:hiddenLine xmlns:a14="http://schemas.microsoft.com/office/drawing/2010/main" xmlns="" w="9525">
+                  <a14:hiddenLine xmlns="" xmlns:a14="http://schemas.microsoft.com/office/drawing/2010/main" w="9525">
                     <a:solidFill>
                       <a:srgbClr val="000000"/>
                     </a:solidFill>
@@ -11617,7 +11618,7 @@
               </a:ln>
               <a:extLst>
                 <a:ext uri="{91240B29-F687-4f45-9708-019B960494DF}">
-                  <a14:hiddenLine xmlns:a14="http://schemas.microsoft.com/office/drawing/2010/main" xmlns="" w="9525">
+                  <a14:hiddenLine xmlns="" xmlns:a14="http://schemas.microsoft.com/office/drawing/2010/main" w="9525">
                     <a:solidFill>
                       <a:srgbClr val="000000"/>
                     </a:solidFill>
@@ -11685,7 +11686,7 @@
               </a:ln>
               <a:extLst>
                 <a:ext uri="{91240B29-F687-4f45-9708-019B960494DF}">
-                  <a14:hiddenLine xmlns:a14="http://schemas.microsoft.com/office/drawing/2010/main" xmlns="" w="9525">
+                  <a14:hiddenLine xmlns="" xmlns:a14="http://schemas.microsoft.com/office/drawing/2010/main" w="9525">
                     <a:solidFill>
                       <a:srgbClr val="000000"/>
                     </a:solidFill>
@@ -11775,7 +11776,7 @@
               </a:ln>
               <a:extLst>
                 <a:ext uri="{91240B29-F687-4f45-9708-019B960494DF}">
-                  <a14:hiddenLine xmlns:a14="http://schemas.microsoft.com/office/drawing/2010/main" xmlns="" w="9525">
+                  <a14:hiddenLine xmlns="" xmlns:a14="http://schemas.microsoft.com/office/drawing/2010/main" w="9525">
                     <a:solidFill>
                       <a:srgbClr val="000000"/>
                     </a:solidFill>
@@ -11809,7 +11810,7 @@
               </a:ln>
               <a:extLst>
                 <a:ext uri="{91240B29-F687-4f45-9708-019B960494DF}">
-                  <a14:hiddenLine xmlns:a14="http://schemas.microsoft.com/office/drawing/2010/main" xmlns="" w="9525">
+                  <a14:hiddenLine xmlns="" xmlns:a14="http://schemas.microsoft.com/office/drawing/2010/main" w="9525">
                     <a:solidFill>
                       <a:srgbClr val="000000"/>
                     </a:solidFill>
@@ -12526,7 +12527,7 @@
             <a:noFill/>
             <a:extLst>
               <a:ext uri="{909E8E84-426E-40dd-AFC4-6F175D3DCCD1}">
-                <a14:hiddenFill xmlns="" xmlns:p14="http://schemas.microsoft.com/office/powerpoint/2010/main" xmlns:a14="http://schemas.microsoft.com/office/drawing/2010/main">
+                <a14:hiddenFill xmlns:a14="http://schemas.microsoft.com/office/drawing/2010/main" xmlns:p14="http://schemas.microsoft.com/office/powerpoint/2010/main" xmlns="">
                   <a:solidFill>
                     <a:srgbClr val="FFFFFF"/>
                   </a:solidFill>
@@ -15068,7 +15069,7 @@
                   <a:schemeClr val="bg1"/>
                 </a:solidFill>
               </a:rPr>
-              <a:t>Budget</a:t>
+              <a:t>Budget minimal</a:t>
             </a:r>
           </a:p>
         </p:txBody>
@@ -15089,14 +15090,14 @@
             <p:ph idx="1"/>
             <p:extLst>
               <p:ext uri="{D42A27DB-BD31-4B8C-83A1-F6EECF244321}">
-                <p14:modId xmlns:p14="http://schemas.microsoft.com/office/powerpoint/2010/main" val="2422338737"/>
+                <p14:modId xmlns:p14="http://schemas.microsoft.com/office/powerpoint/2010/main" val="716783704"/>
               </p:ext>
             </p:extLst>
           </p:nvPr>
         </p:nvGraphicFramePr>
         <p:xfrm>
           <a:off x="2463551" y="2048308"/>
-          <a:ext cx="7264898" cy="4191174"/>
+          <a:ext cx="7264898" cy="4620155"/>
         </p:xfrm>
         <a:graphic>
           <a:graphicData uri="http://schemas.openxmlformats.org/drawingml/2006/table">
@@ -15171,12 +15172,12 @@
                         </a:spcAft>
                       </a:pPr>
                       <a:r>
-                        <a:rPr lang="fr-FR" sz="1100">
+                        <a:rPr lang="fr-FR" sz="1100" dirty="0">
                           <a:effectLst/>
                         </a:rPr>
-                        <a:t>Bénéfices</a:t>
+                        <a:t>Bénéfices potentiels</a:t>
                       </a:r>
-                      <a:endParaRPr lang="fr-FR" sz="1100">
+                      <a:endParaRPr lang="fr-FR" sz="1100" dirty="0">
                         <a:effectLst/>
                         <a:latin typeface="Calibri" panose="020F0502020204030204" pitchFamily="34" charset="0"/>
                         <a:ea typeface="Calibri" panose="020F0502020204030204" pitchFamily="34" charset="0"/>
@@ -15200,7 +15201,7 @@
                         </a:spcAft>
                       </a:pPr>
                       <a:r>
-                        <a:rPr lang="fr-FR" sz="1100">
+                        <a:rPr lang="fr-FR" sz="1100" dirty="0">
                           <a:effectLst/>
                         </a:rPr>
                         <a:t>Dépenses</a:t>
@@ -15359,12 +15360,12 @@
                         </a:spcAft>
                       </a:pPr>
                       <a:r>
-                        <a:rPr lang="fr-FR" sz="1100">
+                        <a:rPr lang="fr-FR" sz="1100" dirty="0">
                           <a:effectLst/>
                         </a:rPr>
                         <a:t> </a:t>
                       </a:r>
-                      <a:endParaRPr lang="fr-FR" sz="1100">
+                      <a:endParaRPr lang="fr-FR" sz="1100" dirty="0">
                         <a:effectLst/>
                         <a:latin typeface="Calibri" panose="020F0502020204030204" pitchFamily="34" charset="0"/>
                         <a:ea typeface="Calibri" panose="020F0502020204030204" pitchFamily="34" charset="0"/>
@@ -15388,12 +15389,12 @@
                         </a:spcAft>
                       </a:pPr>
                       <a:r>
-                        <a:rPr lang="fr-FR" sz="1100">
+                        <a:rPr lang="fr-FR" sz="1100" dirty="0">
                           <a:effectLst/>
                         </a:rPr>
                         <a:t>563.97€</a:t>
                       </a:r>
-                      <a:endParaRPr lang="fr-FR" sz="1100">
+                      <a:endParaRPr lang="fr-FR" sz="1100" dirty="0">
                         <a:effectLst/>
                         <a:latin typeface="Calibri" panose="020F0502020204030204" pitchFamily="34" charset="0"/>
                         <a:ea typeface="Calibri" panose="020F0502020204030204" pitchFamily="34" charset="0"/>
@@ -15424,12 +15425,12 @@
                         </a:spcAft>
                       </a:pPr>
                       <a:r>
-                        <a:rPr lang="fr-FR" sz="1100">
+                        <a:rPr lang="fr-FR" sz="1100" dirty="0">
                           <a:effectLst/>
                         </a:rPr>
                         <a:t>Câble FFTP</a:t>
                       </a:r>
-                      <a:endParaRPr lang="fr-FR" sz="1100">
+                      <a:endParaRPr lang="fr-FR" sz="1100" dirty="0">
                         <a:effectLst/>
                         <a:latin typeface="Calibri" panose="020F0502020204030204" pitchFamily="34" charset="0"/>
                         <a:ea typeface="Calibri" panose="020F0502020204030204" pitchFamily="34" charset="0"/>
@@ -15482,12 +15483,12 @@
                         </a:spcAft>
                       </a:pPr>
                       <a:r>
-                        <a:rPr lang="fr-FR" sz="1100">
+                        <a:rPr lang="fr-FR" sz="1100" dirty="0">
                           <a:effectLst/>
                         </a:rPr>
-                        <a:t> </a:t>
+                        <a:t>1 560€</a:t>
                       </a:r>
-                      <a:endParaRPr lang="fr-FR" sz="1100">
+                      <a:endParaRPr lang="fr-FR" sz="1100" dirty="0">
                         <a:effectLst/>
                         <a:latin typeface="Calibri" panose="020F0502020204030204" pitchFamily="34" charset="0"/>
                         <a:ea typeface="Calibri" panose="020F0502020204030204" pitchFamily="34" charset="0"/>
@@ -15503,7 +15504,7 @@
                   </a:ext>
                 </a:extLst>
               </a:tr>
-              <a:tr h="419115">
+              <a:tr h="209559">
                 <a:tc>
                   <a:txBody>
                     <a:bodyPr/>
@@ -15518,12 +15519,94 @@
                         </a:spcAft>
                       </a:pPr>
                       <a:r>
-                        <a:rPr lang="fr-FR" sz="1100">
+                        <a:rPr lang="fr-FR" sz="1100" dirty="0">
+                          <a:effectLst/>
+                          <a:latin typeface="Calibri" panose="020F0502020204030204" pitchFamily="34" charset="0"/>
+                          <a:ea typeface="Calibri" panose="020F0502020204030204" pitchFamily="34" charset="0"/>
+                          <a:cs typeface="Times New Roman" panose="02020603050405020304" pitchFamily="18" charset="0"/>
+                        </a:rPr>
+                        <a:t>Connecteur CAT 6a</a:t>
+                      </a:r>
+                    </a:p>
+                  </a:txBody>
+                  <a:tcPr marL="67700" marR="67700" marT="0" marB="0"/>
+                </a:tc>
+                <a:tc>
+                  <a:txBody>
+                    <a:bodyPr/>
+                    <a:lstStyle/>
+                    <a:p>
+                      <a:pPr>
+                        <a:lnSpc>
+                          <a:spcPct val="107000"/>
+                        </a:lnSpc>
+                        <a:spcAft>
+                          <a:spcPts val="0"/>
+                        </a:spcAft>
+                      </a:pPr>
+                      <a:endParaRPr lang="fr-FR" sz="1100">
+                        <a:effectLst/>
+                        <a:latin typeface="Calibri" panose="020F0502020204030204" pitchFamily="34" charset="0"/>
+                        <a:ea typeface="Calibri" panose="020F0502020204030204" pitchFamily="34" charset="0"/>
+                        <a:cs typeface="Times New Roman" panose="02020603050405020304" pitchFamily="18" charset="0"/>
+                      </a:endParaRPr>
+                    </a:p>
+                  </a:txBody>
+                  <a:tcPr marL="67700" marR="67700" marT="0" marB="0"/>
+                </a:tc>
+                <a:tc>
+                  <a:txBody>
+                    <a:bodyPr/>
+                    <a:lstStyle/>
+                    <a:p>
+                      <a:pPr>
+                        <a:lnSpc>
+                          <a:spcPct val="107000"/>
+                        </a:lnSpc>
+                        <a:spcAft>
+                          <a:spcPts val="0"/>
+                        </a:spcAft>
+                      </a:pPr>
+                      <a:r>
+                        <a:rPr lang="fr-FR" sz="1100" dirty="0">
+                          <a:effectLst/>
+                          <a:latin typeface="Calibri" panose="020F0502020204030204" pitchFamily="34" charset="0"/>
+                          <a:ea typeface="Calibri" panose="020F0502020204030204" pitchFamily="34" charset="0"/>
+                          <a:cs typeface="Times New Roman" panose="02020603050405020304" pitchFamily="18" charset="0"/>
+                        </a:rPr>
+                        <a:t>100€</a:t>
+                      </a:r>
+                    </a:p>
+                  </a:txBody>
+                  <a:tcPr marL="67700" marR="67700" marT="0" marB="0"/>
+                </a:tc>
+                <a:extLst>
+                  <a:ext uri="{0D108BD9-81ED-4DB2-BD59-A6C34878D82A}">
+                    <a16:rowId xmlns:a16="http://schemas.microsoft.com/office/drawing/2014/main" val="2766766581"/>
+                  </a:ext>
+                </a:extLst>
+              </a:tr>
+              <a:tr h="201213">
+                <a:tc>
+                  <a:txBody>
+                    <a:bodyPr/>
+                    <a:lstStyle/>
+                    <a:p>
+                      <a:pPr>
+                        <a:lnSpc>
+                          <a:spcPct val="107000"/>
+                        </a:lnSpc>
+                        <a:spcAft>
+                          <a:spcPts val="0"/>
+                        </a:spcAft>
+                      </a:pPr>
+                      <a:r>
+                        <a:rPr lang="fr-FR" sz="1100" dirty="0">
                           <a:effectLst/>
                         </a:rPr>
                         <a:t>Multiprise parafoudre 6 prises</a:t>
                       </a:r>
-                      <a:endParaRPr lang="fr-FR" sz="1100">
+                      <a:endParaRPr lang="fr-FR" sz="1100" dirty="0">
                         <a:effectLst/>
                         <a:latin typeface="Calibri" panose="020F0502020204030204" pitchFamily="34" charset="0"/>
                         <a:ea typeface="Calibri" panose="020F0502020204030204" pitchFamily="34" charset="0"/>
@@ -15579,7 +15662,7 @@
                         <a:rPr lang="fr-FR" sz="1100" dirty="0">
                           <a:effectLst/>
                         </a:rPr>
-                        <a:t>1 014€</a:t>
+                        <a:t>3 523€</a:t>
                       </a:r>
                       <a:endParaRPr lang="fr-FR" sz="1100" dirty="0">
                         <a:effectLst/>
@@ -15670,12 +15753,12 @@
                         </a:spcAft>
                       </a:pPr>
                       <a:r>
-                        <a:rPr lang="fr-FR" sz="1100">
+                        <a:rPr lang="fr-FR" sz="1100" dirty="0">
                           <a:effectLst/>
                         </a:rPr>
-                        <a:t> </a:t>
+                        <a:t>4 468€</a:t>
                       </a:r>
-                      <a:endParaRPr lang="fr-FR" sz="1100">
+                      <a:endParaRPr lang="fr-FR" sz="1100" dirty="0">
                         <a:effectLst/>
                         <a:latin typeface="Calibri" panose="020F0502020204030204" pitchFamily="34" charset="0"/>
                         <a:ea typeface="Calibri" panose="020F0502020204030204" pitchFamily="34" charset="0"/>
@@ -15691,7 +15774,7 @@
                   </a:ext>
                 </a:extLst>
               </a:tr>
-              <a:tr h="419115">
+              <a:tr h="227762">
                 <a:tc>
                   <a:txBody>
                     <a:bodyPr/>
@@ -15706,12 +15789,12 @@
                         </a:spcAft>
                       </a:pPr>
                       <a:r>
-                        <a:rPr lang="fr-FR" sz="1100">
+                        <a:rPr lang="fr-FR" sz="1100" dirty="0">
                           <a:effectLst/>
                         </a:rPr>
                         <a:t>Armoire de distribution 630A</a:t>
                       </a:r>
-                      <a:endParaRPr lang="fr-FR" sz="1100">
+                      <a:endParaRPr lang="fr-FR" sz="1100" dirty="0">
                         <a:effectLst/>
                         <a:latin typeface="Calibri" panose="020F0502020204030204" pitchFamily="34" charset="0"/>
                         <a:ea typeface="Calibri" panose="020F0502020204030204" pitchFamily="34" charset="0"/>
@@ -15764,12 +15847,12 @@
                         </a:spcAft>
                       </a:pPr>
                       <a:r>
-                        <a:rPr lang="fr-FR" sz="1100">
+                        <a:rPr lang="fr-FR" sz="1100" dirty="0">
                           <a:effectLst/>
                         </a:rPr>
                         <a:t>3 216€</a:t>
                       </a:r>
-                      <a:endParaRPr lang="fr-FR" sz="1100">
+                      <a:endParaRPr lang="fr-FR" sz="1100" dirty="0">
                         <a:effectLst/>
                         <a:latin typeface="Calibri" panose="020F0502020204030204" pitchFamily="34" charset="0"/>
                         <a:ea typeface="Calibri" panose="020F0502020204030204" pitchFamily="34" charset="0"/>
@@ -15800,12 +15883,12 @@
                         </a:spcAft>
                       </a:pPr>
                       <a:r>
-                        <a:rPr lang="fr-FR" sz="1100">
+                        <a:rPr lang="fr-FR" sz="1100" dirty="0">
                           <a:effectLst/>
                         </a:rPr>
                         <a:t>Switch</a:t>
                       </a:r>
-                      <a:endParaRPr lang="fr-FR" sz="1100">
+                      <a:endParaRPr lang="fr-FR" sz="1100" dirty="0">
                         <a:effectLst/>
                         <a:latin typeface="Calibri" panose="020F0502020204030204" pitchFamily="34" charset="0"/>
                         <a:ea typeface="Calibri" panose="020F0502020204030204" pitchFamily="34" charset="0"/>
@@ -15858,12 +15941,12 @@
                         </a:spcAft>
                       </a:pPr>
                       <a:r>
-                        <a:rPr lang="fr-FR" sz="1100">
+                        <a:rPr lang="fr-FR" sz="1100" dirty="0">
                           <a:effectLst/>
                         </a:rPr>
                         <a:t>1 244.25€</a:t>
                       </a:r>
-                      <a:endParaRPr lang="fr-FR" sz="1100">
+                      <a:endParaRPr lang="fr-FR" sz="1100" dirty="0">
                         <a:effectLst/>
                         <a:latin typeface="Calibri" panose="020F0502020204030204" pitchFamily="34" charset="0"/>
                         <a:ea typeface="Calibri" panose="020F0502020204030204" pitchFamily="34" charset="0"/>
@@ -15988,12 +16071,12 @@
                         </a:spcAft>
                       </a:pPr>
                       <a:r>
-                        <a:rPr lang="fr-FR" sz="1100">
+                        <a:rPr lang="fr-FR" sz="1100" dirty="0">
                           <a:effectLst/>
                         </a:rPr>
                         <a:t>Sécurité</a:t>
                       </a:r>
-                      <a:endParaRPr lang="fr-FR" sz="1100">
+                      <a:endParaRPr lang="fr-FR" sz="1100" dirty="0">
                         <a:effectLst/>
                         <a:latin typeface="Calibri" panose="020F0502020204030204" pitchFamily="34" charset="0"/>
                         <a:ea typeface="Calibri" panose="020F0502020204030204" pitchFamily="34" charset="0"/>
@@ -16046,12 +16129,12 @@
                         </a:spcAft>
                       </a:pPr>
                       <a:r>
-                        <a:rPr lang="fr-FR" sz="1100">
+                        <a:rPr lang="fr-FR" sz="1100" dirty="0">
                           <a:effectLst/>
                         </a:rPr>
-                        <a:t> </a:t>
+                        <a:t>1 520€</a:t>
                       </a:r>
-                      <a:endParaRPr lang="fr-FR" sz="1100">
+                      <a:endParaRPr lang="fr-FR" sz="1100" dirty="0">
                         <a:effectLst/>
                         <a:latin typeface="Calibri" panose="020F0502020204030204" pitchFamily="34" charset="0"/>
                         <a:ea typeface="Calibri" panose="020F0502020204030204" pitchFamily="34" charset="0"/>
@@ -16064,6 +16147,91 @@
                 <a:extLst>
                   <a:ext uri="{0D108BD9-81ED-4DB2-BD59-A6C34878D82A}">
                     <a16:rowId xmlns:a16="http://schemas.microsoft.com/office/drawing/2014/main" val="193697292"/>
+                  </a:ext>
+                </a:extLst>
+              </a:tr>
+              <a:tr h="209559">
+                <a:tc>
+                  <a:txBody>
+                    <a:bodyPr/>
+                    <a:lstStyle/>
+                    <a:p>
+                      <a:pPr>
+                        <a:lnSpc>
+                          <a:spcPct val="107000"/>
+                        </a:lnSpc>
+                        <a:spcAft>
+                          <a:spcPts val="0"/>
+                        </a:spcAft>
+                      </a:pPr>
+                      <a:r>
+                        <a:rPr lang="fr-FR" sz="1100" dirty="0">
+                          <a:effectLst/>
+                          <a:latin typeface="Calibri" panose="020F0502020204030204" pitchFamily="34" charset="0"/>
+                          <a:ea typeface="Calibri" panose="020F0502020204030204" pitchFamily="34" charset="0"/>
+                          <a:cs typeface="Times New Roman" panose="02020603050405020304" pitchFamily="18" charset="0"/>
+                        </a:rPr>
+                        <a:t>Electricien</a:t>
+                      </a:r>
+                    </a:p>
+                  </a:txBody>
+                  <a:tcPr marL="67700" marR="67700" marT="0" marB="0"/>
+                </a:tc>
+                <a:tc>
+                  <a:txBody>
+                    <a:bodyPr/>
+                    <a:lstStyle/>
+                    <a:p>
+                      <a:pPr>
+                        <a:lnSpc>
+                          <a:spcPct val="107000"/>
+                        </a:lnSpc>
+                        <a:spcAft>
+                          <a:spcPts val="0"/>
+                        </a:spcAft>
+                      </a:pPr>
+                      <a:endParaRPr lang="fr-FR" sz="1100" dirty="0">
+                        <a:effectLst/>
+                        <a:latin typeface="Calibri" panose="020F0502020204030204" pitchFamily="34" charset="0"/>
+                        <a:ea typeface="Calibri" panose="020F0502020204030204" pitchFamily="34" charset="0"/>
+                        <a:cs typeface="Times New Roman" panose="02020603050405020304" pitchFamily="18" charset="0"/>
+                      </a:endParaRPr>
+                    </a:p>
+                  </a:txBody>
+                  <a:tcPr marL="67700" marR="67700" marT="0" marB="0"/>
+                </a:tc>
+                <a:tc>
+                  <a:txBody>
+                    <a:bodyPr/>
+                    <a:lstStyle/>
+                    <a:p>
+                      <a:pPr>
+                        <a:lnSpc>
+                          <a:spcPct val="107000"/>
+                        </a:lnSpc>
+                        <a:spcAft>
+                          <a:spcPts val="0"/>
+                        </a:spcAft>
+                      </a:pPr>
+                      <a:r>
+                        <a:rPr lang="fr-FR" sz="1100" dirty="0">
+                          <a:effectLst/>
+                        </a:rPr>
+                        <a:t>1 520€</a:t>
+                      </a:r>
+                      <a:endParaRPr lang="fr-FR" sz="1100" dirty="0">
+                        <a:effectLst/>
+                        <a:latin typeface="Calibri" panose="020F0502020204030204" pitchFamily="34" charset="0"/>
+                        <a:ea typeface="Calibri" panose="020F0502020204030204" pitchFamily="34" charset="0"/>
+                        <a:cs typeface="Times New Roman" panose="02020603050405020304" pitchFamily="18" charset="0"/>
+                      </a:endParaRPr>
+                    </a:p>
+                  </a:txBody>
+                  <a:tcPr marL="67700" marR="67700" marT="0" marB="0"/>
+                </a:tc>
+                <a:extLst>
+                  <a:ext uri="{0D108BD9-81ED-4DB2-BD59-A6C34878D82A}">
+                    <a16:rowId xmlns:a16="http://schemas.microsoft.com/office/drawing/2014/main" val="3731554717"/>
                   </a:ext>
                 </a:extLst>
               </a:tr>
@@ -16140,12 +16308,12 @@
                         </a:spcAft>
                       </a:pPr>
                       <a:r>
-                        <a:rPr lang="fr-FR" sz="1100">
+                        <a:rPr lang="fr-FR" sz="1100" dirty="0">
                           <a:effectLst/>
                         </a:rPr>
-                        <a:t> </a:t>
+                        <a:t> 0€</a:t>
                       </a:r>
-                      <a:endParaRPr lang="fr-FR" sz="1100">
+                      <a:endParaRPr lang="fr-FR" sz="1100" dirty="0">
                         <a:effectLst/>
                         <a:latin typeface="Calibri" panose="020F0502020204030204" pitchFamily="34" charset="0"/>
                         <a:ea typeface="Calibri" panose="020F0502020204030204" pitchFamily="34" charset="0"/>
@@ -16205,12 +16373,12 @@
                         </a:spcAft>
                       </a:pPr>
                       <a:r>
-                        <a:rPr lang="fr-FR" sz="1100">
+                        <a:rPr lang="fr-FR" sz="1100" dirty="0">
                           <a:effectLst/>
                         </a:rPr>
                         <a:t> </a:t>
                       </a:r>
-                      <a:endParaRPr lang="fr-FR" sz="1100">
+                      <a:endParaRPr lang="fr-FR" sz="1100" dirty="0">
                         <a:effectLst/>
                         <a:latin typeface="Calibri" panose="020F0502020204030204" pitchFamily="34" charset="0"/>
                         <a:ea typeface="Calibri" panose="020F0502020204030204" pitchFamily="34" charset="0"/>
@@ -16234,12 +16402,12 @@
                         </a:spcAft>
                       </a:pPr>
                       <a:r>
-                        <a:rPr lang="fr-FR" sz="1100">
+                        <a:rPr lang="fr-FR" sz="1100" dirty="0">
                           <a:effectLst/>
                         </a:rPr>
-                        <a:t> </a:t>
+                        <a:t> 20€</a:t>
                       </a:r>
-                      <a:endParaRPr lang="fr-FR" sz="1100">
+                      <a:endParaRPr lang="fr-FR" sz="1100" dirty="0">
                         <a:effectLst/>
                         <a:latin typeface="Calibri" panose="020F0502020204030204" pitchFamily="34" charset="0"/>
                         <a:ea typeface="Calibri" panose="020F0502020204030204" pitchFamily="34" charset="0"/>
@@ -16364,12 +16532,12 @@
                         </a:spcAft>
                       </a:pPr>
                       <a:r>
-                        <a:rPr lang="fr-FR" sz="1100">
+                        <a:rPr lang="fr-FR" sz="1100" dirty="0">
                           <a:effectLst/>
                         </a:rPr>
                         <a:t>Sponsor BDE Cesi</a:t>
                       </a:r>
-                      <a:endParaRPr lang="fr-FR" sz="1100">
+                      <a:endParaRPr lang="fr-FR" sz="1100" dirty="0">
                         <a:effectLst/>
                         <a:latin typeface="Calibri" panose="020F0502020204030204" pitchFamily="34" charset="0"/>
                         <a:ea typeface="Calibri" panose="020F0502020204030204" pitchFamily="34" charset="0"/>
@@ -16458,200 +16626,12 @@
                         </a:spcAft>
                       </a:pPr>
                       <a:r>
-                        <a:rPr lang="fr-FR" sz="1100">
-                          <a:effectLst/>
-                        </a:rPr>
-                        <a:t>Joueurs x500</a:t>
-                      </a:r>
-                      <a:endParaRPr lang="fr-FR" sz="1100">
-                        <a:effectLst/>
-                        <a:latin typeface="Calibri" panose="020F0502020204030204" pitchFamily="34" charset="0"/>
-                        <a:ea typeface="Calibri" panose="020F0502020204030204" pitchFamily="34" charset="0"/>
-                        <a:cs typeface="Times New Roman" panose="02020603050405020304" pitchFamily="18" charset="0"/>
-                      </a:endParaRPr>
-                    </a:p>
-                  </a:txBody>
-                  <a:tcPr marL="67700" marR="67700" marT="0" marB="0"/>
-                </a:tc>
-                <a:tc>
-                  <a:txBody>
-                    <a:bodyPr/>
-                    <a:lstStyle/>
-                    <a:p>
-                      <a:pPr>
-                        <a:lnSpc>
-                          <a:spcPct val="107000"/>
-                        </a:lnSpc>
-                        <a:spcAft>
-                          <a:spcPts val="0"/>
-                        </a:spcAft>
-                      </a:pPr>
-                      <a:r>
-                        <a:rPr lang="fr-FR" sz="1100">
-                          <a:effectLst/>
-                        </a:rPr>
-                        <a:t>12 500€</a:t>
-                      </a:r>
-                      <a:endParaRPr lang="fr-FR" sz="1100">
-                        <a:effectLst/>
-                        <a:latin typeface="Calibri" panose="020F0502020204030204" pitchFamily="34" charset="0"/>
-                        <a:ea typeface="Calibri" panose="020F0502020204030204" pitchFamily="34" charset="0"/>
-                        <a:cs typeface="Times New Roman" panose="02020603050405020304" pitchFamily="18" charset="0"/>
-                      </a:endParaRPr>
-                    </a:p>
-                  </a:txBody>
-                  <a:tcPr marL="67700" marR="67700" marT="0" marB="0"/>
-                </a:tc>
-                <a:tc>
-                  <a:txBody>
-                    <a:bodyPr/>
-                    <a:lstStyle/>
-                    <a:p>
-                      <a:pPr>
-                        <a:lnSpc>
-                          <a:spcPct val="107000"/>
-                        </a:lnSpc>
-                        <a:spcAft>
-                          <a:spcPts val="0"/>
-                        </a:spcAft>
-                      </a:pPr>
-                      <a:r>
-                        <a:rPr lang="fr-FR" sz="1100">
-                          <a:effectLst/>
-                        </a:rPr>
-                        <a:t> </a:t>
-                      </a:r>
-                      <a:endParaRPr lang="fr-FR" sz="1100">
-                        <a:effectLst/>
-                        <a:latin typeface="Calibri" panose="020F0502020204030204" pitchFamily="34" charset="0"/>
-                        <a:ea typeface="Calibri" panose="020F0502020204030204" pitchFamily="34" charset="0"/>
-                        <a:cs typeface="Times New Roman" panose="02020603050405020304" pitchFamily="18" charset="0"/>
-                      </a:endParaRPr>
-                    </a:p>
-                  </a:txBody>
-                  <a:tcPr marL="67700" marR="67700" marT="0" marB="0"/>
-                </a:tc>
-                <a:extLst>
-                  <a:ext uri="{0D108BD9-81ED-4DB2-BD59-A6C34878D82A}">
-                    <a16:rowId xmlns:a16="http://schemas.microsoft.com/office/drawing/2014/main" val="123231235"/>
-                  </a:ext>
-                </a:extLst>
-              </a:tr>
-              <a:tr h="209559">
-                <a:tc>
-                  <a:txBody>
-                    <a:bodyPr/>
-                    <a:lstStyle/>
-                    <a:p>
-                      <a:pPr>
-                        <a:lnSpc>
-                          <a:spcPct val="107000"/>
-                        </a:lnSpc>
-                        <a:spcAft>
-                          <a:spcPts val="0"/>
-                        </a:spcAft>
-                      </a:pPr>
-                      <a:r>
-                        <a:rPr lang="fr-FR" sz="1100">
-                          <a:effectLst/>
-                        </a:rPr>
-                        <a:t>Visiteurs (prévision 2500)</a:t>
-                      </a:r>
-                      <a:endParaRPr lang="fr-FR" sz="1100">
-                        <a:effectLst/>
-                        <a:latin typeface="Calibri" panose="020F0502020204030204" pitchFamily="34" charset="0"/>
-                        <a:ea typeface="Calibri" panose="020F0502020204030204" pitchFamily="34" charset="0"/>
-                        <a:cs typeface="Times New Roman" panose="02020603050405020304" pitchFamily="18" charset="0"/>
-                      </a:endParaRPr>
-                    </a:p>
-                  </a:txBody>
-                  <a:tcPr marL="67700" marR="67700" marT="0" marB="0"/>
-                </a:tc>
-                <a:tc>
-                  <a:txBody>
-                    <a:bodyPr/>
-                    <a:lstStyle/>
-                    <a:p>
-                      <a:pPr>
-                        <a:lnSpc>
-                          <a:spcPct val="107000"/>
-                        </a:lnSpc>
-                        <a:spcAft>
-                          <a:spcPts val="0"/>
-                        </a:spcAft>
-                      </a:pPr>
-                      <a:r>
-                        <a:rPr lang="fr-FR" sz="1100">
-                          <a:effectLst/>
-                        </a:rPr>
-                        <a:t>25 000€</a:t>
-                      </a:r>
-                      <a:endParaRPr lang="fr-FR" sz="1100">
-                        <a:effectLst/>
-                        <a:latin typeface="Calibri" panose="020F0502020204030204" pitchFamily="34" charset="0"/>
-                        <a:ea typeface="Calibri" panose="020F0502020204030204" pitchFamily="34" charset="0"/>
-                        <a:cs typeface="Times New Roman" panose="02020603050405020304" pitchFamily="18" charset="0"/>
-                      </a:endParaRPr>
-                    </a:p>
-                  </a:txBody>
-                  <a:tcPr marL="67700" marR="67700" marT="0" marB="0"/>
-                </a:tc>
-                <a:tc>
-                  <a:txBody>
-                    <a:bodyPr/>
-                    <a:lstStyle/>
-                    <a:p>
-                      <a:pPr>
-                        <a:lnSpc>
-                          <a:spcPct val="107000"/>
-                        </a:lnSpc>
-                        <a:spcAft>
-                          <a:spcPts val="0"/>
-                        </a:spcAft>
-                      </a:pPr>
-                      <a:r>
-                        <a:rPr lang="fr-FR" sz="1100">
-                          <a:effectLst/>
-                        </a:rPr>
-                        <a:t> </a:t>
-                      </a:r>
-                      <a:endParaRPr lang="fr-FR" sz="1100">
-                        <a:effectLst/>
-                        <a:latin typeface="Calibri" panose="020F0502020204030204" pitchFamily="34" charset="0"/>
-                        <a:ea typeface="Calibri" panose="020F0502020204030204" pitchFamily="34" charset="0"/>
-                        <a:cs typeface="Times New Roman" panose="02020603050405020304" pitchFamily="18" charset="0"/>
-                      </a:endParaRPr>
-                    </a:p>
-                  </a:txBody>
-                  <a:tcPr marL="67700" marR="67700" marT="0" marB="0"/>
-                </a:tc>
-                <a:extLst>
-                  <a:ext uri="{0D108BD9-81ED-4DB2-BD59-A6C34878D82A}">
-                    <a16:rowId xmlns:a16="http://schemas.microsoft.com/office/drawing/2014/main" val="2239044916"/>
-                  </a:ext>
-                </a:extLst>
-              </a:tr>
-              <a:tr h="209559">
-                <a:tc>
-                  <a:txBody>
-                    <a:bodyPr/>
-                    <a:lstStyle/>
-                    <a:p>
-                      <a:pPr>
-                        <a:lnSpc>
-                          <a:spcPct val="107000"/>
-                        </a:lnSpc>
-                        <a:spcAft>
-                          <a:spcPts val="0"/>
-                        </a:spcAft>
-                      </a:pPr>
-                      <a:r>
-                        <a:rPr lang="fr-FR" sz="1100">
+                        <a:rPr lang="fr-FR" sz="1100" dirty="0">
                           <a:effectLst/>
                         </a:rPr>
                         <a:t>Autres sponsors</a:t>
                       </a:r>
-                      <a:endParaRPr lang="fr-FR" sz="1100">
+                      <a:endParaRPr lang="fr-FR" sz="1100" dirty="0">
                         <a:effectLst/>
                         <a:latin typeface="Calibri" panose="020F0502020204030204" pitchFamily="34" charset="0"/>
                         <a:ea typeface="Calibri" panose="020F0502020204030204" pitchFamily="34" charset="0"/>
@@ -16704,12 +16684,12 @@
                         </a:spcAft>
                       </a:pPr>
                       <a:r>
-                        <a:rPr lang="fr-FR" sz="1100">
+                        <a:rPr lang="fr-FR" sz="1100" dirty="0">
                           <a:effectLst/>
                         </a:rPr>
                         <a:t> </a:t>
                       </a:r>
-                      <a:endParaRPr lang="fr-FR" sz="1100">
+                      <a:endParaRPr lang="fr-FR" sz="1100" dirty="0">
                         <a:effectLst/>
                         <a:latin typeface="Calibri" panose="020F0502020204030204" pitchFamily="34" charset="0"/>
                         <a:ea typeface="Calibri" panose="020F0502020204030204" pitchFamily="34" charset="0"/>
@@ -16721,7 +16701,171 @@
                 </a:tc>
                 <a:extLst>
                   <a:ext uri="{0D108BD9-81ED-4DB2-BD59-A6C34878D82A}">
-                    <a16:rowId xmlns:a16="http://schemas.microsoft.com/office/drawing/2014/main" val="1887706455"/>
+                    <a16:rowId xmlns:a16="http://schemas.microsoft.com/office/drawing/2014/main" val="2335864862"/>
+                  </a:ext>
+                </a:extLst>
+              </a:tr>
+              <a:tr h="209559">
+                <a:tc>
+                  <a:txBody>
+                    <a:bodyPr/>
+                    <a:lstStyle/>
+                    <a:p>
+                      <a:pPr>
+                        <a:lnSpc>
+                          <a:spcPct val="107000"/>
+                        </a:lnSpc>
+                        <a:spcAft>
+                          <a:spcPts val="0"/>
+                        </a:spcAft>
+                      </a:pPr>
+                      <a:r>
+                        <a:rPr lang="fr-FR" sz="1100" dirty="0">
+                          <a:effectLst/>
+                          <a:latin typeface="Calibri" panose="020F0502020204030204" pitchFamily="34" charset="0"/>
+                          <a:ea typeface="Calibri" panose="020F0502020204030204" pitchFamily="34" charset="0"/>
+                          <a:cs typeface="Times New Roman" panose="02020603050405020304" pitchFamily="18" charset="0"/>
+                        </a:rPr>
+                        <a:t>Buvette</a:t>
+                      </a:r>
+                    </a:p>
+                  </a:txBody>
+                  <a:tcPr marL="67700" marR="67700" marT="0" marB="0"/>
+                </a:tc>
+                <a:tc>
+                  <a:txBody>
+                    <a:bodyPr/>
+                    <a:lstStyle/>
+                    <a:p>
+                      <a:pPr>
+                        <a:lnSpc>
+                          <a:spcPct val="107000"/>
+                        </a:lnSpc>
+                        <a:spcAft>
+                          <a:spcPts val="0"/>
+                        </a:spcAft>
+                      </a:pPr>
+                      <a:r>
+                        <a:rPr lang="fr-FR" sz="1100" dirty="0">
+                          <a:effectLst/>
+                          <a:latin typeface="Calibri" panose="020F0502020204030204" pitchFamily="34" charset="0"/>
+                          <a:ea typeface="Calibri" panose="020F0502020204030204" pitchFamily="34" charset="0"/>
+                          <a:cs typeface="Times New Roman" panose="02020603050405020304" pitchFamily="18" charset="0"/>
+                        </a:rPr>
+                        <a:t>7 500€</a:t>
+                      </a:r>
+                    </a:p>
+                  </a:txBody>
+                  <a:tcPr marL="67700" marR="67700" marT="0" marB="0"/>
+                </a:tc>
+                <a:tc>
+                  <a:txBody>
+                    <a:bodyPr/>
+                    <a:lstStyle/>
+                    <a:p>
+                      <a:pPr>
+                        <a:lnSpc>
+                          <a:spcPct val="107000"/>
+                        </a:lnSpc>
+                        <a:spcAft>
+                          <a:spcPts val="0"/>
+                        </a:spcAft>
+                      </a:pPr>
+                      <a:endParaRPr lang="fr-FR" sz="1100" dirty="0">
+                        <a:effectLst/>
+                        <a:latin typeface="Calibri" panose="020F0502020204030204" pitchFamily="34" charset="0"/>
+                        <a:ea typeface="Calibri" panose="020F0502020204030204" pitchFamily="34" charset="0"/>
+                        <a:cs typeface="Times New Roman" panose="02020603050405020304" pitchFamily="18" charset="0"/>
+                      </a:endParaRPr>
+                    </a:p>
+                  </a:txBody>
+                  <a:tcPr marL="67700" marR="67700" marT="0" marB="0"/>
+                </a:tc>
+                <a:extLst>
+                  <a:ext uri="{0D108BD9-81ED-4DB2-BD59-A6C34878D82A}">
+                    <a16:rowId xmlns:a16="http://schemas.microsoft.com/office/drawing/2014/main" val="2247653228"/>
+                  </a:ext>
+                </a:extLst>
+              </a:tr>
+              <a:tr h="209559">
+                <a:tc>
+                  <a:txBody>
+                    <a:bodyPr/>
+                    <a:lstStyle/>
+                    <a:p>
+                      <a:pPr>
+                        <a:lnSpc>
+                          <a:spcPct val="107000"/>
+                        </a:lnSpc>
+                        <a:spcAft>
+                          <a:spcPts val="0"/>
+                        </a:spcAft>
+                      </a:pPr>
+                      <a:r>
+                        <a:rPr lang="fr-FR" sz="1100" dirty="0">
+                          <a:effectLst/>
+                          <a:latin typeface="Calibri" panose="020F0502020204030204" pitchFamily="34" charset="0"/>
+                          <a:ea typeface="Calibri" panose="020F0502020204030204" pitchFamily="34" charset="0"/>
+                          <a:cs typeface="Times New Roman" panose="02020603050405020304" pitchFamily="18" charset="0"/>
+                        </a:rPr>
+                        <a:t>Traiteur</a:t>
+                      </a:r>
+                    </a:p>
+                  </a:txBody>
+                  <a:tcPr marL="67700" marR="67700" marT="0" marB="0"/>
+                </a:tc>
+                <a:tc>
+                  <a:txBody>
+                    <a:bodyPr/>
+                    <a:lstStyle/>
+                    <a:p>
+                      <a:pPr>
+                        <a:lnSpc>
+                          <a:spcPct val="107000"/>
+                        </a:lnSpc>
+                        <a:spcAft>
+                          <a:spcPts val="0"/>
+                        </a:spcAft>
+                      </a:pPr>
+                      <a:r>
+                        <a:rPr lang="fr-FR" sz="1100" dirty="0">
+                          <a:effectLst/>
+                          <a:latin typeface="Calibri" panose="020F0502020204030204" pitchFamily="34" charset="0"/>
+                          <a:ea typeface="Calibri" panose="020F0502020204030204" pitchFamily="34" charset="0"/>
+                          <a:cs typeface="Times New Roman" panose="02020603050405020304" pitchFamily="18" charset="0"/>
+                        </a:rPr>
+                        <a:t>1 500€</a:t>
+                      </a:r>
+                    </a:p>
+                  </a:txBody>
+                  <a:tcPr marL="67700" marR="67700" marT="0" marB="0"/>
+                </a:tc>
+                <a:tc>
+                  <a:txBody>
+                    <a:bodyPr/>
+                    <a:lstStyle/>
+                    <a:p>
+                      <a:pPr>
+                        <a:lnSpc>
+                          <a:spcPct val="107000"/>
+                        </a:lnSpc>
+                        <a:spcAft>
+                          <a:spcPts val="0"/>
+                        </a:spcAft>
+                      </a:pPr>
+                      <a:endParaRPr lang="fr-FR" sz="1100" dirty="0">
+                        <a:effectLst/>
+                        <a:latin typeface="Calibri" panose="020F0502020204030204" pitchFamily="34" charset="0"/>
+                        <a:ea typeface="Calibri" panose="020F0502020204030204" pitchFamily="34" charset="0"/>
+                        <a:cs typeface="Times New Roman" panose="02020603050405020304" pitchFamily="18" charset="0"/>
+                      </a:endParaRPr>
+                    </a:p>
+                  </a:txBody>
+                  <a:tcPr marL="67700" marR="67700" marT="0" marB="0"/>
+                </a:tc>
+                <a:extLst>
+                  <a:ext uri="{0D108BD9-81ED-4DB2-BD59-A6C34878D82A}">
+                    <a16:rowId xmlns:a16="http://schemas.microsoft.com/office/drawing/2014/main" val="3597276703"/>
                   </a:ext>
                 </a:extLst>
               </a:tr>
@@ -16743,36 +16887,7 @@
                         <a:rPr lang="fr-FR" sz="1100">
                           <a:effectLst/>
                         </a:rPr>
-                        <a:t>Total</a:t>
-                      </a:r>
-                      <a:endParaRPr lang="fr-FR" sz="1100">
-                        <a:effectLst/>
-                        <a:latin typeface="Calibri" panose="020F0502020204030204" pitchFamily="34" charset="0"/>
-                        <a:ea typeface="Calibri" panose="020F0502020204030204" pitchFamily="34" charset="0"/>
-                        <a:cs typeface="Times New Roman" panose="02020603050405020304" pitchFamily="18" charset="0"/>
-                      </a:endParaRPr>
-                    </a:p>
-                  </a:txBody>
-                  <a:tcPr marL="67700" marR="67700" marT="0" marB="0"/>
-                </a:tc>
-                <a:tc>
-                  <a:txBody>
-                    <a:bodyPr/>
-                    <a:lstStyle/>
-                    <a:p>
-                      <a:pPr>
-                        <a:lnSpc>
-                          <a:spcPct val="107000"/>
-                        </a:lnSpc>
-                        <a:spcAft>
-                          <a:spcPts val="0"/>
-                        </a:spcAft>
-                      </a:pPr>
-                      <a:r>
-                        <a:rPr lang="fr-FR" sz="1100">
-                          <a:effectLst/>
-                        </a:rPr>
-                        <a:t>41 000€</a:t>
+                        <a:t>Joueurs x500</a:t>
                       </a:r>
                       <a:endParaRPr lang="fr-FR" sz="1100">
                         <a:effectLst/>
@@ -16801,7 +16916,7 @@
                         <a:rPr lang="fr-FR" sz="1100" dirty="0">
                           <a:effectLst/>
                         </a:rPr>
-                        <a:t>41 990.22€</a:t>
+                        <a:t>12 500€</a:t>
                       </a:r>
                       <a:endParaRPr lang="fr-FR" sz="1100" dirty="0">
                         <a:effectLst/>
@@ -16809,6 +16924,220 @@
                         <a:ea typeface="Calibri" panose="020F0502020204030204" pitchFamily="34" charset="0"/>
                         <a:cs typeface="Times New Roman" panose="02020603050405020304" pitchFamily="18" charset="0"/>
                       </a:endParaRPr>
+                    </a:p>
+                  </a:txBody>
+                  <a:tcPr marL="67700" marR="67700" marT="0" marB="0"/>
+                </a:tc>
+                <a:tc>
+                  <a:txBody>
+                    <a:bodyPr/>
+                    <a:lstStyle/>
+                    <a:p>
+                      <a:pPr>
+                        <a:lnSpc>
+                          <a:spcPct val="107000"/>
+                        </a:lnSpc>
+                        <a:spcAft>
+                          <a:spcPts val="0"/>
+                        </a:spcAft>
+                      </a:pPr>
+                      <a:r>
+                        <a:rPr lang="fr-FR" sz="1100" dirty="0">
+                          <a:effectLst/>
+                        </a:rPr>
+                        <a:t> </a:t>
+                      </a:r>
+                      <a:endParaRPr lang="fr-FR" sz="1100" dirty="0">
+                        <a:effectLst/>
+                        <a:latin typeface="Calibri" panose="020F0502020204030204" pitchFamily="34" charset="0"/>
+                        <a:ea typeface="Calibri" panose="020F0502020204030204" pitchFamily="34" charset="0"/>
+                        <a:cs typeface="Times New Roman" panose="02020603050405020304" pitchFamily="18" charset="0"/>
+                      </a:endParaRPr>
+                    </a:p>
+                  </a:txBody>
+                  <a:tcPr marL="67700" marR="67700" marT="0" marB="0"/>
+                </a:tc>
+                <a:extLst>
+                  <a:ext uri="{0D108BD9-81ED-4DB2-BD59-A6C34878D82A}">
+                    <a16:rowId xmlns:a16="http://schemas.microsoft.com/office/drawing/2014/main" val="123231235"/>
+                  </a:ext>
+                </a:extLst>
+              </a:tr>
+              <a:tr h="209559">
+                <a:tc>
+                  <a:txBody>
+                    <a:bodyPr/>
+                    <a:lstStyle/>
+                    <a:p>
+                      <a:pPr>
+                        <a:lnSpc>
+                          <a:spcPct val="107000"/>
+                        </a:lnSpc>
+                        <a:spcAft>
+                          <a:spcPts val="0"/>
+                        </a:spcAft>
+                      </a:pPr>
+                      <a:r>
+                        <a:rPr lang="fr-FR" sz="1100" dirty="0">
+                          <a:effectLst/>
+                        </a:rPr>
+                        <a:t>Visiteurs (prévision 15 000)</a:t>
+                      </a:r>
+                      <a:endParaRPr lang="fr-FR" sz="1100" dirty="0">
+                        <a:effectLst/>
+                        <a:latin typeface="Calibri" panose="020F0502020204030204" pitchFamily="34" charset="0"/>
+                        <a:ea typeface="Calibri" panose="020F0502020204030204" pitchFamily="34" charset="0"/>
+                        <a:cs typeface="Times New Roman" panose="02020603050405020304" pitchFamily="18" charset="0"/>
+                      </a:endParaRPr>
+                    </a:p>
+                  </a:txBody>
+                  <a:tcPr marL="67700" marR="67700" marT="0" marB="0"/>
+                </a:tc>
+                <a:tc>
+                  <a:txBody>
+                    <a:bodyPr/>
+                    <a:lstStyle/>
+                    <a:p>
+                      <a:pPr>
+                        <a:lnSpc>
+                          <a:spcPct val="107000"/>
+                        </a:lnSpc>
+                        <a:spcAft>
+                          <a:spcPts val="0"/>
+                        </a:spcAft>
+                      </a:pPr>
+                      <a:r>
+                        <a:rPr lang="fr-FR" sz="1100" dirty="0">
+                          <a:effectLst/>
+                        </a:rPr>
+                        <a:t>75 000€</a:t>
+                      </a:r>
+                      <a:endParaRPr lang="fr-FR" sz="1100" dirty="0">
+                        <a:effectLst/>
+                        <a:latin typeface="Calibri" panose="020F0502020204030204" pitchFamily="34" charset="0"/>
+                        <a:ea typeface="Calibri" panose="020F0502020204030204" pitchFamily="34" charset="0"/>
+                        <a:cs typeface="Times New Roman" panose="02020603050405020304" pitchFamily="18" charset="0"/>
+                      </a:endParaRPr>
+                    </a:p>
+                  </a:txBody>
+                  <a:tcPr marL="67700" marR="67700" marT="0" marB="0"/>
+                </a:tc>
+                <a:tc>
+                  <a:txBody>
+                    <a:bodyPr/>
+                    <a:lstStyle/>
+                    <a:p>
+                      <a:pPr>
+                        <a:lnSpc>
+                          <a:spcPct val="107000"/>
+                        </a:lnSpc>
+                        <a:spcAft>
+                          <a:spcPts val="0"/>
+                        </a:spcAft>
+                      </a:pPr>
+                      <a:r>
+                        <a:rPr lang="fr-FR" sz="1100" dirty="0">
+                          <a:effectLst/>
+                        </a:rPr>
+                        <a:t> </a:t>
+                      </a:r>
+                      <a:endParaRPr lang="fr-FR" sz="1100" dirty="0">
+                        <a:effectLst/>
+                        <a:latin typeface="Calibri" panose="020F0502020204030204" pitchFamily="34" charset="0"/>
+                        <a:ea typeface="Calibri" panose="020F0502020204030204" pitchFamily="34" charset="0"/>
+                        <a:cs typeface="Times New Roman" panose="02020603050405020304" pitchFamily="18" charset="0"/>
+                      </a:endParaRPr>
+                    </a:p>
+                  </a:txBody>
+                  <a:tcPr marL="67700" marR="67700" marT="0" marB="0"/>
+                </a:tc>
+                <a:extLst>
+                  <a:ext uri="{0D108BD9-81ED-4DB2-BD59-A6C34878D82A}">
+                    <a16:rowId xmlns:a16="http://schemas.microsoft.com/office/drawing/2014/main" val="2239044916"/>
+                  </a:ext>
+                </a:extLst>
+              </a:tr>
+              <a:tr h="209559">
+                <a:tc>
+                  <a:txBody>
+                    <a:bodyPr/>
+                    <a:lstStyle/>
+                    <a:p>
+                      <a:pPr>
+                        <a:lnSpc>
+                          <a:spcPct val="107000"/>
+                        </a:lnSpc>
+                        <a:spcAft>
+                          <a:spcPts val="0"/>
+                        </a:spcAft>
+                      </a:pPr>
+                      <a:r>
+                        <a:rPr lang="fr-FR" sz="1100" dirty="0">
+                          <a:effectLst/>
+                        </a:rPr>
+                        <a:t>Total</a:t>
+                      </a:r>
+                      <a:endParaRPr lang="fr-FR" sz="1100" dirty="0">
+                        <a:effectLst/>
+                        <a:latin typeface="Calibri" panose="020F0502020204030204" pitchFamily="34" charset="0"/>
+                        <a:ea typeface="Calibri" panose="020F0502020204030204" pitchFamily="34" charset="0"/>
+                        <a:cs typeface="Times New Roman" panose="02020603050405020304" pitchFamily="18" charset="0"/>
+                      </a:endParaRPr>
+                    </a:p>
+                  </a:txBody>
+                  <a:tcPr marL="67700" marR="67700" marT="0" marB="0"/>
+                </a:tc>
+                <a:tc>
+                  <a:txBody>
+                    <a:bodyPr/>
+                    <a:lstStyle/>
+                    <a:p>
+                      <a:pPr>
+                        <a:lnSpc>
+                          <a:spcPct val="107000"/>
+                        </a:lnSpc>
+                        <a:spcAft>
+                          <a:spcPts val="0"/>
+                        </a:spcAft>
+                      </a:pPr>
+                      <a:r>
+                        <a:rPr lang="fr-FR" sz="1100" b="1" dirty="0">
+                          <a:effectLst/>
+                        </a:rPr>
+                        <a:t>89 000€</a:t>
+                      </a:r>
+                      <a:endParaRPr lang="fr-FR" sz="1100" b="1" dirty="0">
+                        <a:effectLst/>
+                        <a:latin typeface="Calibri" panose="020F0502020204030204" pitchFamily="34" charset="0"/>
+                        <a:ea typeface="Calibri" panose="020F0502020204030204" pitchFamily="34" charset="0"/>
+                        <a:cs typeface="Times New Roman" panose="02020603050405020304" pitchFamily="18" charset="0"/>
+                      </a:endParaRPr>
+                    </a:p>
+                  </a:txBody>
+                  <a:tcPr marL="67700" marR="67700" marT="0" marB="0"/>
+                </a:tc>
+                <a:tc>
+                  <a:txBody>
+                    <a:bodyPr/>
+                    <a:lstStyle/>
+                    <a:p>
+                      <a:pPr>
+                        <a:lnSpc>
+                          <a:spcPct val="107000"/>
+                        </a:lnSpc>
+                        <a:spcAft>
+                          <a:spcPts val="0"/>
+                        </a:spcAft>
+                      </a:pPr>
+                      <a:r>
+                        <a:rPr lang="fr-FR" sz="1100" b="1" dirty="0">
+                          <a:effectLst/>
+                          <a:latin typeface="Calibri" panose="020F0502020204030204" pitchFamily="34" charset="0"/>
+                          <a:ea typeface="Calibri" panose="020F0502020204030204" pitchFamily="34" charset="0"/>
+                          <a:cs typeface="Times New Roman" panose="02020603050405020304" pitchFamily="18" charset="0"/>
+                        </a:rPr>
+                        <a:t>51 178,22€</a:t>
+                      </a:r>
                     </a:p>
                   </a:txBody>
                   <a:tcPr marL="67700" marR="67700" marT="0" marB="0"/>
@@ -16858,7 +17187,7 @@
           <p:cNvPr id="2" name="Titre 1">
             <a:extLst>
               <a:ext uri="{FF2B5EF4-FFF2-40B4-BE49-F238E27FC236}">
-                <a16:creationId xmlns:a16="http://schemas.microsoft.com/office/drawing/2014/main" id="{6E443BF5-2960-4F2C-98D5-C1B838AD5EB8}"/>
+                <a16:creationId xmlns:a16="http://schemas.microsoft.com/office/drawing/2014/main" id="{188EB089-17DC-4EA7-9AED-E510A54E8FF4}"/>
               </a:ext>
             </a:extLst>
           </p:cNvPr>
@@ -16881,7 +17210,7 @@
                   <a:schemeClr val="bg1"/>
                 </a:solidFill>
               </a:rPr>
-              <a:t>Organisation du réseau</a:t>
+              <a:t>électricité</a:t>
             </a:r>
           </a:p>
         </p:txBody>
@@ -16891,7 +17220,7 @@
           <p:cNvPr id="3" name="Espace réservé du contenu 2">
             <a:extLst>
               <a:ext uri="{FF2B5EF4-FFF2-40B4-BE49-F238E27FC236}">
-                <a16:creationId xmlns:a16="http://schemas.microsoft.com/office/drawing/2014/main" id="{46E85608-910C-44C9-8CB8-5BC8748E1D13}"/>
+                <a16:creationId xmlns:a16="http://schemas.microsoft.com/office/drawing/2014/main" id="{B20601E7-FD0C-41D2-9B33-5F7DAC538157}"/>
               </a:ext>
             </a:extLst>
           </p:cNvPr>
@@ -16907,7 +17236,249 @@
           <a:bodyPr/>
           <a:lstStyle/>
           <a:p>
+            <a:r>
+              <a:rPr lang="fr-FR" dirty="0"/>
+              <a:t>Multiprises (avec </a:t>
+            </a:r>
+            <a:r>
+              <a:rPr lang="fr-FR"/>
+              <a:t>du RAB)</a:t>
+            </a:r>
             <a:endParaRPr lang="fr-FR" dirty="0"/>
+          </a:p>
+          <a:p>
+            <a:pPr lvl="1"/>
+            <a:r>
+              <a:rPr lang="fr-FR" dirty="0"/>
+              <a:t>120 blocs de 8</a:t>
+            </a:r>
+          </a:p>
+          <a:p>
+            <a:pPr lvl="1"/>
+            <a:r>
+              <a:rPr lang="fr-FR" dirty="0"/>
+              <a:t>50 blocs de 6</a:t>
+            </a:r>
+          </a:p>
+          <a:p>
+            <a:pPr lvl="1"/>
+            <a:r>
+              <a:rPr lang="fr-FR" dirty="0"/>
+              <a:t>2600 ampères avec rab</a:t>
+            </a:r>
+          </a:p>
+        </p:txBody>
+      </p:sp>
+    </p:spTree>
+    <p:extLst>
+      <p:ext uri="{BB962C8B-B14F-4D97-AF65-F5344CB8AC3E}">
+        <p14:creationId xmlns:p14="http://schemas.microsoft.com/office/powerpoint/2010/main" val="1343923961"/>
+      </p:ext>
+    </p:extLst>
+  </p:cSld>
+  <p:clrMapOvr>
+    <a:masterClrMapping/>
+  </p:clrMapOvr>
+</p:sld>
+</file>
+
+<file path=ppt/slides/slide16.xml><?xml version="1.0" encoding="utf-8"?>
+<p:sld xmlns:a="http://schemas.openxmlformats.org/drawingml/2006/main" xmlns:r="http://schemas.openxmlformats.org/officeDocument/2006/relationships" xmlns:p="http://schemas.openxmlformats.org/presentationml/2006/main">
+  <p:cSld>
+    <p:bg>
+      <p:bgPr>
+        <a:blipFill>
+          <a:blip r:embed="rId2">
+            <a:duotone>
+              <a:schemeClr val="bg2">
+                <a:shade val="88000"/>
+                <a:hueMod val="106000"/>
+                <a:satMod val="140000"/>
+                <a:lumMod val="54000"/>
+              </a:schemeClr>
+              <a:schemeClr val="bg2">
+                <a:tint val="98000"/>
+                <a:hueMod val="90000"/>
+                <a:satMod val="150000"/>
+                <a:lumMod val="160000"/>
+              </a:schemeClr>
+            </a:duotone>
+            <a:extLst/>
+          </a:blip>
+          <a:stretch/>
+        </a:blipFill>
+        <a:effectLst/>
+      </p:bgPr>
+    </p:bg>
+    <p:spTree>
+      <p:nvGrpSpPr>
+        <p:cNvPr id="1" name=""/>
+        <p:cNvGrpSpPr/>
+        <p:nvPr/>
+      </p:nvGrpSpPr>
+      <p:grpSpPr>
+        <a:xfrm>
+          <a:off x="0" y="0"/>
+          <a:ext cx="0" cy="0"/>
+          <a:chOff x="0" y="0"/>
+          <a:chExt cx="0" cy="0"/>
+        </a:xfrm>
+      </p:grpSpPr>
+      <p:pic>
+        <p:nvPicPr>
+          <p:cNvPr id="1029" name="Picture 2" descr="https://media.discordapp.net/attachments/391981384178335757/392960446782504960/sh_nbr_switch.png">
+            <a:extLst>
+              <a:ext uri="{FF2B5EF4-FFF2-40B4-BE49-F238E27FC236}">
+                <a16:creationId xmlns:a16="http://schemas.microsoft.com/office/drawing/2014/main" id="{9B73F639-18E3-4CE4-A52A-F545A27D7B64}"/>
+              </a:ext>
+            </a:extLst>
+          </p:cNvPr>
+          <p:cNvPicPr>
+            <a:picLocks noChangeAspect="1" noChangeArrowheads="1"/>
+          </p:cNvPicPr>
+          <p:nvPr/>
+        </p:nvPicPr>
+        <p:blipFill>
+          <a:blip r:embed="rId3">
+            <a:extLst>
+              <a:ext uri="{28A0092B-C50C-407E-A947-70E740481C1C}">
+                <a14:useLocalDpi xmlns:a14="http://schemas.microsoft.com/office/drawing/2010/main" val="0"/>
+              </a:ext>
+            </a:extLst>
+          </a:blip>
+          <a:srcRect/>
+          <a:stretch>
+            <a:fillRect/>
+          </a:stretch>
+        </p:blipFill>
+        <p:spPr bwMode="auto">
+          <a:xfrm>
+            <a:off x="1141411" y="2512034"/>
+            <a:ext cx="4689234" cy="3024555"/>
+          </a:xfrm>
+          <a:prstGeom prst="round2DiagRect">
+            <a:avLst>
+              <a:gd name="adj1" fmla="val 5608"/>
+              <a:gd name="adj2" fmla="val 0"/>
+            </a:avLst>
+          </a:prstGeom>
+          <a:noFill/>
+          <a:ln w="19050" cap="sq">
+            <a:solidFill>
+              <a:schemeClr val="tx2">
+                <a:lumMod val="60000"/>
+                <a:lumOff val="40000"/>
+                <a:alpha val="60000"/>
+              </a:schemeClr>
+            </a:solidFill>
+            <a:miter lim="800000"/>
+          </a:ln>
+          <a:effectLst>
+            <a:outerShdw blurRad="88900" dist="38100" dir="5400000" algn="t" rotWithShape="0">
+              <a:prstClr val="black">
+                <a:alpha val="40000"/>
+              </a:prstClr>
+            </a:outerShdw>
+          </a:effectLst>
+          <a:extLst>
+            <a:ext uri="{909E8E84-426E-40DD-AFC4-6F175D3DCCD1}">
+              <a14:hiddenFill xmlns:a14="http://schemas.microsoft.com/office/drawing/2010/main">
+                <a:solidFill>
+                  <a:srgbClr val="FFFFFF"/>
+                </a:solidFill>
+              </a14:hiddenFill>
+            </a:ext>
+          </a:extLst>
+        </p:spPr>
+      </p:pic>
+      <p:sp>
+        <p:nvSpPr>
+          <p:cNvPr id="2" name="Titre 1">
+            <a:extLst>
+              <a:ext uri="{FF2B5EF4-FFF2-40B4-BE49-F238E27FC236}">
+                <a16:creationId xmlns:a16="http://schemas.microsoft.com/office/drawing/2014/main" id="{6E443BF5-2960-4F2C-98D5-C1B838AD5EB8}"/>
+              </a:ext>
+            </a:extLst>
+          </p:cNvPr>
+          <p:cNvSpPr>
+            <a:spLocks noGrp="1"/>
+          </p:cNvSpPr>
+          <p:nvPr>
+            <p:ph type="title"/>
+          </p:nvPr>
+        </p:nvSpPr>
+        <p:spPr>
+          <a:xfrm>
+            <a:off x="1141413" y="618518"/>
+            <a:ext cx="9905998" cy="1478570"/>
+          </a:xfrm>
+        </p:spPr>
+        <p:txBody>
+          <a:bodyPr>
+            <a:normAutofit/>
+          </a:bodyPr>
+          <a:lstStyle/>
+          <a:p>
+            <a:r>
+              <a:rPr lang="fr-FR" dirty="0"/>
+              <a:t>Organisation du réseau</a:t>
+            </a:r>
+          </a:p>
+        </p:txBody>
+      </p:sp>
+      <p:sp>
+        <p:nvSpPr>
+          <p:cNvPr id="1031" name="Content Placeholder 1030"/>
+          <p:cNvSpPr>
+            <a:spLocks noGrp="1"/>
+          </p:cNvSpPr>
+          <p:nvPr>
+            <p:ph idx="1"/>
+          </p:nvPr>
+        </p:nvSpPr>
+        <p:spPr>
+          <a:xfrm>
+            <a:off x="6336727" y="2249487"/>
+            <a:ext cx="4710683" cy="3541714"/>
+          </a:xfrm>
+        </p:spPr>
+        <p:txBody>
+          <a:bodyPr>
+            <a:normAutofit/>
+          </a:bodyPr>
+          <a:lstStyle/>
+          <a:p>
+            <a:r>
+              <a:rPr lang="en-US" dirty="0"/>
+              <a:t>1 switch pour 2 tables </a:t>
+            </a:r>
+            <a:r>
+              <a:rPr lang="en-US" dirty="0" err="1"/>
+              <a:t>soit</a:t>
+            </a:r>
+            <a:r>
+              <a:rPr lang="en-US" dirty="0"/>
+              <a:t> 31 </a:t>
+            </a:r>
+            <a:r>
+              <a:rPr lang="en-US" dirty="0" err="1"/>
+              <a:t>switchs</a:t>
+            </a:r>
+            <a:endParaRPr lang="en-US" dirty="0"/>
+          </a:p>
+          <a:p>
+            <a:r>
+              <a:rPr lang="en-US" dirty="0"/>
+              <a:t>1km de </a:t>
+            </a:r>
+            <a:r>
+              <a:rPr lang="en-US" dirty="0" err="1"/>
+              <a:t>câble</a:t>
+            </a:r>
+            <a:r>
+              <a:rPr lang="en-US" dirty="0"/>
+              <a:t> FFTP</a:t>
+            </a:r>
           </a:p>
         </p:txBody>
       </p:sp>
@@ -16927,6 +17498,31 @@
 <file path=ppt/slides/slide2.xml><?xml version="1.0" encoding="utf-8"?>
 <p:sld xmlns:a="http://schemas.openxmlformats.org/drawingml/2006/main" xmlns:r="http://schemas.openxmlformats.org/officeDocument/2006/relationships" xmlns:p="http://schemas.openxmlformats.org/presentationml/2006/main">
   <p:cSld>
+    <p:bg>
+      <p:bgPr>
+        <a:blipFill>
+          <a:blip r:embed="rId2">
+            <a:duotone>
+              <a:schemeClr val="bg2">
+                <a:shade val="88000"/>
+                <a:hueMod val="106000"/>
+                <a:satMod val="140000"/>
+                <a:lumMod val="54000"/>
+              </a:schemeClr>
+              <a:schemeClr val="bg2">
+                <a:tint val="98000"/>
+                <a:hueMod val="90000"/>
+                <a:satMod val="150000"/>
+                <a:lumMod val="160000"/>
+              </a:schemeClr>
+            </a:duotone>
+            <a:extLst/>
+          </a:blip>
+          <a:stretch/>
+        </a:blipFill>
+        <a:effectLst/>
+      </p:bgPr>
+    </p:bg>
     <p:spTree>
       <p:nvGrpSpPr>
         <p:cNvPr id="1" name=""/>
@@ -16941,6 +17537,56 @@
           <a:chExt cx="0" cy="0"/>
         </a:xfrm>
       </p:grpSpPr>
+      <p:pic>
+        <p:nvPicPr>
+          <p:cNvPr id="5" name="Image 4">
+            <a:extLst>
+              <a:ext uri="{FF2B5EF4-FFF2-40B4-BE49-F238E27FC236}">
+                <a16:creationId xmlns:a16="http://schemas.microsoft.com/office/drawing/2014/main" id="{1D5C0D91-3D1C-4BCE-9CA3-5EF20C79E61A}"/>
+              </a:ext>
+            </a:extLst>
+          </p:cNvPr>
+          <p:cNvPicPr>
+            <a:picLocks noChangeAspect="1"/>
+          </p:cNvPicPr>
+          <p:nvPr/>
+        </p:nvPicPr>
+        <p:blipFill>
+          <a:blip r:embed="rId3"/>
+          <a:stretch>
+            <a:fillRect/>
+          </a:stretch>
+        </p:blipFill>
+        <p:spPr>
+          <a:xfrm>
+            <a:off x="1141411" y="2277013"/>
+            <a:ext cx="3494597" cy="3494597"/>
+          </a:xfrm>
+          <a:prstGeom prst="round2DiagRect">
+            <a:avLst>
+              <a:gd name="adj1" fmla="val 5608"/>
+              <a:gd name="adj2" fmla="val 0"/>
+            </a:avLst>
+          </a:prstGeom>
+          <a:ln w="19050" cap="sq">
+            <a:solidFill>
+              <a:schemeClr val="tx2">
+                <a:lumMod val="60000"/>
+                <a:lumOff val="40000"/>
+                <a:alpha val="60000"/>
+              </a:schemeClr>
+            </a:solidFill>
+            <a:miter lim="800000"/>
+          </a:ln>
+          <a:effectLst>
+            <a:outerShdw blurRad="88900" dist="38100" dir="5400000" algn="t" rotWithShape="0">
+              <a:prstClr val="black">
+                <a:alpha val="40000"/>
+              </a:prstClr>
+            </a:outerShdw>
+          </a:effectLst>
+        </p:spPr>
+      </p:pic>
       <p:sp>
         <p:nvSpPr>
           <p:cNvPr id="2" name="Titre 1">
@@ -16957,18 +17603,20 @@
             <p:ph type="title"/>
           </p:nvPr>
         </p:nvSpPr>
-        <p:spPr/>
+        <p:spPr>
+          <a:xfrm>
+            <a:off x="1141413" y="618518"/>
+            <a:ext cx="9905998" cy="1478570"/>
+          </a:xfrm>
+        </p:spPr>
         <p:txBody>
-          <a:bodyPr/>
+          <a:bodyPr>
+            <a:normAutofit/>
+          </a:bodyPr>
           <a:lstStyle/>
           <a:p>
-            <a:pPr algn="ctr"/>
             <a:r>
-              <a:rPr lang="fr-FR" dirty="0">
-                <a:solidFill>
-                  <a:schemeClr val="bg1"/>
-                </a:solidFill>
-              </a:rPr>
+              <a:rPr lang="fr-FR"/>
               <a:t>Sommaire</a:t>
             </a:r>
           </a:p>
@@ -16990,94 +17638,128 @@
             <p:ph idx="1"/>
           </p:nvPr>
         </p:nvSpPr>
-        <p:spPr/>
+        <p:spPr>
+          <a:xfrm>
+            <a:off x="5034579" y="2249487"/>
+            <a:ext cx="6012832" cy="3541714"/>
+          </a:xfrm>
+        </p:spPr>
         <p:txBody>
           <a:bodyPr>
-            <a:normAutofit fontScale="85000" lnSpcReduction="20000"/>
+            <a:normAutofit/>
           </a:bodyPr>
           <a:lstStyle/>
           <a:p>
             <a:pPr marL="457200" indent="-457200">
+              <a:lnSpc>
+                <a:spcPct val="110000"/>
+              </a:lnSpc>
               <a:buFont typeface="+mj-lt"/>
               <a:buAutoNum type="arabicPeriod"/>
             </a:pPr>
             <a:r>
-              <a:rPr lang="fr-FR" dirty="0"/>
+              <a:rPr lang="fr-FR" sz="1900"/>
               <a:t>Présentation du projet</a:t>
             </a:r>
           </a:p>
           <a:p>
             <a:pPr marL="457200" indent="-457200">
+              <a:lnSpc>
+                <a:spcPct val="110000"/>
+              </a:lnSpc>
               <a:buFont typeface="+mj-lt"/>
               <a:buAutoNum type="arabicPeriod"/>
             </a:pPr>
             <a:r>
-              <a:rPr lang="fr-FR" dirty="0"/>
+              <a:rPr lang="fr-FR" sz="1900"/>
               <a:t>Organisation de la salle</a:t>
             </a:r>
           </a:p>
           <a:p>
             <a:pPr marL="457200" indent="-457200">
+              <a:lnSpc>
+                <a:spcPct val="110000"/>
+              </a:lnSpc>
               <a:buFont typeface="+mj-lt"/>
               <a:buAutoNum type="arabicPeriod"/>
             </a:pPr>
             <a:r>
-              <a:rPr lang="fr-FR" dirty="0"/>
+              <a:rPr lang="fr-FR" sz="1900"/>
               <a:t>Présentation des différentes activités</a:t>
             </a:r>
           </a:p>
           <a:p>
             <a:pPr marL="457200" indent="-457200">
+              <a:lnSpc>
+                <a:spcPct val="110000"/>
+              </a:lnSpc>
               <a:buFont typeface="+mj-lt"/>
               <a:buAutoNum type="arabicPeriod"/>
             </a:pPr>
             <a:r>
-              <a:rPr lang="fr-FR" dirty="0"/>
+              <a:rPr lang="fr-FR" sz="1900"/>
               <a:t>Programme</a:t>
             </a:r>
           </a:p>
           <a:p>
             <a:pPr marL="457200" indent="-457200">
+              <a:lnSpc>
+                <a:spcPct val="110000"/>
+              </a:lnSpc>
               <a:buFont typeface="+mj-lt"/>
               <a:buAutoNum type="arabicPeriod"/>
             </a:pPr>
             <a:r>
-              <a:rPr lang="fr-FR" dirty="0"/>
+              <a:rPr lang="fr-FR" sz="1900"/>
               <a:t>Exposants</a:t>
             </a:r>
           </a:p>
           <a:p>
             <a:pPr marL="457200" indent="-457200">
+              <a:lnSpc>
+                <a:spcPct val="110000"/>
+              </a:lnSpc>
               <a:buFont typeface="+mj-lt"/>
               <a:buAutoNum type="arabicPeriod"/>
             </a:pPr>
             <a:r>
-              <a:rPr lang="fr-FR" dirty="0"/>
+              <a:rPr lang="fr-FR" sz="1900"/>
               <a:t>Choix du matériel</a:t>
             </a:r>
           </a:p>
           <a:p>
             <a:pPr marL="457200" indent="-457200">
+              <a:lnSpc>
+                <a:spcPct val="110000"/>
+              </a:lnSpc>
               <a:buFont typeface="+mj-lt"/>
               <a:buAutoNum type="arabicPeriod"/>
             </a:pPr>
             <a:r>
-              <a:rPr lang="fr-FR" dirty="0"/>
+              <a:rPr lang="fr-FR" sz="1900"/>
               <a:t>Budget</a:t>
             </a:r>
           </a:p>
           <a:p>
             <a:pPr marL="457200" indent="-457200">
+              <a:lnSpc>
+                <a:spcPct val="110000"/>
+              </a:lnSpc>
               <a:buFont typeface="+mj-lt"/>
               <a:buAutoNum type="arabicPeriod"/>
             </a:pPr>
             <a:r>
-              <a:rPr lang="fr-FR" dirty="0"/>
+              <a:rPr lang="fr-FR" sz="1900"/>
               <a:t>Organisation du réseau</a:t>
             </a:r>
           </a:p>
           <a:p>
-            <a:endParaRPr lang="fr-FR" dirty="0"/>
+            <a:pPr>
+              <a:lnSpc>
+                <a:spcPct val="110000"/>
+              </a:lnSpc>
+            </a:pPr>
+            <a:endParaRPr lang="fr-FR" sz="1900"/>
           </a:p>
         </p:txBody>
       </p:sp>
@@ -17922,7 +18604,7 @@
           <a:noFill/>
           <a:extLst>
             <a:ext uri="{909E8E84-426E-40dd-AFC4-6F175D3DCCD1}">
-              <a14:hiddenFill xmlns:a14="http://schemas.microsoft.com/office/drawing/2010/main" xmlns:p14="http://schemas.microsoft.com/office/powerpoint/2010/main" xmlns="">
+              <a14:hiddenFill xmlns="" xmlns:p14="http://schemas.microsoft.com/office/powerpoint/2010/main" xmlns:a14="http://schemas.microsoft.com/office/drawing/2010/main">
                 <a:solidFill>
                   <a:srgbClr val="FFFFFF"/>
                 </a:solidFill>
@@ -18034,7 +18716,7 @@
               </a:ln>
               <a:extLst>
                 <a:ext uri="{91240B29-F687-4f45-9708-019B960494DF}">
-                  <a14:hiddenLine xmlns:a14="http://schemas.microsoft.com/office/drawing/2010/main" xmlns:p14="http://schemas.microsoft.com/office/powerpoint/2010/main" xmlns="" w="9525">
+                  <a14:hiddenLine xmlns="" xmlns:p14="http://schemas.microsoft.com/office/powerpoint/2010/main" xmlns:a14="http://schemas.microsoft.com/office/drawing/2010/main" w="9525">
                     <a:solidFill>
                       <a:srgbClr val="000000"/>
                     </a:solidFill>
@@ -18136,7 +18818,7 @@
               </a:ln>
               <a:extLst>
                 <a:ext uri="{91240B29-F687-4f45-9708-019B960494DF}">
-                  <a14:hiddenLine xmlns:a14="http://schemas.microsoft.com/office/drawing/2010/main" xmlns:p14="http://schemas.microsoft.com/office/powerpoint/2010/main" xmlns="" w="9525">
+                  <a14:hiddenLine xmlns="" xmlns:p14="http://schemas.microsoft.com/office/powerpoint/2010/main" xmlns:a14="http://schemas.microsoft.com/office/drawing/2010/main" w="9525">
                     <a:solidFill>
                       <a:srgbClr val="000000"/>
                     </a:solidFill>
@@ -18238,7 +18920,7 @@
               </a:ln>
               <a:extLst>
                 <a:ext uri="{91240B29-F687-4f45-9708-019B960494DF}">
-                  <a14:hiddenLine xmlns:a14="http://schemas.microsoft.com/office/drawing/2010/main" xmlns:p14="http://schemas.microsoft.com/office/powerpoint/2010/main" xmlns="" w="9525">
+                  <a14:hiddenLine xmlns="" xmlns:p14="http://schemas.microsoft.com/office/powerpoint/2010/main" xmlns:a14="http://schemas.microsoft.com/office/drawing/2010/main" w="9525">
                     <a:solidFill>
                       <a:srgbClr val="000000"/>
                     </a:solidFill>
@@ -18312,7 +18994,7 @@
               </a:ln>
               <a:extLst>
                 <a:ext uri="{91240B29-F687-4f45-9708-019B960494DF}">
-                  <a14:hiddenLine xmlns:a14="http://schemas.microsoft.com/office/drawing/2010/main" xmlns:p14="http://schemas.microsoft.com/office/powerpoint/2010/main" xmlns="" w="9525">
+                  <a14:hiddenLine xmlns="" xmlns:p14="http://schemas.microsoft.com/office/powerpoint/2010/main" xmlns:a14="http://schemas.microsoft.com/office/drawing/2010/main" w="9525">
                     <a:solidFill>
                       <a:srgbClr val="000000"/>
                     </a:solidFill>
@@ -18414,7 +19096,7 @@
               </a:ln>
               <a:extLst>
                 <a:ext uri="{91240B29-F687-4f45-9708-019B960494DF}">
-                  <a14:hiddenLine xmlns:a14="http://schemas.microsoft.com/office/drawing/2010/main" xmlns:p14="http://schemas.microsoft.com/office/powerpoint/2010/main" xmlns="" w="9525">
+                  <a14:hiddenLine xmlns="" xmlns:p14="http://schemas.microsoft.com/office/powerpoint/2010/main" xmlns:a14="http://schemas.microsoft.com/office/drawing/2010/main" w="9525">
                     <a:solidFill>
                       <a:srgbClr val="000000"/>
                     </a:solidFill>
@@ -18488,7 +19170,7 @@
               </a:ln>
               <a:extLst>
                 <a:ext uri="{91240B29-F687-4f45-9708-019B960494DF}">
-                  <a14:hiddenLine xmlns:a14="http://schemas.microsoft.com/office/drawing/2010/main" xmlns:p14="http://schemas.microsoft.com/office/powerpoint/2010/main" xmlns="" w="9525">
+                  <a14:hiddenLine xmlns="" xmlns:p14="http://schemas.microsoft.com/office/powerpoint/2010/main" xmlns:a14="http://schemas.microsoft.com/office/drawing/2010/main" w="9525">
                     <a:solidFill>
                       <a:srgbClr val="000000"/>
                     </a:solidFill>
@@ -18562,7 +19244,7 @@
               </a:ln>
               <a:extLst>
                 <a:ext uri="{91240B29-F687-4f45-9708-019B960494DF}">
-                  <a14:hiddenLine xmlns:a14="http://schemas.microsoft.com/office/drawing/2010/main" xmlns:p14="http://schemas.microsoft.com/office/powerpoint/2010/main" xmlns="" w="9525">
+                  <a14:hiddenLine xmlns="" xmlns:p14="http://schemas.microsoft.com/office/powerpoint/2010/main" xmlns:a14="http://schemas.microsoft.com/office/drawing/2010/main" w="9525">
                     <a:solidFill>
                       <a:srgbClr val="000000"/>
                     </a:solidFill>
@@ -18664,7 +19346,7 @@
               </a:ln>
               <a:extLst>
                 <a:ext uri="{91240B29-F687-4f45-9708-019B960494DF}">
-                  <a14:hiddenLine xmlns:a14="http://schemas.microsoft.com/office/drawing/2010/main" xmlns:p14="http://schemas.microsoft.com/office/powerpoint/2010/main" xmlns="" w="9525">
+                  <a14:hiddenLine xmlns="" xmlns:p14="http://schemas.microsoft.com/office/powerpoint/2010/main" xmlns:a14="http://schemas.microsoft.com/office/drawing/2010/main" w="9525">
                     <a:solidFill>
                       <a:srgbClr val="000000"/>
                     </a:solidFill>
@@ -18766,7 +19448,7 @@
               </a:ln>
               <a:extLst>
                 <a:ext uri="{91240B29-F687-4f45-9708-019B960494DF}">
-                  <a14:hiddenLine xmlns:a14="http://schemas.microsoft.com/office/drawing/2010/main" xmlns:p14="http://schemas.microsoft.com/office/powerpoint/2010/main" xmlns="" w="9525">
+                  <a14:hiddenLine xmlns="" xmlns:p14="http://schemas.microsoft.com/office/powerpoint/2010/main" xmlns:a14="http://schemas.microsoft.com/office/drawing/2010/main" w="9525">
                     <a:solidFill>
                       <a:srgbClr val="000000"/>
                     </a:solidFill>
@@ -18840,7 +19522,7 @@
               </a:ln>
               <a:extLst>
                 <a:ext uri="{91240B29-F687-4f45-9708-019B960494DF}">
-                  <a14:hiddenLine xmlns:a14="http://schemas.microsoft.com/office/drawing/2010/main" xmlns:p14="http://schemas.microsoft.com/office/powerpoint/2010/main" xmlns="" w="9525">
+                  <a14:hiddenLine xmlns="" xmlns:p14="http://schemas.microsoft.com/office/powerpoint/2010/main" xmlns:a14="http://schemas.microsoft.com/office/drawing/2010/main" w="9525">
                     <a:solidFill>
                       <a:srgbClr val="000000"/>
                     </a:solidFill>
@@ -18962,7 +19644,7 @@
               </a:ln>
               <a:extLst>
                 <a:ext uri="{91240B29-F687-4f45-9708-019B960494DF}">
-                  <a14:hiddenLine xmlns:a14="http://schemas.microsoft.com/office/drawing/2010/main" xmlns:p14="http://schemas.microsoft.com/office/powerpoint/2010/main" xmlns="" w="9525">
+                  <a14:hiddenLine xmlns="" xmlns:p14="http://schemas.microsoft.com/office/powerpoint/2010/main" xmlns:a14="http://schemas.microsoft.com/office/drawing/2010/main" w="9525">
                     <a:solidFill>
                       <a:srgbClr val="000000"/>
                     </a:solidFill>
@@ -19070,7 +19752,7 @@
               </a:ln>
               <a:extLst>
                 <a:ext uri="{91240B29-F687-4f45-9708-019B960494DF}">
-                  <a14:hiddenLine xmlns:a14="http://schemas.microsoft.com/office/drawing/2010/main" xmlns:p14="http://schemas.microsoft.com/office/powerpoint/2010/main" xmlns="" w="9525">
+                  <a14:hiddenLine xmlns="" xmlns:p14="http://schemas.microsoft.com/office/powerpoint/2010/main" xmlns:a14="http://schemas.microsoft.com/office/drawing/2010/main" w="9525">
                     <a:solidFill>
                       <a:srgbClr val="000000"/>
                     </a:solidFill>
@@ -19144,7 +19826,7 @@
               </a:ln>
               <a:extLst>
                 <a:ext uri="{91240B29-F687-4f45-9708-019B960494DF}">
-                  <a14:hiddenLine xmlns:a14="http://schemas.microsoft.com/office/drawing/2010/main" xmlns:p14="http://schemas.microsoft.com/office/powerpoint/2010/main" xmlns="" w="9525">
+                  <a14:hiddenLine xmlns="" xmlns:p14="http://schemas.microsoft.com/office/powerpoint/2010/main" xmlns:a14="http://schemas.microsoft.com/office/drawing/2010/main" w="9525">
                     <a:solidFill>
                       <a:srgbClr val="000000"/>
                     </a:solidFill>
@@ -19218,7 +19900,7 @@
               </a:ln>
               <a:extLst>
                 <a:ext uri="{91240B29-F687-4f45-9708-019B960494DF}">
-                  <a14:hiddenLine xmlns:a14="http://schemas.microsoft.com/office/drawing/2010/main" xmlns:p14="http://schemas.microsoft.com/office/powerpoint/2010/main" xmlns="" w="9525">
+                  <a14:hiddenLine xmlns="" xmlns:p14="http://schemas.microsoft.com/office/powerpoint/2010/main" xmlns:a14="http://schemas.microsoft.com/office/drawing/2010/main" w="9525">
                     <a:solidFill>
                       <a:srgbClr val="000000"/>
                     </a:solidFill>
@@ -19320,7 +20002,7 @@
               </a:ln>
               <a:extLst>
                 <a:ext uri="{91240B29-F687-4f45-9708-019B960494DF}">
-                  <a14:hiddenLine xmlns:a14="http://schemas.microsoft.com/office/drawing/2010/main" xmlns:p14="http://schemas.microsoft.com/office/powerpoint/2010/main" xmlns="" w="9525">
+                  <a14:hiddenLine xmlns="" xmlns:p14="http://schemas.microsoft.com/office/powerpoint/2010/main" xmlns:a14="http://schemas.microsoft.com/office/drawing/2010/main" w="9525">
                     <a:solidFill>
                       <a:srgbClr val="000000"/>
                     </a:solidFill>
@@ -19366,7 +20048,7 @@
               </a:ln>
               <a:extLst>
                 <a:ext uri="{91240B29-F687-4f45-9708-019B960494DF}">
-                  <a14:hiddenLine xmlns:a14="http://schemas.microsoft.com/office/drawing/2010/main" xmlns:p14="http://schemas.microsoft.com/office/powerpoint/2010/main" xmlns="" w="9525">
+                  <a14:hiddenLine xmlns="" xmlns:p14="http://schemas.microsoft.com/office/powerpoint/2010/main" xmlns:a14="http://schemas.microsoft.com/office/drawing/2010/main" w="9525">
                     <a:solidFill>
                       <a:srgbClr val="000000"/>
                     </a:solidFill>
@@ -19443,7 +20125,7 @@
               </a:ln>
               <a:extLst>
                 <a:ext uri="{91240B29-F687-4f45-9708-019B960494DF}">
-                  <a14:hiddenLine xmlns:a14="http://schemas.microsoft.com/office/drawing/2010/main" xmlns:p14="http://schemas.microsoft.com/office/powerpoint/2010/main" xmlns="" w="9525">
+                  <a14:hiddenLine xmlns="" xmlns:p14="http://schemas.microsoft.com/office/powerpoint/2010/main" xmlns:a14="http://schemas.microsoft.com/office/drawing/2010/main" w="9525">
                     <a:solidFill>
                       <a:srgbClr val="000000"/>
                     </a:solidFill>
@@ -19545,7 +20227,7 @@
               </a:ln>
               <a:extLst>
                 <a:ext uri="{91240B29-F687-4f45-9708-019B960494DF}">
-                  <a14:hiddenLine xmlns:a14="http://schemas.microsoft.com/office/drawing/2010/main" xmlns:p14="http://schemas.microsoft.com/office/powerpoint/2010/main" xmlns="" w="9525">
+                  <a14:hiddenLine xmlns="" xmlns:p14="http://schemas.microsoft.com/office/powerpoint/2010/main" xmlns:a14="http://schemas.microsoft.com/office/drawing/2010/main" w="9525">
                     <a:solidFill>
                       <a:srgbClr val="000000"/>
                     </a:solidFill>
@@ -19619,7 +20301,7 @@
               </a:ln>
               <a:extLst>
                 <a:ext uri="{91240B29-F687-4f45-9708-019B960494DF}">
-                  <a14:hiddenLine xmlns:a14="http://schemas.microsoft.com/office/drawing/2010/main" xmlns:p14="http://schemas.microsoft.com/office/powerpoint/2010/main" xmlns="" w="9525">
+                  <a14:hiddenLine xmlns="" xmlns:p14="http://schemas.microsoft.com/office/powerpoint/2010/main" xmlns:a14="http://schemas.microsoft.com/office/drawing/2010/main" w="9525">
                     <a:solidFill>
                       <a:srgbClr val="000000"/>
                     </a:solidFill>
@@ -19721,7 +20403,7 @@
               </a:ln>
               <a:extLst>
                 <a:ext uri="{91240B29-F687-4f45-9708-019B960494DF}">
-                  <a14:hiddenLine xmlns:a14="http://schemas.microsoft.com/office/drawing/2010/main" xmlns:p14="http://schemas.microsoft.com/office/powerpoint/2010/main" xmlns="" w="9525">
+                  <a14:hiddenLine xmlns="" xmlns:p14="http://schemas.microsoft.com/office/powerpoint/2010/main" xmlns:a14="http://schemas.microsoft.com/office/drawing/2010/main" w="9525">
                     <a:solidFill>
                       <a:srgbClr val="000000"/>
                     </a:solidFill>
@@ -19798,7 +20480,7 @@
               </a:ln>
               <a:extLst>
                 <a:ext uri="{91240B29-F687-4f45-9708-019B960494DF}">
-                  <a14:hiddenLine xmlns:a14="http://schemas.microsoft.com/office/drawing/2010/main" xmlns:p14="http://schemas.microsoft.com/office/powerpoint/2010/main" xmlns="" w="9525">
+                  <a14:hiddenLine xmlns="" xmlns:p14="http://schemas.microsoft.com/office/powerpoint/2010/main" xmlns:a14="http://schemas.microsoft.com/office/drawing/2010/main" w="9525">
                     <a:solidFill>
                       <a:srgbClr val="000000"/>
                     </a:solidFill>
@@ -19872,7 +20554,7 @@
               </a:ln>
               <a:extLst>
                 <a:ext uri="{91240B29-F687-4f45-9708-019B960494DF}">
-                  <a14:hiddenLine xmlns:a14="http://schemas.microsoft.com/office/drawing/2010/main" xmlns:p14="http://schemas.microsoft.com/office/powerpoint/2010/main" xmlns="" w="9525">
+                  <a14:hiddenLine xmlns="" xmlns:p14="http://schemas.microsoft.com/office/powerpoint/2010/main" xmlns:a14="http://schemas.microsoft.com/office/drawing/2010/main" w="9525">
                     <a:solidFill>
                       <a:srgbClr val="000000"/>
                     </a:solidFill>
@@ -19974,7 +20656,7 @@
               </a:ln>
               <a:extLst>
                 <a:ext uri="{91240B29-F687-4f45-9708-019B960494DF}">
-                  <a14:hiddenLine xmlns:a14="http://schemas.microsoft.com/office/drawing/2010/main" xmlns:p14="http://schemas.microsoft.com/office/powerpoint/2010/main" xmlns="" w="9525">
+                  <a14:hiddenLine xmlns="" xmlns:p14="http://schemas.microsoft.com/office/powerpoint/2010/main" xmlns:a14="http://schemas.microsoft.com/office/drawing/2010/main" w="9525">
                     <a:solidFill>
                       <a:srgbClr val="000000"/>
                     </a:solidFill>
@@ -20076,7 +20758,7 @@
               </a:ln>
               <a:extLst>
                 <a:ext uri="{91240B29-F687-4f45-9708-019B960494DF}">
-                  <a14:hiddenLine xmlns:a14="http://schemas.microsoft.com/office/drawing/2010/main" xmlns:p14="http://schemas.microsoft.com/office/powerpoint/2010/main" xmlns="" w="9525">
+                  <a14:hiddenLine xmlns="" xmlns:p14="http://schemas.microsoft.com/office/powerpoint/2010/main" xmlns:a14="http://schemas.microsoft.com/office/drawing/2010/main" w="9525">
                     <a:solidFill>
                       <a:srgbClr val="000000"/>
                     </a:solidFill>
@@ -20153,7 +20835,7 @@
               </a:ln>
               <a:extLst>
                 <a:ext uri="{91240B29-F687-4f45-9708-019B960494DF}">
-                  <a14:hiddenLine xmlns:a14="http://schemas.microsoft.com/office/drawing/2010/main" xmlns:p14="http://schemas.microsoft.com/office/powerpoint/2010/main" xmlns="" w="9525">
+                  <a14:hiddenLine xmlns="" xmlns:p14="http://schemas.microsoft.com/office/powerpoint/2010/main" xmlns:a14="http://schemas.microsoft.com/office/drawing/2010/main" w="9525">
                     <a:solidFill>
                       <a:srgbClr val="000000"/>
                     </a:solidFill>
@@ -20285,7 +20967,7 @@
               </a:ln>
               <a:extLst>
                 <a:ext uri="{91240B29-F687-4f45-9708-019B960494DF}">
-                  <a14:hiddenLine xmlns:a14="http://schemas.microsoft.com/office/drawing/2010/main" xmlns:p14="http://schemas.microsoft.com/office/powerpoint/2010/main" xmlns="" w="9525">
+                  <a14:hiddenLine xmlns="" xmlns:p14="http://schemas.microsoft.com/office/powerpoint/2010/main" xmlns:a14="http://schemas.microsoft.com/office/drawing/2010/main" w="9525">
                     <a:solidFill>
                       <a:srgbClr val="000000"/>
                     </a:solidFill>
@@ -20407,7 +21089,7 @@
               </a:ln>
               <a:extLst>
                 <a:ext uri="{91240B29-F687-4f45-9708-019B960494DF}">
-                  <a14:hiddenLine xmlns:a14="http://schemas.microsoft.com/office/drawing/2010/main" xmlns:p14="http://schemas.microsoft.com/office/powerpoint/2010/main" xmlns="" w="9525">
+                  <a14:hiddenLine xmlns="" xmlns:p14="http://schemas.microsoft.com/office/powerpoint/2010/main" xmlns:a14="http://schemas.microsoft.com/office/drawing/2010/main" w="9525">
                     <a:solidFill>
                       <a:srgbClr val="000000"/>
                     </a:solidFill>
@@ -20534,7 +21216,7 @@
               </a:ln>
               <a:extLst>
                 <a:ext uri="{91240B29-F687-4f45-9708-019B960494DF}">
-                  <a14:hiddenLine xmlns:a14="http://schemas.microsoft.com/office/drawing/2010/main" xmlns:p14="http://schemas.microsoft.com/office/powerpoint/2010/main" xmlns="" w="9525">
+                  <a14:hiddenLine xmlns="" xmlns:p14="http://schemas.microsoft.com/office/powerpoint/2010/main" xmlns:a14="http://schemas.microsoft.com/office/drawing/2010/main" w="9525">
                     <a:solidFill>
                       <a:srgbClr val="000000"/>
                     </a:solidFill>
@@ -20636,7 +21318,7 @@
               </a:ln>
               <a:extLst>
                 <a:ext uri="{91240B29-F687-4f45-9708-019B960494DF}">
-                  <a14:hiddenLine xmlns:a14="http://schemas.microsoft.com/office/drawing/2010/main" xmlns:p14="http://schemas.microsoft.com/office/powerpoint/2010/main" xmlns="" w="9525">
+                  <a14:hiddenLine xmlns="" xmlns:p14="http://schemas.microsoft.com/office/powerpoint/2010/main" xmlns:a14="http://schemas.microsoft.com/office/drawing/2010/main" w="9525">
                     <a:solidFill>
                       <a:srgbClr val="000000"/>
                     </a:solidFill>
@@ -20713,7 +21395,7 @@
               </a:ln>
               <a:extLst>
                 <a:ext uri="{91240B29-F687-4f45-9708-019B960494DF}">
-                  <a14:hiddenLine xmlns:a14="http://schemas.microsoft.com/office/drawing/2010/main" xmlns:p14="http://schemas.microsoft.com/office/powerpoint/2010/main" xmlns="" w="9525">
+                  <a14:hiddenLine xmlns="" xmlns:p14="http://schemas.microsoft.com/office/powerpoint/2010/main" xmlns:a14="http://schemas.microsoft.com/office/drawing/2010/main" w="9525">
                     <a:solidFill>
                       <a:srgbClr val="000000"/>
                     </a:solidFill>
@@ -20815,7 +21497,7 @@
               </a:ln>
               <a:extLst>
                 <a:ext uri="{91240B29-F687-4f45-9708-019B960494DF}">
-                  <a14:hiddenLine xmlns:a14="http://schemas.microsoft.com/office/drawing/2010/main" xmlns:p14="http://schemas.microsoft.com/office/powerpoint/2010/main" xmlns="" w="9525">
+                  <a14:hiddenLine xmlns="" xmlns:p14="http://schemas.microsoft.com/office/powerpoint/2010/main" xmlns:a14="http://schemas.microsoft.com/office/drawing/2010/main" w="9525">
                     <a:solidFill>
                       <a:srgbClr val="000000"/>
                     </a:solidFill>
@@ -20895,7 +21577,7 @@
               </a:ln>
               <a:extLst>
                 <a:ext uri="{91240B29-F687-4f45-9708-019B960494DF}">
-                  <a14:hiddenLine xmlns:a14="http://schemas.microsoft.com/office/drawing/2010/main" xmlns:p14="http://schemas.microsoft.com/office/powerpoint/2010/main" xmlns="" w="9525">
+                  <a14:hiddenLine xmlns="" xmlns:p14="http://schemas.microsoft.com/office/powerpoint/2010/main" xmlns:a14="http://schemas.microsoft.com/office/drawing/2010/main" w="9525">
                     <a:solidFill>
                       <a:srgbClr val="000000"/>
                     </a:solidFill>
@@ -20997,7 +21679,7 @@
               </a:ln>
               <a:extLst>
                 <a:ext uri="{91240B29-F687-4f45-9708-019B960494DF}">
-                  <a14:hiddenLine xmlns:a14="http://schemas.microsoft.com/office/drawing/2010/main" xmlns:p14="http://schemas.microsoft.com/office/powerpoint/2010/main" xmlns="" w="9525">
+                  <a14:hiddenLine xmlns="" xmlns:p14="http://schemas.microsoft.com/office/powerpoint/2010/main" xmlns:a14="http://schemas.microsoft.com/office/drawing/2010/main" w="9525">
                     <a:solidFill>
                       <a:srgbClr val="000000"/>
                     </a:solidFill>
@@ -21077,7 +21759,7 @@
               </a:ln>
               <a:extLst>
                 <a:ext uri="{91240B29-F687-4f45-9708-019B960494DF}">
-                  <a14:hiddenLine xmlns:a14="http://schemas.microsoft.com/office/drawing/2010/main" xmlns:p14="http://schemas.microsoft.com/office/powerpoint/2010/main" xmlns="" w="9525">
+                  <a14:hiddenLine xmlns="" xmlns:p14="http://schemas.microsoft.com/office/powerpoint/2010/main" xmlns:a14="http://schemas.microsoft.com/office/drawing/2010/main" w="9525">
                     <a:solidFill>
                       <a:srgbClr val="000000"/>
                     </a:solidFill>
@@ -21179,7 +21861,7 @@
               </a:ln>
               <a:extLst>
                 <a:ext uri="{91240B29-F687-4f45-9708-019B960494DF}">
-                  <a14:hiddenLine xmlns:a14="http://schemas.microsoft.com/office/drawing/2010/main" xmlns:p14="http://schemas.microsoft.com/office/powerpoint/2010/main" xmlns="" w="9525">
+                  <a14:hiddenLine xmlns="" xmlns:p14="http://schemas.microsoft.com/office/powerpoint/2010/main" xmlns:a14="http://schemas.microsoft.com/office/drawing/2010/main" w="9525">
                     <a:solidFill>
                       <a:srgbClr val="000000"/>
                     </a:solidFill>
@@ -21225,7 +21907,7 @@
               </a:ln>
               <a:extLst>
                 <a:ext uri="{91240B29-F687-4f45-9708-019B960494DF}">
-                  <a14:hiddenLine xmlns:a14="http://schemas.microsoft.com/office/drawing/2010/main" xmlns:p14="http://schemas.microsoft.com/office/powerpoint/2010/main" xmlns="" w="9525">
+                  <a14:hiddenLine xmlns="" xmlns:p14="http://schemas.microsoft.com/office/powerpoint/2010/main" xmlns:a14="http://schemas.microsoft.com/office/drawing/2010/main" w="9525">
                     <a:solidFill>
                       <a:srgbClr val="000000"/>
                     </a:solidFill>
@@ -21729,7 +22411,7 @@
           <a:noFill/>
           <a:extLst>
             <a:ext uri="{909E8E84-426E-40dd-AFC4-6F175D3DCCD1}">
-              <a14:hiddenFill xmlns:a14="http://schemas.microsoft.com/office/drawing/2010/main" xmlns:p14="http://schemas.microsoft.com/office/powerpoint/2010/main" xmlns="">
+              <a14:hiddenFill xmlns="" xmlns:p14="http://schemas.microsoft.com/office/powerpoint/2010/main" xmlns:a14="http://schemas.microsoft.com/office/drawing/2010/main">
                 <a:solidFill>
                   <a:srgbClr val="FFFFFF"/>
                 </a:solidFill>
@@ -21882,7 +22564,7 @@
             </a:ln>
             <a:extLst>
               <a:ext uri="{91240B29-F687-4f45-9708-019B960494DF}">
-                <a14:hiddenLine xmlns:a14="http://schemas.microsoft.com/office/drawing/2010/main" xmlns:p14="http://schemas.microsoft.com/office/powerpoint/2010/main" xmlns="" w="9525">
+                <a14:hiddenLine xmlns="" xmlns:p14="http://schemas.microsoft.com/office/powerpoint/2010/main" xmlns:a14="http://schemas.microsoft.com/office/drawing/2010/main" w="9525">
                   <a:solidFill>
                     <a:srgbClr val="000000"/>
                   </a:solidFill>
@@ -21984,7 +22666,7 @@
             </a:ln>
             <a:extLst>
               <a:ext uri="{91240B29-F687-4f45-9708-019B960494DF}">
-                <a14:hiddenLine xmlns:a14="http://schemas.microsoft.com/office/drawing/2010/main" xmlns:p14="http://schemas.microsoft.com/office/powerpoint/2010/main" xmlns="" w="9525">
+                <a14:hiddenLine xmlns="" xmlns:p14="http://schemas.microsoft.com/office/powerpoint/2010/main" xmlns:a14="http://schemas.microsoft.com/office/drawing/2010/main" w="9525">
                   <a:solidFill>
                     <a:srgbClr val="000000"/>
                   </a:solidFill>
@@ -22086,7 +22768,7 @@
             </a:ln>
             <a:extLst>
               <a:ext uri="{91240B29-F687-4f45-9708-019B960494DF}">
-                <a14:hiddenLine xmlns:a14="http://schemas.microsoft.com/office/drawing/2010/main" xmlns:p14="http://schemas.microsoft.com/office/powerpoint/2010/main" xmlns="" w="9525">
+                <a14:hiddenLine xmlns="" xmlns:p14="http://schemas.microsoft.com/office/powerpoint/2010/main" xmlns:a14="http://schemas.microsoft.com/office/drawing/2010/main" w="9525">
                   <a:solidFill>
                     <a:srgbClr val="000000"/>
                   </a:solidFill>
@@ -22160,7 +22842,7 @@
             </a:ln>
             <a:extLst>
               <a:ext uri="{91240B29-F687-4f45-9708-019B960494DF}">
-                <a14:hiddenLine xmlns:a14="http://schemas.microsoft.com/office/drawing/2010/main" xmlns:p14="http://schemas.microsoft.com/office/powerpoint/2010/main" xmlns="" w="9525">
+                <a14:hiddenLine xmlns="" xmlns:p14="http://schemas.microsoft.com/office/powerpoint/2010/main" xmlns:a14="http://schemas.microsoft.com/office/drawing/2010/main" w="9525">
                   <a:solidFill>
                     <a:srgbClr val="000000"/>
                   </a:solidFill>
@@ -22262,7 +22944,7 @@
             </a:ln>
             <a:extLst>
               <a:ext uri="{91240B29-F687-4f45-9708-019B960494DF}">
-                <a14:hiddenLine xmlns:a14="http://schemas.microsoft.com/office/drawing/2010/main" xmlns:p14="http://schemas.microsoft.com/office/powerpoint/2010/main" xmlns="" w="9525">
+                <a14:hiddenLine xmlns="" xmlns:p14="http://schemas.microsoft.com/office/powerpoint/2010/main" xmlns:a14="http://schemas.microsoft.com/office/drawing/2010/main" w="9525">
                   <a:solidFill>
                     <a:srgbClr val="000000"/>
                   </a:solidFill>
@@ -22336,7 +23018,7 @@
             </a:ln>
             <a:extLst>
               <a:ext uri="{91240B29-F687-4f45-9708-019B960494DF}">
-                <a14:hiddenLine xmlns:a14="http://schemas.microsoft.com/office/drawing/2010/main" xmlns:p14="http://schemas.microsoft.com/office/powerpoint/2010/main" xmlns="" w="9525">
+                <a14:hiddenLine xmlns="" xmlns:p14="http://schemas.microsoft.com/office/powerpoint/2010/main" xmlns:a14="http://schemas.microsoft.com/office/drawing/2010/main" w="9525">
                   <a:solidFill>
                     <a:srgbClr val="000000"/>
                   </a:solidFill>
@@ -22410,7 +23092,7 @@
             </a:ln>
             <a:extLst>
               <a:ext uri="{91240B29-F687-4f45-9708-019B960494DF}">
-                <a14:hiddenLine xmlns:a14="http://schemas.microsoft.com/office/drawing/2010/main" xmlns:p14="http://schemas.microsoft.com/office/powerpoint/2010/main" xmlns="" w="9525">
+                <a14:hiddenLine xmlns="" xmlns:p14="http://schemas.microsoft.com/office/powerpoint/2010/main" xmlns:a14="http://schemas.microsoft.com/office/drawing/2010/main" w="9525">
                   <a:solidFill>
                     <a:srgbClr val="000000"/>
                   </a:solidFill>
@@ -22512,7 +23194,7 @@
             </a:ln>
             <a:extLst>
               <a:ext uri="{91240B29-F687-4f45-9708-019B960494DF}">
-                <a14:hiddenLine xmlns:a14="http://schemas.microsoft.com/office/drawing/2010/main" xmlns:p14="http://schemas.microsoft.com/office/powerpoint/2010/main" xmlns="" w="9525">
+                <a14:hiddenLine xmlns="" xmlns:p14="http://schemas.microsoft.com/office/powerpoint/2010/main" xmlns:a14="http://schemas.microsoft.com/office/drawing/2010/main" w="9525">
                   <a:solidFill>
                     <a:srgbClr val="000000"/>
                   </a:solidFill>
@@ -22614,7 +23296,7 @@
             </a:ln>
             <a:extLst>
               <a:ext uri="{91240B29-F687-4f45-9708-019B960494DF}">
-                <a14:hiddenLine xmlns:a14="http://schemas.microsoft.com/office/drawing/2010/main" xmlns:p14="http://schemas.microsoft.com/office/powerpoint/2010/main" xmlns="" w="9525">
+                <a14:hiddenLine xmlns="" xmlns:p14="http://schemas.microsoft.com/office/powerpoint/2010/main" xmlns:a14="http://schemas.microsoft.com/office/drawing/2010/main" w="9525">
                   <a:solidFill>
                     <a:srgbClr val="000000"/>
                   </a:solidFill>
@@ -22688,7 +23370,7 @@
             </a:ln>
             <a:extLst>
               <a:ext uri="{91240B29-F687-4f45-9708-019B960494DF}">
-                <a14:hiddenLine xmlns:a14="http://schemas.microsoft.com/office/drawing/2010/main" xmlns:p14="http://schemas.microsoft.com/office/powerpoint/2010/main" xmlns="" w="9525">
+                <a14:hiddenLine xmlns="" xmlns:p14="http://schemas.microsoft.com/office/powerpoint/2010/main" xmlns:a14="http://schemas.microsoft.com/office/drawing/2010/main" w="9525">
                   <a:solidFill>
                     <a:srgbClr val="000000"/>
                   </a:solidFill>
@@ -22810,7 +23492,7 @@
             </a:ln>
             <a:extLst>
               <a:ext uri="{91240B29-F687-4f45-9708-019B960494DF}">
-                <a14:hiddenLine xmlns:a14="http://schemas.microsoft.com/office/drawing/2010/main" xmlns:p14="http://schemas.microsoft.com/office/powerpoint/2010/main" xmlns="" w="9525">
+                <a14:hiddenLine xmlns="" xmlns:p14="http://schemas.microsoft.com/office/powerpoint/2010/main" xmlns:a14="http://schemas.microsoft.com/office/drawing/2010/main" w="9525">
                   <a:solidFill>
                     <a:srgbClr val="000000"/>
                   </a:solidFill>
@@ -22918,7 +23600,7 @@
             </a:ln>
             <a:extLst>
               <a:ext uri="{91240B29-F687-4f45-9708-019B960494DF}">
-                <a14:hiddenLine xmlns:a14="http://schemas.microsoft.com/office/drawing/2010/main" xmlns:p14="http://schemas.microsoft.com/office/powerpoint/2010/main" xmlns="" w="9525">
+                <a14:hiddenLine xmlns="" xmlns:p14="http://schemas.microsoft.com/office/powerpoint/2010/main" xmlns:a14="http://schemas.microsoft.com/office/drawing/2010/main" w="9525">
                   <a:solidFill>
                     <a:srgbClr val="000000"/>
                   </a:solidFill>
@@ -22992,7 +23674,7 @@
             </a:ln>
             <a:extLst>
               <a:ext uri="{91240B29-F687-4f45-9708-019B960494DF}">
-                <a14:hiddenLine xmlns:a14="http://schemas.microsoft.com/office/drawing/2010/main" xmlns:p14="http://schemas.microsoft.com/office/powerpoint/2010/main" xmlns="" w="9525">
+                <a14:hiddenLine xmlns="" xmlns:p14="http://schemas.microsoft.com/office/powerpoint/2010/main" xmlns:a14="http://schemas.microsoft.com/office/drawing/2010/main" w="9525">
                   <a:solidFill>
                     <a:srgbClr val="000000"/>
                   </a:solidFill>
@@ -23066,7 +23748,7 @@
             </a:ln>
             <a:extLst>
               <a:ext uri="{91240B29-F687-4f45-9708-019B960494DF}">
-                <a14:hiddenLine xmlns:a14="http://schemas.microsoft.com/office/drawing/2010/main" xmlns:p14="http://schemas.microsoft.com/office/powerpoint/2010/main" xmlns="" w="9525">
+                <a14:hiddenLine xmlns="" xmlns:p14="http://schemas.microsoft.com/office/powerpoint/2010/main" xmlns:a14="http://schemas.microsoft.com/office/drawing/2010/main" w="9525">
                   <a:solidFill>
                     <a:srgbClr val="000000"/>
                   </a:solidFill>
@@ -23168,7 +23850,7 @@
             </a:ln>
             <a:extLst>
               <a:ext uri="{91240B29-F687-4f45-9708-019B960494DF}">
-                <a14:hiddenLine xmlns:a14="http://schemas.microsoft.com/office/drawing/2010/main" xmlns:p14="http://schemas.microsoft.com/office/powerpoint/2010/main" xmlns="" w="9525">
+                <a14:hiddenLine xmlns="" xmlns:p14="http://schemas.microsoft.com/office/powerpoint/2010/main" xmlns:a14="http://schemas.microsoft.com/office/drawing/2010/main" w="9525">
                   <a:solidFill>
                     <a:srgbClr val="000000"/>
                   </a:solidFill>
@@ -23214,7 +23896,7 @@
             </a:ln>
             <a:extLst>
               <a:ext uri="{91240B29-F687-4f45-9708-019B960494DF}">
-                <a14:hiddenLine xmlns:a14="http://schemas.microsoft.com/office/drawing/2010/main" xmlns:p14="http://schemas.microsoft.com/office/powerpoint/2010/main" xmlns="" w="9525">
+                <a14:hiddenLine xmlns="" xmlns:p14="http://schemas.microsoft.com/office/powerpoint/2010/main" xmlns:a14="http://schemas.microsoft.com/office/drawing/2010/main" w="9525">
                   <a:solidFill>
                     <a:srgbClr val="000000"/>
                   </a:solidFill>
@@ -23291,7 +23973,7 @@
             </a:ln>
             <a:extLst>
               <a:ext uri="{91240B29-F687-4f45-9708-019B960494DF}">
-                <a14:hiddenLine xmlns:a14="http://schemas.microsoft.com/office/drawing/2010/main" xmlns:p14="http://schemas.microsoft.com/office/powerpoint/2010/main" xmlns="" w="9525">
+                <a14:hiddenLine xmlns="" xmlns:p14="http://schemas.microsoft.com/office/powerpoint/2010/main" xmlns:a14="http://schemas.microsoft.com/office/drawing/2010/main" w="9525">
                   <a:solidFill>
                     <a:srgbClr val="000000"/>
                   </a:solidFill>
@@ -23393,7 +24075,7 @@
             </a:ln>
             <a:extLst>
               <a:ext uri="{91240B29-F687-4f45-9708-019B960494DF}">
-                <a14:hiddenLine xmlns:a14="http://schemas.microsoft.com/office/drawing/2010/main" xmlns:p14="http://schemas.microsoft.com/office/powerpoint/2010/main" xmlns="" w="9525">
+                <a14:hiddenLine xmlns="" xmlns:p14="http://schemas.microsoft.com/office/powerpoint/2010/main" xmlns:a14="http://schemas.microsoft.com/office/drawing/2010/main" w="9525">
                   <a:solidFill>
                     <a:srgbClr val="000000"/>
                   </a:solidFill>
@@ -23467,7 +24149,7 @@
             </a:ln>
             <a:extLst>
               <a:ext uri="{91240B29-F687-4f45-9708-019B960494DF}">
-                <a14:hiddenLine xmlns:a14="http://schemas.microsoft.com/office/drawing/2010/main" xmlns:p14="http://schemas.microsoft.com/office/powerpoint/2010/main" xmlns="" w="9525">
+                <a14:hiddenLine xmlns="" xmlns:p14="http://schemas.microsoft.com/office/powerpoint/2010/main" xmlns:a14="http://schemas.microsoft.com/office/drawing/2010/main" w="9525">
                   <a:solidFill>
                     <a:srgbClr val="000000"/>
                   </a:solidFill>
@@ -23569,7 +24251,7 @@
             </a:ln>
             <a:extLst>
               <a:ext uri="{91240B29-F687-4f45-9708-019B960494DF}">
-                <a14:hiddenLine xmlns:a14="http://schemas.microsoft.com/office/drawing/2010/main" xmlns:p14="http://schemas.microsoft.com/office/powerpoint/2010/main" xmlns="" w="9525">
+                <a14:hiddenLine xmlns="" xmlns:p14="http://schemas.microsoft.com/office/powerpoint/2010/main" xmlns:a14="http://schemas.microsoft.com/office/drawing/2010/main" w="9525">
                   <a:solidFill>
                     <a:srgbClr val="000000"/>
                   </a:solidFill>
@@ -23646,7 +24328,7 @@
             </a:ln>
             <a:extLst>
               <a:ext uri="{91240B29-F687-4f45-9708-019B960494DF}">
-                <a14:hiddenLine xmlns:a14="http://schemas.microsoft.com/office/drawing/2010/main" xmlns:p14="http://schemas.microsoft.com/office/powerpoint/2010/main" xmlns="" w="9525">
+                <a14:hiddenLine xmlns="" xmlns:p14="http://schemas.microsoft.com/office/powerpoint/2010/main" xmlns:a14="http://schemas.microsoft.com/office/drawing/2010/main" w="9525">
                   <a:solidFill>
                     <a:srgbClr val="000000"/>
                   </a:solidFill>
@@ -23720,7 +24402,7 @@
             </a:ln>
             <a:extLst>
               <a:ext uri="{91240B29-F687-4f45-9708-019B960494DF}">
-                <a14:hiddenLine xmlns:a14="http://schemas.microsoft.com/office/drawing/2010/main" xmlns:p14="http://schemas.microsoft.com/office/powerpoint/2010/main" xmlns="" w="9525">
+                <a14:hiddenLine xmlns="" xmlns:p14="http://schemas.microsoft.com/office/powerpoint/2010/main" xmlns:a14="http://schemas.microsoft.com/office/drawing/2010/main" w="9525">
                   <a:solidFill>
                     <a:srgbClr val="000000"/>
                   </a:solidFill>
@@ -23822,7 +24504,7 @@
             </a:ln>
             <a:extLst>
               <a:ext uri="{91240B29-F687-4f45-9708-019B960494DF}">
-                <a14:hiddenLine xmlns:a14="http://schemas.microsoft.com/office/drawing/2010/main" xmlns:p14="http://schemas.microsoft.com/office/powerpoint/2010/main" xmlns="" w="9525">
+                <a14:hiddenLine xmlns="" xmlns:p14="http://schemas.microsoft.com/office/powerpoint/2010/main" xmlns:a14="http://schemas.microsoft.com/office/drawing/2010/main" w="9525">
                   <a:solidFill>
                     <a:srgbClr val="000000"/>
                   </a:solidFill>
@@ -23924,7 +24606,7 @@
             </a:ln>
             <a:extLst>
               <a:ext uri="{91240B29-F687-4f45-9708-019B960494DF}">
-                <a14:hiddenLine xmlns:a14="http://schemas.microsoft.com/office/drawing/2010/main" xmlns:p14="http://schemas.microsoft.com/office/powerpoint/2010/main" xmlns="" w="9525">
+                <a14:hiddenLine xmlns="" xmlns:p14="http://schemas.microsoft.com/office/powerpoint/2010/main" xmlns:a14="http://schemas.microsoft.com/office/drawing/2010/main" w="9525">
                   <a:solidFill>
                     <a:srgbClr val="000000"/>
                   </a:solidFill>
@@ -24001,7 +24683,7 @@
             </a:ln>
             <a:extLst>
               <a:ext uri="{91240B29-F687-4f45-9708-019B960494DF}">
-                <a14:hiddenLine xmlns:a14="http://schemas.microsoft.com/office/drawing/2010/main" xmlns:p14="http://schemas.microsoft.com/office/powerpoint/2010/main" xmlns="" w="9525">
+                <a14:hiddenLine xmlns="" xmlns:p14="http://schemas.microsoft.com/office/powerpoint/2010/main" xmlns:a14="http://schemas.microsoft.com/office/drawing/2010/main" w="9525">
                   <a:solidFill>
                     <a:srgbClr val="000000"/>
                   </a:solidFill>
@@ -24133,7 +24815,7 @@
             </a:ln>
             <a:extLst>
               <a:ext uri="{91240B29-F687-4f45-9708-019B960494DF}">
-                <a14:hiddenLine xmlns:a14="http://schemas.microsoft.com/office/drawing/2010/main" xmlns:p14="http://schemas.microsoft.com/office/powerpoint/2010/main" xmlns="" w="9525">
+                <a14:hiddenLine xmlns="" xmlns:p14="http://schemas.microsoft.com/office/powerpoint/2010/main" xmlns:a14="http://schemas.microsoft.com/office/drawing/2010/main" w="9525">
                   <a:solidFill>
                     <a:srgbClr val="000000"/>
                   </a:solidFill>

</xml_diff>

<commit_message>
diapo changement de l'amperage
</commit_message>
<xml_diff>
--- a/Présentation projet.pptx
+++ b/Présentation projet.pptx
@@ -181,7 +181,7 @@
           <a:noFill/>
           <a:extLst>
             <a:ext uri="{909E8E84-426E-40dd-AFC4-6F175D3DCCD1}">
-              <a14:hiddenFill xmlns="" xmlns:a14="http://schemas.microsoft.com/office/drawing/2010/main">
+              <a14:hiddenFill xmlns:a14="http://schemas.microsoft.com/office/drawing/2010/main" xmlns="">
                 <a:solidFill>
                   <a:srgbClr val="FFFFFF"/>
                 </a:solidFill>
@@ -241,7 +241,7 @@
             </a:ln>
             <a:extLst>
               <a:ext uri="{91240B29-F687-4f45-9708-019B960494DF}">
-                <a14:hiddenLine xmlns="" xmlns:a14="http://schemas.microsoft.com/office/drawing/2010/main" w="9525">
+                <a14:hiddenLine xmlns:a14="http://schemas.microsoft.com/office/drawing/2010/main" xmlns="" w="9525">
                   <a:solidFill>
                     <a:srgbClr val="000000"/>
                   </a:solidFill>
@@ -331,7 +331,7 @@
             </a:ln>
             <a:extLst>
               <a:ext uri="{91240B29-F687-4f45-9708-019B960494DF}">
-                <a14:hiddenLine xmlns="" xmlns:a14="http://schemas.microsoft.com/office/drawing/2010/main" w="9525">
+                <a14:hiddenLine xmlns:a14="http://schemas.microsoft.com/office/drawing/2010/main" xmlns="" w="9525">
                   <a:solidFill>
                     <a:srgbClr val="000000"/>
                   </a:solidFill>
@@ -421,7 +421,7 @@
             </a:ln>
             <a:extLst>
               <a:ext uri="{91240B29-F687-4f45-9708-019B960494DF}">
-                <a14:hiddenLine xmlns="" xmlns:a14="http://schemas.microsoft.com/office/drawing/2010/main" w="9525">
+                <a14:hiddenLine xmlns:a14="http://schemas.microsoft.com/office/drawing/2010/main" xmlns="" w="9525">
                   <a:solidFill>
                     <a:srgbClr val="000000"/>
                   </a:solidFill>
@@ -455,7 +455,7 @@
             </a:ln>
             <a:extLst>
               <a:ext uri="{91240B29-F687-4f45-9708-019B960494DF}">
-                <a14:hiddenLine xmlns="" xmlns:a14="http://schemas.microsoft.com/office/drawing/2010/main" w="9525">
+                <a14:hiddenLine xmlns:a14="http://schemas.microsoft.com/office/drawing/2010/main" xmlns="" w="9525">
                   <a:solidFill>
                     <a:srgbClr val="000000"/>
                   </a:solidFill>
@@ -545,7 +545,7 @@
             </a:ln>
             <a:extLst>
               <a:ext uri="{91240B29-F687-4f45-9708-019B960494DF}">
-                <a14:hiddenLine xmlns="" xmlns:a14="http://schemas.microsoft.com/office/drawing/2010/main" w="9525">
+                <a14:hiddenLine xmlns:a14="http://schemas.microsoft.com/office/drawing/2010/main" xmlns="" w="9525">
                   <a:solidFill>
                     <a:srgbClr val="000000"/>
                   </a:solidFill>
@@ -607,7 +607,7 @@
             </a:ln>
             <a:extLst>
               <a:ext uri="{91240B29-F687-4f45-9708-019B960494DF}">
-                <a14:hiddenLine xmlns="" xmlns:a14="http://schemas.microsoft.com/office/drawing/2010/main" w="9525">
+                <a14:hiddenLine xmlns:a14="http://schemas.microsoft.com/office/drawing/2010/main" xmlns="" w="9525">
                   <a:solidFill>
                     <a:srgbClr val="000000"/>
                   </a:solidFill>
@@ -669,7 +669,7 @@
             </a:ln>
             <a:extLst>
               <a:ext uri="{91240B29-F687-4f45-9708-019B960494DF}">
-                <a14:hiddenLine xmlns="" xmlns:a14="http://schemas.microsoft.com/office/drawing/2010/main" w="9525">
+                <a14:hiddenLine xmlns:a14="http://schemas.microsoft.com/office/drawing/2010/main" xmlns="" w="9525">
                   <a:solidFill>
                     <a:srgbClr val="000000"/>
                   </a:solidFill>
@@ -759,7 +759,7 @@
             </a:ln>
             <a:extLst>
               <a:ext uri="{91240B29-F687-4f45-9708-019B960494DF}">
-                <a14:hiddenLine xmlns="" xmlns:a14="http://schemas.microsoft.com/office/drawing/2010/main" w="9525">
+                <a14:hiddenLine xmlns:a14="http://schemas.microsoft.com/office/drawing/2010/main" xmlns="" w="9525">
                   <a:solidFill>
                     <a:srgbClr val="000000"/>
                   </a:solidFill>
@@ -821,7 +821,7 @@
             </a:ln>
             <a:extLst>
               <a:ext uri="{91240B29-F687-4f45-9708-019B960494DF}">
-                <a14:hiddenLine xmlns="" xmlns:a14="http://schemas.microsoft.com/office/drawing/2010/main" w="9525">
+                <a14:hiddenLine xmlns:a14="http://schemas.microsoft.com/office/drawing/2010/main" xmlns="" w="9525">
                   <a:solidFill>
                     <a:srgbClr val="000000"/>
                   </a:solidFill>
@@ -883,7 +883,7 @@
             </a:ln>
             <a:extLst>
               <a:ext uri="{91240B29-F687-4f45-9708-019B960494DF}">
-                <a14:hiddenLine xmlns="" xmlns:a14="http://schemas.microsoft.com/office/drawing/2010/main" w="9525">
+                <a14:hiddenLine xmlns:a14="http://schemas.microsoft.com/office/drawing/2010/main" xmlns="" w="9525">
                   <a:solidFill>
                     <a:srgbClr val="000000"/>
                   </a:solidFill>
@@ -973,7 +973,7 @@
             </a:ln>
             <a:extLst>
               <a:ext uri="{91240B29-F687-4f45-9708-019B960494DF}">
-                <a14:hiddenLine xmlns="" xmlns:a14="http://schemas.microsoft.com/office/drawing/2010/main" w="9525">
+                <a14:hiddenLine xmlns:a14="http://schemas.microsoft.com/office/drawing/2010/main" xmlns="" w="9525">
                   <a:solidFill>
                     <a:srgbClr val="000000"/>
                   </a:solidFill>
@@ -1063,7 +1063,7 @@
             </a:ln>
             <a:extLst>
               <a:ext uri="{91240B29-F687-4f45-9708-019B960494DF}">
-                <a14:hiddenLine xmlns="" xmlns:a14="http://schemas.microsoft.com/office/drawing/2010/main" w="9525">
+                <a14:hiddenLine xmlns:a14="http://schemas.microsoft.com/office/drawing/2010/main" xmlns="" w="9525">
                   <a:solidFill>
                     <a:srgbClr val="000000"/>
                   </a:solidFill>
@@ -1125,7 +1125,7 @@
             </a:ln>
             <a:extLst>
               <a:ext uri="{91240B29-F687-4f45-9708-019B960494DF}">
-                <a14:hiddenLine xmlns="" xmlns:a14="http://schemas.microsoft.com/office/drawing/2010/main" w="9525">
+                <a14:hiddenLine xmlns:a14="http://schemas.microsoft.com/office/drawing/2010/main" xmlns="" w="9525">
                   <a:solidFill>
                     <a:srgbClr val="000000"/>
                   </a:solidFill>
@@ -1235,7 +1235,7 @@
             </a:ln>
             <a:extLst>
               <a:ext uri="{91240B29-F687-4f45-9708-019B960494DF}">
-                <a14:hiddenLine xmlns="" xmlns:a14="http://schemas.microsoft.com/office/drawing/2010/main" w="9525">
+                <a14:hiddenLine xmlns:a14="http://schemas.microsoft.com/office/drawing/2010/main" xmlns="" w="9525">
                   <a:solidFill>
                     <a:srgbClr val="000000"/>
                   </a:solidFill>
@@ -1297,7 +1297,7 @@
             </a:ln>
             <a:extLst>
               <a:ext uri="{91240B29-F687-4f45-9708-019B960494DF}">
-                <a14:hiddenLine xmlns="" xmlns:a14="http://schemas.microsoft.com/office/drawing/2010/main" w="9525">
+                <a14:hiddenLine xmlns:a14="http://schemas.microsoft.com/office/drawing/2010/main" xmlns="" w="9525">
                   <a:solidFill>
                     <a:srgbClr val="000000"/>
                   </a:solidFill>
@@ -1387,7 +1387,7 @@
             </a:ln>
             <a:extLst>
               <a:ext uri="{91240B29-F687-4f45-9708-019B960494DF}">
-                <a14:hiddenLine xmlns="" xmlns:a14="http://schemas.microsoft.com/office/drawing/2010/main" w="9525">
+                <a14:hiddenLine xmlns:a14="http://schemas.microsoft.com/office/drawing/2010/main" xmlns="" w="9525">
                   <a:solidFill>
                     <a:srgbClr val="000000"/>
                   </a:solidFill>
@@ -1477,7 +1477,7 @@
             </a:ln>
             <a:extLst>
               <a:ext uri="{91240B29-F687-4f45-9708-019B960494DF}">
-                <a14:hiddenLine xmlns="" xmlns:a14="http://schemas.microsoft.com/office/drawing/2010/main" w="9525">
+                <a14:hiddenLine xmlns:a14="http://schemas.microsoft.com/office/drawing/2010/main" xmlns="" w="9525">
                   <a:solidFill>
                     <a:srgbClr val="000000"/>
                   </a:solidFill>
@@ -1539,7 +1539,7 @@
             </a:ln>
             <a:extLst>
               <a:ext uri="{91240B29-F687-4f45-9708-019B960494DF}">
-                <a14:hiddenLine xmlns="" xmlns:a14="http://schemas.microsoft.com/office/drawing/2010/main" w="9525">
+                <a14:hiddenLine xmlns:a14="http://schemas.microsoft.com/office/drawing/2010/main" xmlns="" w="9525">
                   <a:solidFill>
                     <a:srgbClr val="000000"/>
                   </a:solidFill>
@@ -1629,7 +1629,7 @@
             </a:ln>
             <a:extLst>
               <a:ext uri="{91240B29-F687-4f45-9708-019B960494DF}">
-                <a14:hiddenLine xmlns="" xmlns:a14="http://schemas.microsoft.com/office/drawing/2010/main" w="9525">
+                <a14:hiddenLine xmlns:a14="http://schemas.microsoft.com/office/drawing/2010/main" xmlns="" w="9525">
                   <a:solidFill>
                     <a:srgbClr val="000000"/>
                   </a:solidFill>
@@ -1719,7 +1719,7 @@
             </a:ln>
             <a:extLst>
               <a:ext uri="{91240B29-F687-4f45-9708-019B960494DF}">
-                <a14:hiddenLine xmlns="" xmlns:a14="http://schemas.microsoft.com/office/drawing/2010/main" w="9525">
+                <a14:hiddenLine xmlns:a14="http://schemas.microsoft.com/office/drawing/2010/main" xmlns="" w="9525">
                   <a:solidFill>
                     <a:srgbClr val="000000"/>
                   </a:solidFill>
@@ -1775,7 +1775,7 @@
             </a:ln>
             <a:extLst>
               <a:ext uri="{91240B29-F687-4f45-9708-019B960494DF}">
-                <a14:hiddenLine xmlns="" xmlns:a14="http://schemas.microsoft.com/office/drawing/2010/main" w="9525">
+                <a14:hiddenLine xmlns:a14="http://schemas.microsoft.com/office/drawing/2010/main" xmlns="" w="9525">
                   <a:solidFill>
                     <a:srgbClr val="000000"/>
                   </a:solidFill>
@@ -1865,7 +1865,7 @@
             </a:ln>
             <a:extLst>
               <a:ext uri="{91240B29-F687-4f45-9708-019B960494DF}">
-                <a14:hiddenLine xmlns="" xmlns:a14="http://schemas.microsoft.com/office/drawing/2010/main" w="9525">
+                <a14:hiddenLine xmlns:a14="http://schemas.microsoft.com/office/drawing/2010/main" xmlns="" w="9525">
                   <a:solidFill>
                     <a:srgbClr val="000000"/>
                   </a:solidFill>
@@ -1921,7 +1921,7 @@
             </a:ln>
             <a:extLst>
               <a:ext uri="{91240B29-F687-4f45-9708-019B960494DF}">
-                <a14:hiddenLine xmlns="" xmlns:a14="http://schemas.microsoft.com/office/drawing/2010/main" w="9525">
+                <a14:hiddenLine xmlns:a14="http://schemas.microsoft.com/office/drawing/2010/main" xmlns="" w="9525">
                   <a:solidFill>
                     <a:srgbClr val="000000"/>
                   </a:solidFill>
@@ -2011,7 +2011,7 @@
             </a:ln>
             <a:extLst>
               <a:ext uri="{91240B29-F687-4f45-9708-019B960494DF}">
-                <a14:hiddenLine xmlns="" xmlns:a14="http://schemas.microsoft.com/office/drawing/2010/main" w="9525">
+                <a14:hiddenLine xmlns:a14="http://schemas.microsoft.com/office/drawing/2010/main" xmlns="" w="9525">
                   <a:solidFill>
                     <a:srgbClr val="000000"/>
                   </a:solidFill>
@@ -2079,7 +2079,7 @@
             </a:ln>
             <a:extLst>
               <a:ext uri="{91240B29-F687-4f45-9708-019B960494DF}">
-                <a14:hiddenLine xmlns="" xmlns:a14="http://schemas.microsoft.com/office/drawing/2010/main" w="9525">
+                <a14:hiddenLine xmlns:a14="http://schemas.microsoft.com/office/drawing/2010/main" xmlns="" w="9525">
                   <a:solidFill>
                     <a:srgbClr val="000000"/>
                   </a:solidFill>
@@ -2169,7 +2169,7 @@
             </a:ln>
             <a:extLst>
               <a:ext uri="{91240B29-F687-4f45-9708-019B960494DF}">
-                <a14:hiddenLine xmlns="" xmlns:a14="http://schemas.microsoft.com/office/drawing/2010/main" w="9525">
+                <a14:hiddenLine xmlns:a14="http://schemas.microsoft.com/office/drawing/2010/main" xmlns="" w="9525">
                   <a:solidFill>
                     <a:srgbClr val="000000"/>
                   </a:solidFill>
@@ -2237,7 +2237,7 @@
             </a:ln>
             <a:extLst>
               <a:ext uri="{91240B29-F687-4f45-9708-019B960494DF}">
-                <a14:hiddenLine xmlns="" xmlns:a14="http://schemas.microsoft.com/office/drawing/2010/main" w="9525">
+                <a14:hiddenLine xmlns:a14="http://schemas.microsoft.com/office/drawing/2010/main" xmlns="" w="9525">
                   <a:solidFill>
                     <a:srgbClr val="000000"/>
                   </a:solidFill>
@@ -2327,7 +2327,7 @@
             </a:ln>
             <a:extLst>
               <a:ext uri="{91240B29-F687-4f45-9708-019B960494DF}">
-                <a14:hiddenLine xmlns="" xmlns:a14="http://schemas.microsoft.com/office/drawing/2010/main" w="9525">
+                <a14:hiddenLine xmlns:a14="http://schemas.microsoft.com/office/drawing/2010/main" xmlns="" w="9525">
                   <a:solidFill>
                     <a:srgbClr val="000000"/>
                   </a:solidFill>
@@ -2361,7 +2361,7 @@
             </a:ln>
             <a:extLst>
               <a:ext uri="{91240B29-F687-4f45-9708-019B960494DF}">
-                <a14:hiddenLine xmlns="" xmlns:a14="http://schemas.microsoft.com/office/drawing/2010/main" w="9525">
+                <a14:hiddenLine xmlns:a14="http://schemas.microsoft.com/office/drawing/2010/main" xmlns="" w="9525">
                   <a:solidFill>
                     <a:srgbClr val="000000"/>
                   </a:solidFill>
@@ -2451,7 +2451,7 @@
             </a:ln>
             <a:extLst>
               <a:ext uri="{91240B29-F687-4f45-9708-019B960494DF}">
-                <a14:hiddenLine xmlns="" xmlns:a14="http://schemas.microsoft.com/office/drawing/2010/main" w="9525">
+                <a14:hiddenLine xmlns:a14="http://schemas.microsoft.com/office/drawing/2010/main" xmlns="" w="9525">
                   <a:solidFill>
                     <a:srgbClr val="000000"/>
                   </a:solidFill>
@@ -2513,7 +2513,7 @@
             </a:ln>
             <a:extLst>
               <a:ext uri="{91240B29-F687-4f45-9708-019B960494DF}">
-                <a14:hiddenLine xmlns="" xmlns:a14="http://schemas.microsoft.com/office/drawing/2010/main" w="9525">
+                <a14:hiddenLine xmlns:a14="http://schemas.microsoft.com/office/drawing/2010/main" xmlns="" w="9525">
                   <a:solidFill>
                     <a:srgbClr val="000000"/>
                   </a:solidFill>
@@ -2575,7 +2575,7 @@
             </a:ln>
             <a:extLst>
               <a:ext uri="{91240B29-F687-4f45-9708-019B960494DF}">
-                <a14:hiddenLine xmlns="" xmlns:a14="http://schemas.microsoft.com/office/drawing/2010/main" w="9525">
+                <a14:hiddenLine xmlns:a14="http://schemas.microsoft.com/office/drawing/2010/main" xmlns="" w="9525">
                   <a:solidFill>
                     <a:srgbClr val="000000"/>
                   </a:solidFill>
@@ -2665,7 +2665,7 @@
             </a:ln>
             <a:extLst>
               <a:ext uri="{91240B29-F687-4f45-9708-019B960494DF}">
-                <a14:hiddenLine xmlns="" xmlns:a14="http://schemas.microsoft.com/office/drawing/2010/main" w="9525">
+                <a14:hiddenLine xmlns:a14="http://schemas.microsoft.com/office/drawing/2010/main" xmlns="" w="9525">
                   <a:solidFill>
                     <a:srgbClr val="000000"/>
                   </a:solidFill>
@@ -2733,7 +2733,7 @@
             </a:ln>
             <a:extLst>
               <a:ext uri="{91240B29-F687-4f45-9708-019B960494DF}">
-                <a14:hiddenLine xmlns="" xmlns:a14="http://schemas.microsoft.com/office/drawing/2010/main" w="9525">
+                <a14:hiddenLine xmlns:a14="http://schemas.microsoft.com/office/drawing/2010/main" xmlns="" w="9525">
                   <a:solidFill>
                     <a:srgbClr val="000000"/>
                   </a:solidFill>
@@ -2795,7 +2795,7 @@
             </a:ln>
             <a:extLst>
               <a:ext uri="{91240B29-F687-4f45-9708-019B960494DF}">
-                <a14:hiddenLine xmlns="" xmlns:a14="http://schemas.microsoft.com/office/drawing/2010/main" w="9525">
+                <a14:hiddenLine xmlns:a14="http://schemas.microsoft.com/office/drawing/2010/main" xmlns="" w="9525">
                   <a:solidFill>
                     <a:srgbClr val="000000"/>
                   </a:solidFill>
@@ -2885,7 +2885,7 @@
             </a:ln>
             <a:extLst>
               <a:ext uri="{91240B29-F687-4f45-9708-019B960494DF}">
-                <a14:hiddenLine xmlns="" xmlns:a14="http://schemas.microsoft.com/office/drawing/2010/main" w="9525">
+                <a14:hiddenLine xmlns:a14="http://schemas.microsoft.com/office/drawing/2010/main" xmlns="" w="9525">
                   <a:solidFill>
                     <a:srgbClr val="000000"/>
                   </a:solidFill>
@@ -2947,7 +2947,7 @@
             </a:ln>
             <a:extLst>
               <a:ext uri="{91240B29-F687-4f45-9708-019B960494DF}">
-                <a14:hiddenLine xmlns="" xmlns:a14="http://schemas.microsoft.com/office/drawing/2010/main" w="9525">
+                <a14:hiddenLine xmlns:a14="http://schemas.microsoft.com/office/drawing/2010/main" xmlns="" w="9525">
                   <a:solidFill>
                     <a:srgbClr val="000000"/>
                   </a:solidFill>
@@ -3037,7 +3037,7 @@
             </a:ln>
             <a:extLst>
               <a:ext uri="{91240B29-F687-4f45-9708-019B960494DF}">
-                <a14:hiddenLine xmlns="" xmlns:a14="http://schemas.microsoft.com/office/drawing/2010/main" w="9525">
+                <a14:hiddenLine xmlns:a14="http://schemas.microsoft.com/office/drawing/2010/main" xmlns="" w="9525">
                   <a:solidFill>
                     <a:srgbClr val="000000"/>
                   </a:solidFill>
@@ -3099,7 +3099,7 @@
             </a:ln>
             <a:extLst>
               <a:ext uri="{91240B29-F687-4f45-9708-019B960494DF}">
-                <a14:hiddenLine xmlns="" xmlns:a14="http://schemas.microsoft.com/office/drawing/2010/main" w="9525">
+                <a14:hiddenLine xmlns:a14="http://schemas.microsoft.com/office/drawing/2010/main" xmlns="" w="9525">
                   <a:solidFill>
                     <a:srgbClr val="000000"/>
                   </a:solidFill>
@@ -3189,7 +3189,7 @@
             </a:ln>
             <a:extLst>
               <a:ext uri="{91240B29-F687-4f45-9708-019B960494DF}">
-                <a14:hiddenLine xmlns="" xmlns:a14="http://schemas.microsoft.com/office/drawing/2010/main" w="9525">
+                <a14:hiddenLine xmlns:a14="http://schemas.microsoft.com/office/drawing/2010/main" xmlns="" w="9525">
                   <a:solidFill>
                     <a:srgbClr val="000000"/>
                   </a:solidFill>
@@ -3223,7 +3223,7 @@
             </a:ln>
             <a:extLst>
               <a:ext uri="{91240B29-F687-4f45-9708-019B960494DF}">
-                <a14:hiddenLine xmlns="" xmlns:a14="http://schemas.microsoft.com/office/drawing/2010/main" w="9525">
+                <a14:hiddenLine xmlns:a14="http://schemas.microsoft.com/office/drawing/2010/main" xmlns="" w="9525">
                   <a:solidFill>
                     <a:srgbClr val="000000"/>
                   </a:solidFill>
@@ -3288,7 +3288,7 @@
             </a:ln>
             <a:extLst>
               <a:ext uri="{91240B29-F687-4f45-9708-019B960494DF}">
-                <a14:hiddenLine xmlns="" xmlns:a14="http://schemas.microsoft.com/office/drawing/2010/main" w="9525">
+                <a14:hiddenLine xmlns:a14="http://schemas.microsoft.com/office/drawing/2010/main" xmlns="" w="9525">
                   <a:solidFill>
                     <a:srgbClr val="000000"/>
                   </a:solidFill>
@@ -3378,7 +3378,7 @@
             </a:ln>
             <a:extLst>
               <a:ext uri="{91240B29-F687-4f45-9708-019B960494DF}">
-                <a14:hiddenLine xmlns="" xmlns:a14="http://schemas.microsoft.com/office/drawing/2010/main" w="9525">
+                <a14:hiddenLine xmlns:a14="http://schemas.microsoft.com/office/drawing/2010/main" xmlns="" w="9525">
                   <a:solidFill>
                     <a:srgbClr val="000000"/>
                   </a:solidFill>
@@ -3440,7 +3440,7 @@
             </a:ln>
             <a:extLst>
               <a:ext uri="{91240B29-F687-4f45-9708-019B960494DF}">
-                <a14:hiddenLine xmlns="" xmlns:a14="http://schemas.microsoft.com/office/drawing/2010/main" w="9525">
+                <a14:hiddenLine xmlns:a14="http://schemas.microsoft.com/office/drawing/2010/main" xmlns="" w="9525">
                   <a:solidFill>
                     <a:srgbClr val="000000"/>
                   </a:solidFill>
@@ -3530,7 +3530,7 @@
             </a:ln>
             <a:extLst>
               <a:ext uri="{91240B29-F687-4f45-9708-019B960494DF}">
-                <a14:hiddenLine xmlns="" xmlns:a14="http://schemas.microsoft.com/office/drawing/2010/main" w="9525">
+                <a14:hiddenLine xmlns:a14="http://schemas.microsoft.com/office/drawing/2010/main" xmlns="" w="9525">
                   <a:solidFill>
                     <a:srgbClr val="000000"/>
                   </a:solidFill>
@@ -3620,7 +3620,7 @@
             </a:ln>
             <a:extLst>
               <a:ext uri="{91240B29-F687-4f45-9708-019B960494DF}">
-                <a14:hiddenLine xmlns="" xmlns:a14="http://schemas.microsoft.com/office/drawing/2010/main" w="9525">
+                <a14:hiddenLine xmlns:a14="http://schemas.microsoft.com/office/drawing/2010/main" xmlns="" w="9525">
                   <a:solidFill>
                     <a:srgbClr val="000000"/>
                   </a:solidFill>
@@ -3685,7 +3685,7 @@
             </a:ln>
             <a:extLst>
               <a:ext uri="{91240B29-F687-4f45-9708-019B960494DF}">
-                <a14:hiddenLine xmlns="" xmlns:a14="http://schemas.microsoft.com/office/drawing/2010/main" w="9525">
+                <a14:hiddenLine xmlns:a14="http://schemas.microsoft.com/office/drawing/2010/main" xmlns="" w="9525">
                   <a:solidFill>
                     <a:srgbClr val="000000"/>
                   </a:solidFill>
@@ -3747,7 +3747,7 @@
             </a:ln>
             <a:extLst>
               <a:ext uri="{91240B29-F687-4f45-9708-019B960494DF}">
-                <a14:hiddenLine xmlns="" xmlns:a14="http://schemas.microsoft.com/office/drawing/2010/main" w="9525">
+                <a14:hiddenLine xmlns:a14="http://schemas.microsoft.com/office/drawing/2010/main" xmlns="" w="9525">
                   <a:solidFill>
                     <a:srgbClr val="000000"/>
                   </a:solidFill>
@@ -3837,7 +3837,7 @@
             </a:ln>
             <a:extLst>
               <a:ext uri="{91240B29-F687-4f45-9708-019B960494DF}">
-                <a14:hiddenLine xmlns="" xmlns:a14="http://schemas.microsoft.com/office/drawing/2010/main" w="9525">
+                <a14:hiddenLine xmlns:a14="http://schemas.microsoft.com/office/drawing/2010/main" xmlns="" w="9525">
                   <a:solidFill>
                     <a:srgbClr val="000000"/>
                   </a:solidFill>
@@ -3927,7 +3927,7 @@
             </a:ln>
             <a:extLst>
               <a:ext uri="{91240B29-F687-4f45-9708-019B960494DF}">
-                <a14:hiddenLine xmlns="" xmlns:a14="http://schemas.microsoft.com/office/drawing/2010/main" w="9525">
+                <a14:hiddenLine xmlns:a14="http://schemas.microsoft.com/office/drawing/2010/main" xmlns="" w="9525">
                   <a:solidFill>
                     <a:srgbClr val="000000"/>
                   </a:solidFill>
@@ -3989,7 +3989,7 @@
             </a:ln>
             <a:extLst>
               <a:ext uri="{91240B29-F687-4f45-9708-019B960494DF}">
-                <a14:hiddenLine xmlns="" xmlns:a14="http://schemas.microsoft.com/office/drawing/2010/main" w="9525">
+                <a14:hiddenLine xmlns:a14="http://schemas.microsoft.com/office/drawing/2010/main" xmlns="" w="9525">
                   <a:solidFill>
                     <a:srgbClr val="000000"/>
                   </a:solidFill>
@@ -4109,7 +4109,7 @@
             </a:ln>
             <a:extLst>
               <a:ext uri="{91240B29-F687-4f45-9708-019B960494DF}">
-                <a14:hiddenLine xmlns="" xmlns:a14="http://schemas.microsoft.com/office/drawing/2010/main" w="9525">
+                <a14:hiddenLine xmlns:a14="http://schemas.microsoft.com/office/drawing/2010/main" xmlns="" w="9525">
                   <a:solidFill>
                     <a:srgbClr val="000000"/>
                   </a:solidFill>
@@ -4177,7 +4177,7 @@
             </a:ln>
             <a:extLst>
               <a:ext uri="{91240B29-F687-4f45-9708-019B960494DF}">
-                <a14:hiddenLine xmlns="" xmlns:a14="http://schemas.microsoft.com/office/drawing/2010/main" w="9525">
+                <a14:hiddenLine xmlns:a14="http://schemas.microsoft.com/office/drawing/2010/main" xmlns="" w="9525">
                   <a:solidFill>
                     <a:srgbClr val="000000"/>
                   </a:solidFill>
@@ -4267,7 +4267,7 @@
             </a:ln>
             <a:extLst>
               <a:ext uri="{91240B29-F687-4f45-9708-019B960494DF}">
-                <a14:hiddenLine xmlns="" xmlns:a14="http://schemas.microsoft.com/office/drawing/2010/main" w="9525">
+                <a14:hiddenLine xmlns:a14="http://schemas.microsoft.com/office/drawing/2010/main" xmlns="" w="9525">
                   <a:solidFill>
                     <a:srgbClr val="000000"/>
                   </a:solidFill>
@@ -8989,7 +8989,7 @@
           <a:noFill/>
           <a:extLst>
             <a:ext uri="{909E8E84-426E-40dd-AFC4-6F175D3DCCD1}">
-              <a14:hiddenFill xmlns="" xmlns:a14="http://schemas.microsoft.com/office/drawing/2010/main">
+              <a14:hiddenFill xmlns:a14="http://schemas.microsoft.com/office/drawing/2010/main" xmlns="">
                 <a:solidFill>
                   <a:srgbClr val="FFFFFF"/>
                 </a:solidFill>
@@ -9063,7 +9063,7 @@
               </a:ln>
               <a:extLst>
                 <a:ext uri="{91240B29-F687-4f45-9708-019B960494DF}">
-                  <a14:hiddenLine xmlns="" xmlns:a14="http://schemas.microsoft.com/office/drawing/2010/main" w="9525">
+                  <a14:hiddenLine xmlns:a14="http://schemas.microsoft.com/office/drawing/2010/main" xmlns="" w="9525">
                     <a:solidFill>
                       <a:srgbClr val="000000"/>
                     </a:solidFill>
@@ -9153,7 +9153,7 @@
               </a:ln>
               <a:extLst>
                 <a:ext uri="{91240B29-F687-4f45-9708-019B960494DF}">
-                  <a14:hiddenLine xmlns="" xmlns:a14="http://schemas.microsoft.com/office/drawing/2010/main" w="9525">
+                  <a14:hiddenLine xmlns:a14="http://schemas.microsoft.com/office/drawing/2010/main" xmlns="" w="9525">
                     <a:solidFill>
                       <a:srgbClr val="000000"/>
                     </a:solidFill>
@@ -9243,7 +9243,7 @@
               </a:ln>
               <a:extLst>
                 <a:ext uri="{91240B29-F687-4f45-9708-019B960494DF}">
-                  <a14:hiddenLine xmlns="" xmlns:a14="http://schemas.microsoft.com/office/drawing/2010/main" w="9525">
+                  <a14:hiddenLine xmlns:a14="http://schemas.microsoft.com/office/drawing/2010/main" xmlns="" w="9525">
                     <a:solidFill>
                       <a:srgbClr val="000000"/>
                     </a:solidFill>
@@ -9305,7 +9305,7 @@
               </a:ln>
               <a:extLst>
                 <a:ext uri="{91240B29-F687-4f45-9708-019B960494DF}">
-                  <a14:hiddenLine xmlns="" xmlns:a14="http://schemas.microsoft.com/office/drawing/2010/main" w="9525">
+                  <a14:hiddenLine xmlns:a14="http://schemas.microsoft.com/office/drawing/2010/main" xmlns="" w="9525">
                     <a:solidFill>
                       <a:srgbClr val="000000"/>
                     </a:solidFill>
@@ -9395,7 +9395,7 @@
               </a:ln>
               <a:extLst>
                 <a:ext uri="{91240B29-F687-4f45-9708-019B960494DF}">
-                  <a14:hiddenLine xmlns="" xmlns:a14="http://schemas.microsoft.com/office/drawing/2010/main" w="9525">
+                  <a14:hiddenLine xmlns:a14="http://schemas.microsoft.com/office/drawing/2010/main" xmlns="" w="9525">
                     <a:solidFill>
                       <a:srgbClr val="000000"/>
                     </a:solidFill>
@@ -9457,7 +9457,7 @@
               </a:ln>
               <a:extLst>
                 <a:ext uri="{91240B29-F687-4f45-9708-019B960494DF}">
-                  <a14:hiddenLine xmlns="" xmlns:a14="http://schemas.microsoft.com/office/drawing/2010/main" w="9525">
+                  <a14:hiddenLine xmlns:a14="http://schemas.microsoft.com/office/drawing/2010/main" xmlns="" w="9525">
                     <a:solidFill>
                       <a:srgbClr val="000000"/>
                     </a:solidFill>
@@ -9519,7 +9519,7 @@
               </a:ln>
               <a:extLst>
                 <a:ext uri="{91240B29-F687-4f45-9708-019B960494DF}">
-                  <a14:hiddenLine xmlns="" xmlns:a14="http://schemas.microsoft.com/office/drawing/2010/main" w="9525">
+                  <a14:hiddenLine xmlns:a14="http://schemas.microsoft.com/office/drawing/2010/main" xmlns="" w="9525">
                     <a:solidFill>
                       <a:srgbClr val="000000"/>
                     </a:solidFill>
@@ -9609,7 +9609,7 @@
               </a:ln>
               <a:extLst>
                 <a:ext uri="{91240B29-F687-4f45-9708-019B960494DF}">
-                  <a14:hiddenLine xmlns="" xmlns:a14="http://schemas.microsoft.com/office/drawing/2010/main" w="9525">
+                  <a14:hiddenLine xmlns:a14="http://schemas.microsoft.com/office/drawing/2010/main" xmlns="" w="9525">
                     <a:solidFill>
                       <a:srgbClr val="000000"/>
                     </a:solidFill>
@@ -9699,7 +9699,7 @@
               </a:ln>
               <a:extLst>
                 <a:ext uri="{91240B29-F687-4f45-9708-019B960494DF}">
-                  <a14:hiddenLine xmlns="" xmlns:a14="http://schemas.microsoft.com/office/drawing/2010/main" w="9525">
+                  <a14:hiddenLine xmlns:a14="http://schemas.microsoft.com/office/drawing/2010/main" xmlns="" w="9525">
                     <a:solidFill>
                       <a:srgbClr val="000000"/>
                     </a:solidFill>
@@ -9761,7 +9761,7 @@
               </a:ln>
               <a:extLst>
                 <a:ext uri="{91240B29-F687-4f45-9708-019B960494DF}">
-                  <a14:hiddenLine xmlns="" xmlns:a14="http://schemas.microsoft.com/office/drawing/2010/main" w="9525">
+                  <a14:hiddenLine xmlns:a14="http://schemas.microsoft.com/office/drawing/2010/main" xmlns="" w="9525">
                     <a:solidFill>
                       <a:srgbClr val="000000"/>
                     </a:solidFill>
@@ -9871,7 +9871,7 @@
               </a:ln>
               <a:extLst>
                 <a:ext uri="{91240B29-F687-4f45-9708-019B960494DF}">
-                  <a14:hiddenLine xmlns="" xmlns:a14="http://schemas.microsoft.com/office/drawing/2010/main" w="9525">
+                  <a14:hiddenLine xmlns:a14="http://schemas.microsoft.com/office/drawing/2010/main" xmlns="" w="9525">
                     <a:solidFill>
                       <a:srgbClr val="000000"/>
                     </a:solidFill>
@@ -9955,7 +9955,7 @@
               </a:ln>
               <a:extLst>
                 <a:ext uri="{91240B29-F687-4f45-9708-019B960494DF}">
-                  <a14:hiddenLine xmlns="" xmlns:a14="http://schemas.microsoft.com/office/drawing/2010/main" w="9525">
+                  <a14:hiddenLine xmlns:a14="http://schemas.microsoft.com/office/drawing/2010/main" xmlns="" w="9525">
                     <a:solidFill>
                       <a:srgbClr val="000000"/>
                     </a:solidFill>
@@ -10017,7 +10017,7 @@
               </a:ln>
               <a:extLst>
                 <a:ext uri="{91240B29-F687-4f45-9708-019B960494DF}">
-                  <a14:hiddenLine xmlns="" xmlns:a14="http://schemas.microsoft.com/office/drawing/2010/main" w="9525">
+                  <a14:hiddenLine xmlns:a14="http://schemas.microsoft.com/office/drawing/2010/main" xmlns="" w="9525">
                     <a:solidFill>
                       <a:srgbClr val="000000"/>
                     </a:solidFill>
@@ -10079,7 +10079,7 @@
               </a:ln>
               <a:extLst>
                 <a:ext uri="{91240B29-F687-4f45-9708-019B960494DF}">
-                  <a14:hiddenLine xmlns="" xmlns:a14="http://schemas.microsoft.com/office/drawing/2010/main" w="9525">
+                  <a14:hiddenLine xmlns:a14="http://schemas.microsoft.com/office/drawing/2010/main" xmlns="" w="9525">
                     <a:solidFill>
                       <a:srgbClr val="000000"/>
                     </a:solidFill>
@@ -10169,7 +10169,7 @@
               </a:ln>
               <a:extLst>
                 <a:ext uri="{91240B29-F687-4f45-9708-019B960494DF}">
-                  <a14:hiddenLine xmlns="" xmlns:a14="http://schemas.microsoft.com/office/drawing/2010/main" w="9525">
+                  <a14:hiddenLine xmlns:a14="http://schemas.microsoft.com/office/drawing/2010/main" xmlns="" w="9525">
                     <a:solidFill>
                       <a:srgbClr val="000000"/>
                     </a:solidFill>
@@ -10203,7 +10203,7 @@
               </a:ln>
               <a:extLst>
                 <a:ext uri="{91240B29-F687-4f45-9708-019B960494DF}">
-                  <a14:hiddenLine xmlns="" xmlns:a14="http://schemas.microsoft.com/office/drawing/2010/main" w="9525">
+                  <a14:hiddenLine xmlns:a14="http://schemas.microsoft.com/office/drawing/2010/main" xmlns="" w="9525">
                     <a:solidFill>
                       <a:srgbClr val="000000"/>
                     </a:solidFill>
@@ -10268,7 +10268,7 @@
               </a:ln>
               <a:extLst>
                 <a:ext uri="{91240B29-F687-4f45-9708-019B960494DF}">
-                  <a14:hiddenLine xmlns="" xmlns:a14="http://schemas.microsoft.com/office/drawing/2010/main" w="9525">
+                  <a14:hiddenLine xmlns:a14="http://schemas.microsoft.com/office/drawing/2010/main" xmlns="" w="9525">
                     <a:solidFill>
                       <a:srgbClr val="000000"/>
                     </a:solidFill>
@@ -10358,7 +10358,7 @@
               </a:ln>
               <a:extLst>
                 <a:ext uri="{91240B29-F687-4f45-9708-019B960494DF}">
-                  <a14:hiddenLine xmlns="" xmlns:a14="http://schemas.microsoft.com/office/drawing/2010/main" w="9525">
+                  <a14:hiddenLine xmlns:a14="http://schemas.microsoft.com/office/drawing/2010/main" xmlns="" w="9525">
                     <a:solidFill>
                       <a:srgbClr val="000000"/>
                     </a:solidFill>
@@ -10420,7 +10420,7 @@
               </a:ln>
               <a:extLst>
                 <a:ext uri="{91240B29-F687-4f45-9708-019B960494DF}">
-                  <a14:hiddenLine xmlns="" xmlns:a14="http://schemas.microsoft.com/office/drawing/2010/main" w="9525">
+                  <a14:hiddenLine xmlns:a14="http://schemas.microsoft.com/office/drawing/2010/main" xmlns="" w="9525">
                     <a:solidFill>
                       <a:srgbClr val="000000"/>
                     </a:solidFill>
@@ -10510,7 +10510,7 @@
               </a:ln>
               <a:extLst>
                 <a:ext uri="{91240B29-F687-4f45-9708-019B960494DF}">
-                  <a14:hiddenLine xmlns="" xmlns:a14="http://schemas.microsoft.com/office/drawing/2010/main" w="9525">
+                  <a14:hiddenLine xmlns:a14="http://schemas.microsoft.com/office/drawing/2010/main" xmlns="" w="9525">
                     <a:solidFill>
                       <a:srgbClr val="000000"/>
                     </a:solidFill>
@@ -10575,7 +10575,7 @@
               </a:ln>
               <a:extLst>
                 <a:ext uri="{91240B29-F687-4f45-9708-019B960494DF}">
-                  <a14:hiddenLine xmlns="" xmlns:a14="http://schemas.microsoft.com/office/drawing/2010/main" w="9525">
+                  <a14:hiddenLine xmlns:a14="http://schemas.microsoft.com/office/drawing/2010/main" xmlns="" w="9525">
                     <a:solidFill>
                       <a:srgbClr val="000000"/>
                     </a:solidFill>
@@ -10637,7 +10637,7 @@
               </a:ln>
               <a:extLst>
                 <a:ext uri="{91240B29-F687-4f45-9708-019B960494DF}">
-                  <a14:hiddenLine xmlns="" xmlns:a14="http://schemas.microsoft.com/office/drawing/2010/main" w="9525">
+                  <a14:hiddenLine xmlns:a14="http://schemas.microsoft.com/office/drawing/2010/main" xmlns="" w="9525">
                     <a:solidFill>
                       <a:srgbClr val="000000"/>
                     </a:solidFill>
@@ -10727,7 +10727,7 @@
               </a:ln>
               <a:extLst>
                 <a:ext uri="{91240B29-F687-4f45-9708-019B960494DF}">
-                  <a14:hiddenLine xmlns="" xmlns:a14="http://schemas.microsoft.com/office/drawing/2010/main" w="9525">
+                  <a14:hiddenLine xmlns:a14="http://schemas.microsoft.com/office/drawing/2010/main" xmlns="" w="9525">
                     <a:solidFill>
                       <a:srgbClr val="000000"/>
                     </a:solidFill>
@@ -10817,7 +10817,7 @@
               </a:ln>
               <a:extLst>
                 <a:ext uri="{91240B29-F687-4f45-9708-019B960494DF}">
-                  <a14:hiddenLine xmlns="" xmlns:a14="http://schemas.microsoft.com/office/drawing/2010/main" w="9525">
+                  <a14:hiddenLine xmlns:a14="http://schemas.microsoft.com/office/drawing/2010/main" xmlns="" w="9525">
                     <a:solidFill>
                       <a:srgbClr val="000000"/>
                     </a:solidFill>
@@ -10882,7 +10882,7 @@
               </a:ln>
               <a:extLst>
                 <a:ext uri="{91240B29-F687-4f45-9708-019B960494DF}">
-                  <a14:hiddenLine xmlns="" xmlns:a14="http://schemas.microsoft.com/office/drawing/2010/main" w="9525">
+                  <a14:hiddenLine xmlns:a14="http://schemas.microsoft.com/office/drawing/2010/main" xmlns="" w="9525">
                     <a:solidFill>
                       <a:srgbClr val="000000"/>
                     </a:solidFill>
@@ -11002,7 +11002,7 @@
               </a:ln>
               <a:extLst>
                 <a:ext uri="{91240B29-F687-4f45-9708-019B960494DF}">
-                  <a14:hiddenLine xmlns="" xmlns:a14="http://schemas.microsoft.com/office/drawing/2010/main" w="9525">
+                  <a14:hiddenLine xmlns:a14="http://schemas.microsoft.com/office/drawing/2010/main" xmlns="" w="9525">
                     <a:solidFill>
                       <a:srgbClr val="000000"/>
                     </a:solidFill>
@@ -11100,7 +11100,7 @@
               </a:ln>
               <a:extLst>
                 <a:ext uri="{91240B29-F687-4f45-9708-019B960494DF}">
-                  <a14:hiddenLine xmlns="" xmlns:a14="http://schemas.microsoft.com/office/drawing/2010/main" w="9525">
+                  <a14:hiddenLine xmlns:a14="http://schemas.microsoft.com/office/drawing/2010/main" xmlns="" w="9525">
                     <a:solidFill>
                       <a:srgbClr val="000000"/>
                     </a:solidFill>
@@ -11215,7 +11215,7 @@
               </a:ln>
               <a:extLst>
                 <a:ext uri="{91240B29-F687-4f45-9708-019B960494DF}">
-                  <a14:hiddenLine xmlns="" xmlns:a14="http://schemas.microsoft.com/office/drawing/2010/main" w="9525">
+                  <a14:hiddenLine xmlns:a14="http://schemas.microsoft.com/office/drawing/2010/main" xmlns="" w="9525">
                     <a:solidFill>
                       <a:srgbClr val="000000"/>
                     </a:solidFill>
@@ -11305,7 +11305,7 @@
               </a:ln>
               <a:extLst>
                 <a:ext uri="{91240B29-F687-4f45-9708-019B960494DF}">
-                  <a14:hiddenLine xmlns="" xmlns:a14="http://schemas.microsoft.com/office/drawing/2010/main" w="9525">
+                  <a14:hiddenLine xmlns:a14="http://schemas.microsoft.com/office/drawing/2010/main" xmlns="" w="9525">
                     <a:solidFill>
                       <a:srgbClr val="000000"/>
                     </a:solidFill>
@@ -11370,7 +11370,7 @@
               </a:ln>
               <a:extLst>
                 <a:ext uri="{91240B29-F687-4f45-9708-019B960494DF}">
-                  <a14:hiddenLine xmlns="" xmlns:a14="http://schemas.microsoft.com/office/drawing/2010/main" w="9525">
+                  <a14:hiddenLine xmlns:a14="http://schemas.microsoft.com/office/drawing/2010/main" xmlns="" w="9525">
                     <a:solidFill>
                       <a:srgbClr val="000000"/>
                     </a:solidFill>
@@ -11460,7 +11460,7 @@
               </a:ln>
               <a:extLst>
                 <a:ext uri="{91240B29-F687-4f45-9708-019B960494DF}">
-                  <a14:hiddenLine xmlns="" xmlns:a14="http://schemas.microsoft.com/office/drawing/2010/main" w="9525">
+                  <a14:hiddenLine xmlns:a14="http://schemas.microsoft.com/office/drawing/2010/main" xmlns="" w="9525">
                     <a:solidFill>
                       <a:srgbClr val="000000"/>
                     </a:solidFill>
@@ -11528,7 +11528,7 @@
               </a:ln>
               <a:extLst>
                 <a:ext uri="{91240B29-F687-4f45-9708-019B960494DF}">
-                  <a14:hiddenLine xmlns="" xmlns:a14="http://schemas.microsoft.com/office/drawing/2010/main" w="9525">
+                  <a14:hiddenLine xmlns:a14="http://schemas.microsoft.com/office/drawing/2010/main" xmlns="" w="9525">
                     <a:solidFill>
                       <a:srgbClr val="000000"/>
                     </a:solidFill>
@@ -11618,7 +11618,7 @@
               </a:ln>
               <a:extLst>
                 <a:ext uri="{91240B29-F687-4f45-9708-019B960494DF}">
-                  <a14:hiddenLine xmlns="" xmlns:a14="http://schemas.microsoft.com/office/drawing/2010/main" w="9525">
+                  <a14:hiddenLine xmlns:a14="http://schemas.microsoft.com/office/drawing/2010/main" xmlns="" w="9525">
                     <a:solidFill>
                       <a:srgbClr val="000000"/>
                     </a:solidFill>
@@ -11686,7 +11686,7 @@
               </a:ln>
               <a:extLst>
                 <a:ext uri="{91240B29-F687-4f45-9708-019B960494DF}">
-                  <a14:hiddenLine xmlns="" xmlns:a14="http://schemas.microsoft.com/office/drawing/2010/main" w="9525">
+                  <a14:hiddenLine xmlns:a14="http://schemas.microsoft.com/office/drawing/2010/main" xmlns="" w="9525">
                     <a:solidFill>
                       <a:srgbClr val="000000"/>
                     </a:solidFill>
@@ -11776,7 +11776,7 @@
               </a:ln>
               <a:extLst>
                 <a:ext uri="{91240B29-F687-4f45-9708-019B960494DF}">
-                  <a14:hiddenLine xmlns="" xmlns:a14="http://schemas.microsoft.com/office/drawing/2010/main" w="9525">
+                  <a14:hiddenLine xmlns:a14="http://schemas.microsoft.com/office/drawing/2010/main" xmlns="" w="9525">
                     <a:solidFill>
                       <a:srgbClr val="000000"/>
                     </a:solidFill>
@@ -11810,7 +11810,7 @@
               </a:ln>
               <a:extLst>
                 <a:ext uri="{91240B29-F687-4f45-9708-019B960494DF}">
-                  <a14:hiddenLine xmlns="" xmlns:a14="http://schemas.microsoft.com/office/drawing/2010/main" w="9525">
+                  <a14:hiddenLine xmlns:a14="http://schemas.microsoft.com/office/drawing/2010/main" xmlns="" w="9525">
                     <a:solidFill>
                       <a:srgbClr val="000000"/>
                     </a:solidFill>
@@ -12527,7 +12527,7 @@
             <a:noFill/>
             <a:extLst>
               <a:ext uri="{909E8E84-426E-40dd-AFC4-6F175D3DCCD1}">
-                <a14:hiddenFill xmlns:a14="http://schemas.microsoft.com/office/drawing/2010/main" xmlns:p14="http://schemas.microsoft.com/office/powerpoint/2010/main" xmlns="">
+                <a14:hiddenFill xmlns="" xmlns:p14="http://schemas.microsoft.com/office/powerpoint/2010/main" xmlns:a14="http://schemas.microsoft.com/office/drawing/2010/main">
                   <a:solidFill>
                     <a:srgbClr val="FFFFFF"/>
                   </a:solidFill>
@@ -17238,13 +17238,8 @@
           <a:p>
             <a:r>
               <a:rPr lang="fr-FR" dirty="0"/>
-              <a:t>Multiprises (avec </a:t>
+              <a:t>Multiprises (avec du RAB)</a:t>
             </a:r>
-            <a:r>
-              <a:rPr lang="fr-FR"/>
-              <a:t>du RAB)</a:t>
-            </a:r>
-            <a:endParaRPr lang="fr-FR" dirty="0"/>
           </a:p>
           <a:p>
             <a:pPr lvl="1"/>
@@ -17263,8 +17258,12 @@
           <a:p>
             <a:pPr lvl="1"/>
             <a:r>
+              <a:rPr lang="fr-FR"/>
+              <a:t>2 000 </a:t>
+            </a:r>
+            <a:r>
               <a:rPr lang="fr-FR" dirty="0"/>
-              <a:t>2600 ampères avec rab</a:t>
+              <a:t>ampères avec rab</a:t>
             </a:r>
           </a:p>
         </p:txBody>
@@ -18604,7 +18603,7 @@
           <a:noFill/>
           <a:extLst>
             <a:ext uri="{909E8E84-426E-40dd-AFC4-6F175D3DCCD1}">
-              <a14:hiddenFill xmlns="" xmlns:p14="http://schemas.microsoft.com/office/powerpoint/2010/main" xmlns:a14="http://schemas.microsoft.com/office/drawing/2010/main">
+              <a14:hiddenFill xmlns:a14="http://schemas.microsoft.com/office/drawing/2010/main" xmlns:p14="http://schemas.microsoft.com/office/powerpoint/2010/main" xmlns="">
                 <a:solidFill>
                   <a:srgbClr val="FFFFFF"/>
                 </a:solidFill>
@@ -18716,7 +18715,7 @@
               </a:ln>
               <a:extLst>
                 <a:ext uri="{91240B29-F687-4f45-9708-019B960494DF}">
-                  <a14:hiddenLine xmlns="" xmlns:p14="http://schemas.microsoft.com/office/powerpoint/2010/main" xmlns:a14="http://schemas.microsoft.com/office/drawing/2010/main" w="9525">
+                  <a14:hiddenLine xmlns:a14="http://schemas.microsoft.com/office/drawing/2010/main" xmlns:p14="http://schemas.microsoft.com/office/powerpoint/2010/main" xmlns="" w="9525">
                     <a:solidFill>
                       <a:srgbClr val="000000"/>
                     </a:solidFill>
@@ -18818,7 +18817,7 @@
               </a:ln>
               <a:extLst>
                 <a:ext uri="{91240B29-F687-4f45-9708-019B960494DF}">
-                  <a14:hiddenLine xmlns="" xmlns:p14="http://schemas.microsoft.com/office/powerpoint/2010/main" xmlns:a14="http://schemas.microsoft.com/office/drawing/2010/main" w="9525">
+                  <a14:hiddenLine xmlns:a14="http://schemas.microsoft.com/office/drawing/2010/main" xmlns:p14="http://schemas.microsoft.com/office/powerpoint/2010/main" xmlns="" w="9525">
                     <a:solidFill>
                       <a:srgbClr val="000000"/>
                     </a:solidFill>
@@ -18920,7 +18919,7 @@
               </a:ln>
               <a:extLst>
                 <a:ext uri="{91240B29-F687-4f45-9708-019B960494DF}">
-                  <a14:hiddenLine xmlns="" xmlns:p14="http://schemas.microsoft.com/office/powerpoint/2010/main" xmlns:a14="http://schemas.microsoft.com/office/drawing/2010/main" w="9525">
+                  <a14:hiddenLine xmlns:a14="http://schemas.microsoft.com/office/drawing/2010/main" xmlns:p14="http://schemas.microsoft.com/office/powerpoint/2010/main" xmlns="" w="9525">
                     <a:solidFill>
                       <a:srgbClr val="000000"/>
                     </a:solidFill>
@@ -18994,7 +18993,7 @@
               </a:ln>
               <a:extLst>
                 <a:ext uri="{91240B29-F687-4f45-9708-019B960494DF}">
-                  <a14:hiddenLine xmlns="" xmlns:p14="http://schemas.microsoft.com/office/powerpoint/2010/main" xmlns:a14="http://schemas.microsoft.com/office/drawing/2010/main" w="9525">
+                  <a14:hiddenLine xmlns:a14="http://schemas.microsoft.com/office/drawing/2010/main" xmlns:p14="http://schemas.microsoft.com/office/powerpoint/2010/main" xmlns="" w="9525">
                     <a:solidFill>
                       <a:srgbClr val="000000"/>
                     </a:solidFill>
@@ -19096,7 +19095,7 @@
               </a:ln>
               <a:extLst>
                 <a:ext uri="{91240B29-F687-4f45-9708-019B960494DF}">
-                  <a14:hiddenLine xmlns="" xmlns:p14="http://schemas.microsoft.com/office/powerpoint/2010/main" xmlns:a14="http://schemas.microsoft.com/office/drawing/2010/main" w="9525">
+                  <a14:hiddenLine xmlns:a14="http://schemas.microsoft.com/office/drawing/2010/main" xmlns:p14="http://schemas.microsoft.com/office/powerpoint/2010/main" xmlns="" w="9525">
                     <a:solidFill>
                       <a:srgbClr val="000000"/>
                     </a:solidFill>
@@ -19170,7 +19169,7 @@
               </a:ln>
               <a:extLst>
                 <a:ext uri="{91240B29-F687-4f45-9708-019B960494DF}">
-                  <a14:hiddenLine xmlns="" xmlns:p14="http://schemas.microsoft.com/office/powerpoint/2010/main" xmlns:a14="http://schemas.microsoft.com/office/drawing/2010/main" w="9525">
+                  <a14:hiddenLine xmlns:a14="http://schemas.microsoft.com/office/drawing/2010/main" xmlns:p14="http://schemas.microsoft.com/office/powerpoint/2010/main" xmlns="" w="9525">
                     <a:solidFill>
                       <a:srgbClr val="000000"/>
                     </a:solidFill>
@@ -19244,7 +19243,7 @@
               </a:ln>
               <a:extLst>
                 <a:ext uri="{91240B29-F687-4f45-9708-019B960494DF}">
-                  <a14:hiddenLine xmlns="" xmlns:p14="http://schemas.microsoft.com/office/powerpoint/2010/main" xmlns:a14="http://schemas.microsoft.com/office/drawing/2010/main" w="9525">
+                  <a14:hiddenLine xmlns:a14="http://schemas.microsoft.com/office/drawing/2010/main" xmlns:p14="http://schemas.microsoft.com/office/powerpoint/2010/main" xmlns="" w="9525">
                     <a:solidFill>
                       <a:srgbClr val="000000"/>
                     </a:solidFill>
@@ -19346,7 +19345,7 @@
               </a:ln>
               <a:extLst>
                 <a:ext uri="{91240B29-F687-4f45-9708-019B960494DF}">
-                  <a14:hiddenLine xmlns="" xmlns:p14="http://schemas.microsoft.com/office/powerpoint/2010/main" xmlns:a14="http://schemas.microsoft.com/office/drawing/2010/main" w="9525">
+                  <a14:hiddenLine xmlns:a14="http://schemas.microsoft.com/office/drawing/2010/main" xmlns:p14="http://schemas.microsoft.com/office/powerpoint/2010/main" xmlns="" w="9525">
                     <a:solidFill>
                       <a:srgbClr val="000000"/>
                     </a:solidFill>
@@ -19448,7 +19447,7 @@
               </a:ln>
               <a:extLst>
                 <a:ext uri="{91240B29-F687-4f45-9708-019B960494DF}">
-                  <a14:hiddenLine xmlns="" xmlns:p14="http://schemas.microsoft.com/office/powerpoint/2010/main" xmlns:a14="http://schemas.microsoft.com/office/drawing/2010/main" w="9525">
+                  <a14:hiddenLine xmlns:a14="http://schemas.microsoft.com/office/drawing/2010/main" xmlns:p14="http://schemas.microsoft.com/office/powerpoint/2010/main" xmlns="" w="9525">
                     <a:solidFill>
                       <a:srgbClr val="000000"/>
                     </a:solidFill>
@@ -19522,7 +19521,7 @@
               </a:ln>
               <a:extLst>
                 <a:ext uri="{91240B29-F687-4f45-9708-019B960494DF}">
-                  <a14:hiddenLine xmlns="" xmlns:p14="http://schemas.microsoft.com/office/powerpoint/2010/main" xmlns:a14="http://schemas.microsoft.com/office/drawing/2010/main" w="9525">
+                  <a14:hiddenLine xmlns:a14="http://schemas.microsoft.com/office/drawing/2010/main" xmlns:p14="http://schemas.microsoft.com/office/powerpoint/2010/main" xmlns="" w="9525">
                     <a:solidFill>
                       <a:srgbClr val="000000"/>
                     </a:solidFill>
@@ -19644,7 +19643,7 @@
               </a:ln>
               <a:extLst>
                 <a:ext uri="{91240B29-F687-4f45-9708-019B960494DF}">
-                  <a14:hiddenLine xmlns="" xmlns:p14="http://schemas.microsoft.com/office/powerpoint/2010/main" xmlns:a14="http://schemas.microsoft.com/office/drawing/2010/main" w="9525">
+                  <a14:hiddenLine xmlns:a14="http://schemas.microsoft.com/office/drawing/2010/main" xmlns:p14="http://schemas.microsoft.com/office/powerpoint/2010/main" xmlns="" w="9525">
                     <a:solidFill>
                       <a:srgbClr val="000000"/>
                     </a:solidFill>
@@ -19752,7 +19751,7 @@
               </a:ln>
               <a:extLst>
                 <a:ext uri="{91240B29-F687-4f45-9708-019B960494DF}">
-                  <a14:hiddenLine xmlns="" xmlns:p14="http://schemas.microsoft.com/office/powerpoint/2010/main" xmlns:a14="http://schemas.microsoft.com/office/drawing/2010/main" w="9525">
+                  <a14:hiddenLine xmlns:a14="http://schemas.microsoft.com/office/drawing/2010/main" xmlns:p14="http://schemas.microsoft.com/office/powerpoint/2010/main" xmlns="" w="9525">
                     <a:solidFill>
                       <a:srgbClr val="000000"/>
                     </a:solidFill>
@@ -19826,7 +19825,7 @@
               </a:ln>
               <a:extLst>
                 <a:ext uri="{91240B29-F687-4f45-9708-019B960494DF}">
-                  <a14:hiddenLine xmlns="" xmlns:p14="http://schemas.microsoft.com/office/powerpoint/2010/main" xmlns:a14="http://schemas.microsoft.com/office/drawing/2010/main" w="9525">
+                  <a14:hiddenLine xmlns:a14="http://schemas.microsoft.com/office/drawing/2010/main" xmlns:p14="http://schemas.microsoft.com/office/powerpoint/2010/main" xmlns="" w="9525">
                     <a:solidFill>
                       <a:srgbClr val="000000"/>
                     </a:solidFill>
@@ -19900,7 +19899,7 @@
               </a:ln>
               <a:extLst>
                 <a:ext uri="{91240B29-F687-4f45-9708-019B960494DF}">
-                  <a14:hiddenLine xmlns="" xmlns:p14="http://schemas.microsoft.com/office/powerpoint/2010/main" xmlns:a14="http://schemas.microsoft.com/office/drawing/2010/main" w="9525">
+                  <a14:hiddenLine xmlns:a14="http://schemas.microsoft.com/office/drawing/2010/main" xmlns:p14="http://schemas.microsoft.com/office/powerpoint/2010/main" xmlns="" w="9525">
                     <a:solidFill>
                       <a:srgbClr val="000000"/>
                     </a:solidFill>
@@ -20002,7 +20001,7 @@
               </a:ln>
               <a:extLst>
                 <a:ext uri="{91240B29-F687-4f45-9708-019B960494DF}">
-                  <a14:hiddenLine xmlns="" xmlns:p14="http://schemas.microsoft.com/office/powerpoint/2010/main" xmlns:a14="http://schemas.microsoft.com/office/drawing/2010/main" w="9525">
+                  <a14:hiddenLine xmlns:a14="http://schemas.microsoft.com/office/drawing/2010/main" xmlns:p14="http://schemas.microsoft.com/office/powerpoint/2010/main" xmlns="" w="9525">
                     <a:solidFill>
                       <a:srgbClr val="000000"/>
                     </a:solidFill>
@@ -20048,7 +20047,7 @@
               </a:ln>
               <a:extLst>
                 <a:ext uri="{91240B29-F687-4f45-9708-019B960494DF}">
-                  <a14:hiddenLine xmlns="" xmlns:p14="http://schemas.microsoft.com/office/powerpoint/2010/main" xmlns:a14="http://schemas.microsoft.com/office/drawing/2010/main" w="9525">
+                  <a14:hiddenLine xmlns:a14="http://schemas.microsoft.com/office/drawing/2010/main" xmlns:p14="http://schemas.microsoft.com/office/powerpoint/2010/main" xmlns="" w="9525">
                     <a:solidFill>
                       <a:srgbClr val="000000"/>
                     </a:solidFill>
@@ -20125,7 +20124,7 @@
               </a:ln>
               <a:extLst>
                 <a:ext uri="{91240B29-F687-4f45-9708-019B960494DF}">
-                  <a14:hiddenLine xmlns="" xmlns:p14="http://schemas.microsoft.com/office/powerpoint/2010/main" xmlns:a14="http://schemas.microsoft.com/office/drawing/2010/main" w="9525">
+                  <a14:hiddenLine xmlns:a14="http://schemas.microsoft.com/office/drawing/2010/main" xmlns:p14="http://schemas.microsoft.com/office/powerpoint/2010/main" xmlns="" w="9525">
                     <a:solidFill>
                       <a:srgbClr val="000000"/>
                     </a:solidFill>
@@ -20227,7 +20226,7 @@
               </a:ln>
               <a:extLst>
                 <a:ext uri="{91240B29-F687-4f45-9708-019B960494DF}">
-                  <a14:hiddenLine xmlns="" xmlns:p14="http://schemas.microsoft.com/office/powerpoint/2010/main" xmlns:a14="http://schemas.microsoft.com/office/drawing/2010/main" w="9525">
+                  <a14:hiddenLine xmlns:a14="http://schemas.microsoft.com/office/drawing/2010/main" xmlns:p14="http://schemas.microsoft.com/office/powerpoint/2010/main" xmlns="" w="9525">
                     <a:solidFill>
                       <a:srgbClr val="000000"/>
                     </a:solidFill>
@@ -20301,7 +20300,7 @@
               </a:ln>
               <a:extLst>
                 <a:ext uri="{91240B29-F687-4f45-9708-019B960494DF}">
-                  <a14:hiddenLine xmlns="" xmlns:p14="http://schemas.microsoft.com/office/powerpoint/2010/main" xmlns:a14="http://schemas.microsoft.com/office/drawing/2010/main" w="9525">
+                  <a14:hiddenLine xmlns:a14="http://schemas.microsoft.com/office/drawing/2010/main" xmlns:p14="http://schemas.microsoft.com/office/powerpoint/2010/main" xmlns="" w="9525">
                     <a:solidFill>
                       <a:srgbClr val="000000"/>
                     </a:solidFill>
@@ -20403,7 +20402,7 @@
               </a:ln>
               <a:extLst>
                 <a:ext uri="{91240B29-F687-4f45-9708-019B960494DF}">
-                  <a14:hiddenLine xmlns="" xmlns:p14="http://schemas.microsoft.com/office/powerpoint/2010/main" xmlns:a14="http://schemas.microsoft.com/office/drawing/2010/main" w="9525">
+                  <a14:hiddenLine xmlns:a14="http://schemas.microsoft.com/office/drawing/2010/main" xmlns:p14="http://schemas.microsoft.com/office/powerpoint/2010/main" xmlns="" w="9525">
                     <a:solidFill>
                       <a:srgbClr val="000000"/>
                     </a:solidFill>
@@ -20480,7 +20479,7 @@
               </a:ln>
               <a:extLst>
                 <a:ext uri="{91240B29-F687-4f45-9708-019B960494DF}">
-                  <a14:hiddenLine xmlns="" xmlns:p14="http://schemas.microsoft.com/office/powerpoint/2010/main" xmlns:a14="http://schemas.microsoft.com/office/drawing/2010/main" w="9525">
+                  <a14:hiddenLine xmlns:a14="http://schemas.microsoft.com/office/drawing/2010/main" xmlns:p14="http://schemas.microsoft.com/office/powerpoint/2010/main" xmlns="" w="9525">
                     <a:solidFill>
                       <a:srgbClr val="000000"/>
                     </a:solidFill>
@@ -20554,7 +20553,7 @@
               </a:ln>
               <a:extLst>
                 <a:ext uri="{91240B29-F687-4f45-9708-019B960494DF}">
-                  <a14:hiddenLine xmlns="" xmlns:p14="http://schemas.microsoft.com/office/powerpoint/2010/main" xmlns:a14="http://schemas.microsoft.com/office/drawing/2010/main" w="9525">
+                  <a14:hiddenLine xmlns:a14="http://schemas.microsoft.com/office/drawing/2010/main" xmlns:p14="http://schemas.microsoft.com/office/powerpoint/2010/main" xmlns="" w="9525">
                     <a:solidFill>
                       <a:srgbClr val="000000"/>
                     </a:solidFill>
@@ -20656,7 +20655,7 @@
               </a:ln>
               <a:extLst>
                 <a:ext uri="{91240B29-F687-4f45-9708-019B960494DF}">
-                  <a14:hiddenLine xmlns="" xmlns:p14="http://schemas.microsoft.com/office/powerpoint/2010/main" xmlns:a14="http://schemas.microsoft.com/office/drawing/2010/main" w="9525">
+                  <a14:hiddenLine xmlns:a14="http://schemas.microsoft.com/office/drawing/2010/main" xmlns:p14="http://schemas.microsoft.com/office/powerpoint/2010/main" xmlns="" w="9525">
                     <a:solidFill>
                       <a:srgbClr val="000000"/>
                     </a:solidFill>
@@ -20758,7 +20757,7 @@
               </a:ln>
               <a:extLst>
                 <a:ext uri="{91240B29-F687-4f45-9708-019B960494DF}">
-                  <a14:hiddenLine xmlns="" xmlns:p14="http://schemas.microsoft.com/office/powerpoint/2010/main" xmlns:a14="http://schemas.microsoft.com/office/drawing/2010/main" w="9525">
+                  <a14:hiddenLine xmlns:a14="http://schemas.microsoft.com/office/drawing/2010/main" xmlns:p14="http://schemas.microsoft.com/office/powerpoint/2010/main" xmlns="" w="9525">
                     <a:solidFill>
                       <a:srgbClr val="000000"/>
                     </a:solidFill>
@@ -20835,7 +20834,7 @@
               </a:ln>
               <a:extLst>
                 <a:ext uri="{91240B29-F687-4f45-9708-019B960494DF}">
-                  <a14:hiddenLine xmlns="" xmlns:p14="http://schemas.microsoft.com/office/powerpoint/2010/main" xmlns:a14="http://schemas.microsoft.com/office/drawing/2010/main" w="9525">
+                  <a14:hiddenLine xmlns:a14="http://schemas.microsoft.com/office/drawing/2010/main" xmlns:p14="http://schemas.microsoft.com/office/powerpoint/2010/main" xmlns="" w="9525">
                     <a:solidFill>
                       <a:srgbClr val="000000"/>
                     </a:solidFill>
@@ -20967,7 +20966,7 @@
               </a:ln>
               <a:extLst>
                 <a:ext uri="{91240B29-F687-4f45-9708-019B960494DF}">
-                  <a14:hiddenLine xmlns="" xmlns:p14="http://schemas.microsoft.com/office/powerpoint/2010/main" xmlns:a14="http://schemas.microsoft.com/office/drawing/2010/main" w="9525">
+                  <a14:hiddenLine xmlns:a14="http://schemas.microsoft.com/office/drawing/2010/main" xmlns:p14="http://schemas.microsoft.com/office/powerpoint/2010/main" xmlns="" w="9525">
                     <a:solidFill>
                       <a:srgbClr val="000000"/>
                     </a:solidFill>
@@ -21089,7 +21088,7 @@
               </a:ln>
               <a:extLst>
                 <a:ext uri="{91240B29-F687-4f45-9708-019B960494DF}">
-                  <a14:hiddenLine xmlns="" xmlns:p14="http://schemas.microsoft.com/office/powerpoint/2010/main" xmlns:a14="http://schemas.microsoft.com/office/drawing/2010/main" w="9525">
+                  <a14:hiddenLine xmlns:a14="http://schemas.microsoft.com/office/drawing/2010/main" xmlns:p14="http://schemas.microsoft.com/office/powerpoint/2010/main" xmlns="" w="9525">
                     <a:solidFill>
                       <a:srgbClr val="000000"/>
                     </a:solidFill>
@@ -21216,7 +21215,7 @@
               </a:ln>
               <a:extLst>
                 <a:ext uri="{91240B29-F687-4f45-9708-019B960494DF}">
-                  <a14:hiddenLine xmlns="" xmlns:p14="http://schemas.microsoft.com/office/powerpoint/2010/main" xmlns:a14="http://schemas.microsoft.com/office/drawing/2010/main" w="9525">
+                  <a14:hiddenLine xmlns:a14="http://schemas.microsoft.com/office/drawing/2010/main" xmlns:p14="http://schemas.microsoft.com/office/powerpoint/2010/main" xmlns="" w="9525">
                     <a:solidFill>
                       <a:srgbClr val="000000"/>
                     </a:solidFill>
@@ -21318,7 +21317,7 @@
               </a:ln>
               <a:extLst>
                 <a:ext uri="{91240B29-F687-4f45-9708-019B960494DF}">
-                  <a14:hiddenLine xmlns="" xmlns:p14="http://schemas.microsoft.com/office/powerpoint/2010/main" xmlns:a14="http://schemas.microsoft.com/office/drawing/2010/main" w="9525">
+                  <a14:hiddenLine xmlns:a14="http://schemas.microsoft.com/office/drawing/2010/main" xmlns:p14="http://schemas.microsoft.com/office/powerpoint/2010/main" xmlns="" w="9525">
                     <a:solidFill>
                       <a:srgbClr val="000000"/>
                     </a:solidFill>
@@ -21395,7 +21394,7 @@
               </a:ln>
               <a:extLst>
                 <a:ext uri="{91240B29-F687-4f45-9708-019B960494DF}">
-                  <a14:hiddenLine xmlns="" xmlns:p14="http://schemas.microsoft.com/office/powerpoint/2010/main" xmlns:a14="http://schemas.microsoft.com/office/drawing/2010/main" w="9525">
+                  <a14:hiddenLine xmlns:a14="http://schemas.microsoft.com/office/drawing/2010/main" xmlns:p14="http://schemas.microsoft.com/office/powerpoint/2010/main" xmlns="" w="9525">
                     <a:solidFill>
                       <a:srgbClr val="000000"/>
                     </a:solidFill>
@@ -21497,7 +21496,7 @@
               </a:ln>
               <a:extLst>
                 <a:ext uri="{91240B29-F687-4f45-9708-019B960494DF}">
-                  <a14:hiddenLine xmlns="" xmlns:p14="http://schemas.microsoft.com/office/powerpoint/2010/main" xmlns:a14="http://schemas.microsoft.com/office/drawing/2010/main" w="9525">
+                  <a14:hiddenLine xmlns:a14="http://schemas.microsoft.com/office/drawing/2010/main" xmlns:p14="http://schemas.microsoft.com/office/powerpoint/2010/main" xmlns="" w="9525">
                     <a:solidFill>
                       <a:srgbClr val="000000"/>
                     </a:solidFill>
@@ -21577,7 +21576,7 @@
               </a:ln>
               <a:extLst>
                 <a:ext uri="{91240B29-F687-4f45-9708-019B960494DF}">
-                  <a14:hiddenLine xmlns="" xmlns:p14="http://schemas.microsoft.com/office/powerpoint/2010/main" xmlns:a14="http://schemas.microsoft.com/office/drawing/2010/main" w="9525">
+                  <a14:hiddenLine xmlns:a14="http://schemas.microsoft.com/office/drawing/2010/main" xmlns:p14="http://schemas.microsoft.com/office/powerpoint/2010/main" xmlns="" w="9525">
                     <a:solidFill>
                       <a:srgbClr val="000000"/>
                     </a:solidFill>
@@ -21679,7 +21678,7 @@
               </a:ln>
               <a:extLst>
                 <a:ext uri="{91240B29-F687-4f45-9708-019B960494DF}">
-                  <a14:hiddenLine xmlns="" xmlns:p14="http://schemas.microsoft.com/office/powerpoint/2010/main" xmlns:a14="http://schemas.microsoft.com/office/drawing/2010/main" w="9525">
+                  <a14:hiddenLine xmlns:a14="http://schemas.microsoft.com/office/drawing/2010/main" xmlns:p14="http://schemas.microsoft.com/office/powerpoint/2010/main" xmlns="" w="9525">
                     <a:solidFill>
                       <a:srgbClr val="000000"/>
                     </a:solidFill>
@@ -21759,7 +21758,7 @@
               </a:ln>
               <a:extLst>
                 <a:ext uri="{91240B29-F687-4f45-9708-019B960494DF}">
-                  <a14:hiddenLine xmlns="" xmlns:p14="http://schemas.microsoft.com/office/powerpoint/2010/main" xmlns:a14="http://schemas.microsoft.com/office/drawing/2010/main" w="9525">
+                  <a14:hiddenLine xmlns:a14="http://schemas.microsoft.com/office/drawing/2010/main" xmlns:p14="http://schemas.microsoft.com/office/powerpoint/2010/main" xmlns="" w="9525">
                     <a:solidFill>
                       <a:srgbClr val="000000"/>
                     </a:solidFill>
@@ -21861,7 +21860,7 @@
               </a:ln>
               <a:extLst>
                 <a:ext uri="{91240B29-F687-4f45-9708-019B960494DF}">
-                  <a14:hiddenLine xmlns="" xmlns:p14="http://schemas.microsoft.com/office/powerpoint/2010/main" xmlns:a14="http://schemas.microsoft.com/office/drawing/2010/main" w="9525">
+                  <a14:hiddenLine xmlns:a14="http://schemas.microsoft.com/office/drawing/2010/main" xmlns:p14="http://schemas.microsoft.com/office/powerpoint/2010/main" xmlns="" w="9525">
                     <a:solidFill>
                       <a:srgbClr val="000000"/>
                     </a:solidFill>
@@ -21907,7 +21906,7 @@
               </a:ln>
               <a:extLst>
                 <a:ext uri="{91240B29-F687-4f45-9708-019B960494DF}">
-                  <a14:hiddenLine xmlns="" xmlns:p14="http://schemas.microsoft.com/office/powerpoint/2010/main" xmlns:a14="http://schemas.microsoft.com/office/drawing/2010/main" w="9525">
+                  <a14:hiddenLine xmlns:a14="http://schemas.microsoft.com/office/drawing/2010/main" xmlns:p14="http://schemas.microsoft.com/office/powerpoint/2010/main" xmlns="" w="9525">
                     <a:solidFill>
                       <a:srgbClr val="000000"/>
                     </a:solidFill>
@@ -22411,7 +22410,7 @@
           <a:noFill/>
           <a:extLst>
             <a:ext uri="{909E8E84-426E-40dd-AFC4-6F175D3DCCD1}">
-              <a14:hiddenFill xmlns="" xmlns:p14="http://schemas.microsoft.com/office/powerpoint/2010/main" xmlns:a14="http://schemas.microsoft.com/office/drawing/2010/main">
+              <a14:hiddenFill xmlns:a14="http://schemas.microsoft.com/office/drawing/2010/main" xmlns:p14="http://schemas.microsoft.com/office/powerpoint/2010/main" xmlns="">
                 <a:solidFill>
                   <a:srgbClr val="FFFFFF"/>
                 </a:solidFill>
@@ -22564,7 +22563,7 @@
             </a:ln>
             <a:extLst>
               <a:ext uri="{91240B29-F687-4f45-9708-019B960494DF}">
-                <a14:hiddenLine xmlns="" xmlns:p14="http://schemas.microsoft.com/office/powerpoint/2010/main" xmlns:a14="http://schemas.microsoft.com/office/drawing/2010/main" w="9525">
+                <a14:hiddenLine xmlns:a14="http://schemas.microsoft.com/office/drawing/2010/main" xmlns:p14="http://schemas.microsoft.com/office/powerpoint/2010/main" xmlns="" w="9525">
                   <a:solidFill>
                     <a:srgbClr val="000000"/>
                   </a:solidFill>
@@ -22666,7 +22665,7 @@
             </a:ln>
             <a:extLst>
               <a:ext uri="{91240B29-F687-4f45-9708-019B960494DF}">
-                <a14:hiddenLine xmlns="" xmlns:p14="http://schemas.microsoft.com/office/powerpoint/2010/main" xmlns:a14="http://schemas.microsoft.com/office/drawing/2010/main" w="9525">
+                <a14:hiddenLine xmlns:a14="http://schemas.microsoft.com/office/drawing/2010/main" xmlns:p14="http://schemas.microsoft.com/office/powerpoint/2010/main" xmlns="" w="9525">
                   <a:solidFill>
                     <a:srgbClr val="000000"/>
                   </a:solidFill>
@@ -22768,7 +22767,7 @@
             </a:ln>
             <a:extLst>
               <a:ext uri="{91240B29-F687-4f45-9708-019B960494DF}">
-                <a14:hiddenLine xmlns="" xmlns:p14="http://schemas.microsoft.com/office/powerpoint/2010/main" xmlns:a14="http://schemas.microsoft.com/office/drawing/2010/main" w="9525">
+                <a14:hiddenLine xmlns:a14="http://schemas.microsoft.com/office/drawing/2010/main" xmlns:p14="http://schemas.microsoft.com/office/powerpoint/2010/main" xmlns="" w="9525">
                   <a:solidFill>
                     <a:srgbClr val="000000"/>
                   </a:solidFill>
@@ -22842,7 +22841,7 @@
             </a:ln>
             <a:extLst>
               <a:ext uri="{91240B29-F687-4f45-9708-019B960494DF}">
-                <a14:hiddenLine xmlns="" xmlns:p14="http://schemas.microsoft.com/office/powerpoint/2010/main" xmlns:a14="http://schemas.microsoft.com/office/drawing/2010/main" w="9525">
+                <a14:hiddenLine xmlns:a14="http://schemas.microsoft.com/office/drawing/2010/main" xmlns:p14="http://schemas.microsoft.com/office/powerpoint/2010/main" xmlns="" w="9525">
                   <a:solidFill>
                     <a:srgbClr val="000000"/>
                   </a:solidFill>
@@ -22944,7 +22943,7 @@
             </a:ln>
             <a:extLst>
               <a:ext uri="{91240B29-F687-4f45-9708-019B960494DF}">
-                <a14:hiddenLine xmlns="" xmlns:p14="http://schemas.microsoft.com/office/powerpoint/2010/main" xmlns:a14="http://schemas.microsoft.com/office/drawing/2010/main" w="9525">
+                <a14:hiddenLine xmlns:a14="http://schemas.microsoft.com/office/drawing/2010/main" xmlns:p14="http://schemas.microsoft.com/office/powerpoint/2010/main" xmlns="" w="9525">
                   <a:solidFill>
                     <a:srgbClr val="000000"/>
                   </a:solidFill>
@@ -23018,7 +23017,7 @@
             </a:ln>
             <a:extLst>
               <a:ext uri="{91240B29-F687-4f45-9708-019B960494DF}">
-                <a14:hiddenLine xmlns="" xmlns:p14="http://schemas.microsoft.com/office/powerpoint/2010/main" xmlns:a14="http://schemas.microsoft.com/office/drawing/2010/main" w="9525">
+                <a14:hiddenLine xmlns:a14="http://schemas.microsoft.com/office/drawing/2010/main" xmlns:p14="http://schemas.microsoft.com/office/powerpoint/2010/main" xmlns="" w="9525">
                   <a:solidFill>
                     <a:srgbClr val="000000"/>
                   </a:solidFill>
@@ -23092,7 +23091,7 @@
             </a:ln>
             <a:extLst>
               <a:ext uri="{91240B29-F687-4f45-9708-019B960494DF}">
-                <a14:hiddenLine xmlns="" xmlns:p14="http://schemas.microsoft.com/office/powerpoint/2010/main" xmlns:a14="http://schemas.microsoft.com/office/drawing/2010/main" w="9525">
+                <a14:hiddenLine xmlns:a14="http://schemas.microsoft.com/office/drawing/2010/main" xmlns:p14="http://schemas.microsoft.com/office/powerpoint/2010/main" xmlns="" w="9525">
                   <a:solidFill>
                     <a:srgbClr val="000000"/>
                   </a:solidFill>
@@ -23194,7 +23193,7 @@
             </a:ln>
             <a:extLst>
               <a:ext uri="{91240B29-F687-4f45-9708-019B960494DF}">
-                <a14:hiddenLine xmlns="" xmlns:p14="http://schemas.microsoft.com/office/powerpoint/2010/main" xmlns:a14="http://schemas.microsoft.com/office/drawing/2010/main" w="9525">
+                <a14:hiddenLine xmlns:a14="http://schemas.microsoft.com/office/drawing/2010/main" xmlns:p14="http://schemas.microsoft.com/office/powerpoint/2010/main" xmlns="" w="9525">
                   <a:solidFill>
                     <a:srgbClr val="000000"/>
                   </a:solidFill>
@@ -23296,7 +23295,7 @@
             </a:ln>
             <a:extLst>
               <a:ext uri="{91240B29-F687-4f45-9708-019B960494DF}">
-                <a14:hiddenLine xmlns="" xmlns:p14="http://schemas.microsoft.com/office/powerpoint/2010/main" xmlns:a14="http://schemas.microsoft.com/office/drawing/2010/main" w="9525">
+                <a14:hiddenLine xmlns:a14="http://schemas.microsoft.com/office/drawing/2010/main" xmlns:p14="http://schemas.microsoft.com/office/powerpoint/2010/main" xmlns="" w="9525">
                   <a:solidFill>
                     <a:srgbClr val="000000"/>
                   </a:solidFill>
@@ -23370,7 +23369,7 @@
             </a:ln>
             <a:extLst>
               <a:ext uri="{91240B29-F687-4f45-9708-019B960494DF}">
-                <a14:hiddenLine xmlns="" xmlns:p14="http://schemas.microsoft.com/office/powerpoint/2010/main" xmlns:a14="http://schemas.microsoft.com/office/drawing/2010/main" w="9525">
+                <a14:hiddenLine xmlns:a14="http://schemas.microsoft.com/office/drawing/2010/main" xmlns:p14="http://schemas.microsoft.com/office/powerpoint/2010/main" xmlns="" w="9525">
                   <a:solidFill>
                     <a:srgbClr val="000000"/>
                   </a:solidFill>
@@ -23492,7 +23491,7 @@
             </a:ln>
             <a:extLst>
               <a:ext uri="{91240B29-F687-4f45-9708-019B960494DF}">
-                <a14:hiddenLine xmlns="" xmlns:p14="http://schemas.microsoft.com/office/powerpoint/2010/main" xmlns:a14="http://schemas.microsoft.com/office/drawing/2010/main" w="9525">
+                <a14:hiddenLine xmlns:a14="http://schemas.microsoft.com/office/drawing/2010/main" xmlns:p14="http://schemas.microsoft.com/office/powerpoint/2010/main" xmlns="" w="9525">
                   <a:solidFill>
                     <a:srgbClr val="000000"/>
                   </a:solidFill>
@@ -23600,7 +23599,7 @@
             </a:ln>
             <a:extLst>
               <a:ext uri="{91240B29-F687-4f45-9708-019B960494DF}">
-                <a14:hiddenLine xmlns="" xmlns:p14="http://schemas.microsoft.com/office/powerpoint/2010/main" xmlns:a14="http://schemas.microsoft.com/office/drawing/2010/main" w="9525">
+                <a14:hiddenLine xmlns:a14="http://schemas.microsoft.com/office/drawing/2010/main" xmlns:p14="http://schemas.microsoft.com/office/powerpoint/2010/main" xmlns="" w="9525">
                   <a:solidFill>
                     <a:srgbClr val="000000"/>
                   </a:solidFill>
@@ -23674,7 +23673,7 @@
             </a:ln>
             <a:extLst>
               <a:ext uri="{91240B29-F687-4f45-9708-019B960494DF}">
-                <a14:hiddenLine xmlns="" xmlns:p14="http://schemas.microsoft.com/office/powerpoint/2010/main" xmlns:a14="http://schemas.microsoft.com/office/drawing/2010/main" w="9525">
+                <a14:hiddenLine xmlns:a14="http://schemas.microsoft.com/office/drawing/2010/main" xmlns:p14="http://schemas.microsoft.com/office/powerpoint/2010/main" xmlns="" w="9525">
                   <a:solidFill>
                     <a:srgbClr val="000000"/>
                   </a:solidFill>
@@ -23748,7 +23747,7 @@
             </a:ln>
             <a:extLst>
               <a:ext uri="{91240B29-F687-4f45-9708-019B960494DF}">
-                <a14:hiddenLine xmlns="" xmlns:p14="http://schemas.microsoft.com/office/powerpoint/2010/main" xmlns:a14="http://schemas.microsoft.com/office/drawing/2010/main" w="9525">
+                <a14:hiddenLine xmlns:a14="http://schemas.microsoft.com/office/drawing/2010/main" xmlns:p14="http://schemas.microsoft.com/office/powerpoint/2010/main" xmlns="" w="9525">
                   <a:solidFill>
                     <a:srgbClr val="000000"/>
                   </a:solidFill>
@@ -23850,7 +23849,7 @@
             </a:ln>
             <a:extLst>
               <a:ext uri="{91240B29-F687-4f45-9708-019B960494DF}">
-                <a14:hiddenLine xmlns="" xmlns:p14="http://schemas.microsoft.com/office/powerpoint/2010/main" xmlns:a14="http://schemas.microsoft.com/office/drawing/2010/main" w="9525">
+                <a14:hiddenLine xmlns:a14="http://schemas.microsoft.com/office/drawing/2010/main" xmlns:p14="http://schemas.microsoft.com/office/powerpoint/2010/main" xmlns="" w="9525">
                   <a:solidFill>
                     <a:srgbClr val="000000"/>
                   </a:solidFill>
@@ -23896,7 +23895,7 @@
             </a:ln>
             <a:extLst>
               <a:ext uri="{91240B29-F687-4f45-9708-019B960494DF}">
-                <a14:hiddenLine xmlns="" xmlns:p14="http://schemas.microsoft.com/office/powerpoint/2010/main" xmlns:a14="http://schemas.microsoft.com/office/drawing/2010/main" w="9525">
+                <a14:hiddenLine xmlns:a14="http://schemas.microsoft.com/office/drawing/2010/main" xmlns:p14="http://schemas.microsoft.com/office/powerpoint/2010/main" xmlns="" w="9525">
                   <a:solidFill>
                     <a:srgbClr val="000000"/>
                   </a:solidFill>
@@ -23973,7 +23972,7 @@
             </a:ln>
             <a:extLst>
               <a:ext uri="{91240B29-F687-4f45-9708-019B960494DF}">
-                <a14:hiddenLine xmlns="" xmlns:p14="http://schemas.microsoft.com/office/powerpoint/2010/main" xmlns:a14="http://schemas.microsoft.com/office/drawing/2010/main" w="9525">
+                <a14:hiddenLine xmlns:a14="http://schemas.microsoft.com/office/drawing/2010/main" xmlns:p14="http://schemas.microsoft.com/office/powerpoint/2010/main" xmlns="" w="9525">
                   <a:solidFill>
                     <a:srgbClr val="000000"/>
                   </a:solidFill>
@@ -24075,7 +24074,7 @@
             </a:ln>
             <a:extLst>
               <a:ext uri="{91240B29-F687-4f45-9708-019B960494DF}">
-                <a14:hiddenLine xmlns="" xmlns:p14="http://schemas.microsoft.com/office/powerpoint/2010/main" xmlns:a14="http://schemas.microsoft.com/office/drawing/2010/main" w="9525">
+                <a14:hiddenLine xmlns:a14="http://schemas.microsoft.com/office/drawing/2010/main" xmlns:p14="http://schemas.microsoft.com/office/powerpoint/2010/main" xmlns="" w="9525">
                   <a:solidFill>
                     <a:srgbClr val="000000"/>
                   </a:solidFill>
@@ -24149,7 +24148,7 @@
             </a:ln>
             <a:extLst>
               <a:ext uri="{91240B29-F687-4f45-9708-019B960494DF}">
-                <a14:hiddenLine xmlns="" xmlns:p14="http://schemas.microsoft.com/office/powerpoint/2010/main" xmlns:a14="http://schemas.microsoft.com/office/drawing/2010/main" w="9525">
+                <a14:hiddenLine xmlns:a14="http://schemas.microsoft.com/office/drawing/2010/main" xmlns:p14="http://schemas.microsoft.com/office/powerpoint/2010/main" xmlns="" w="9525">
                   <a:solidFill>
                     <a:srgbClr val="000000"/>
                   </a:solidFill>
@@ -24251,7 +24250,7 @@
             </a:ln>
             <a:extLst>
               <a:ext uri="{91240B29-F687-4f45-9708-019B960494DF}">
-                <a14:hiddenLine xmlns="" xmlns:p14="http://schemas.microsoft.com/office/powerpoint/2010/main" xmlns:a14="http://schemas.microsoft.com/office/drawing/2010/main" w="9525">
+                <a14:hiddenLine xmlns:a14="http://schemas.microsoft.com/office/drawing/2010/main" xmlns:p14="http://schemas.microsoft.com/office/powerpoint/2010/main" xmlns="" w="9525">
                   <a:solidFill>
                     <a:srgbClr val="000000"/>
                   </a:solidFill>
@@ -24328,7 +24327,7 @@
             </a:ln>
             <a:extLst>
               <a:ext uri="{91240B29-F687-4f45-9708-019B960494DF}">
-                <a14:hiddenLine xmlns="" xmlns:p14="http://schemas.microsoft.com/office/powerpoint/2010/main" xmlns:a14="http://schemas.microsoft.com/office/drawing/2010/main" w="9525">
+                <a14:hiddenLine xmlns:a14="http://schemas.microsoft.com/office/drawing/2010/main" xmlns:p14="http://schemas.microsoft.com/office/powerpoint/2010/main" xmlns="" w="9525">
                   <a:solidFill>
                     <a:srgbClr val="000000"/>
                   </a:solidFill>
@@ -24402,7 +24401,7 @@
             </a:ln>
             <a:extLst>
               <a:ext uri="{91240B29-F687-4f45-9708-019B960494DF}">
-                <a14:hiddenLine xmlns="" xmlns:p14="http://schemas.microsoft.com/office/powerpoint/2010/main" xmlns:a14="http://schemas.microsoft.com/office/drawing/2010/main" w="9525">
+                <a14:hiddenLine xmlns:a14="http://schemas.microsoft.com/office/drawing/2010/main" xmlns:p14="http://schemas.microsoft.com/office/powerpoint/2010/main" xmlns="" w="9525">
                   <a:solidFill>
                     <a:srgbClr val="000000"/>
                   </a:solidFill>
@@ -24504,7 +24503,7 @@
             </a:ln>
             <a:extLst>
               <a:ext uri="{91240B29-F687-4f45-9708-019B960494DF}">
-                <a14:hiddenLine xmlns="" xmlns:p14="http://schemas.microsoft.com/office/powerpoint/2010/main" xmlns:a14="http://schemas.microsoft.com/office/drawing/2010/main" w="9525">
+                <a14:hiddenLine xmlns:a14="http://schemas.microsoft.com/office/drawing/2010/main" xmlns:p14="http://schemas.microsoft.com/office/powerpoint/2010/main" xmlns="" w="9525">
                   <a:solidFill>
                     <a:srgbClr val="000000"/>
                   </a:solidFill>
@@ -24606,7 +24605,7 @@
             </a:ln>
             <a:extLst>
               <a:ext uri="{91240B29-F687-4f45-9708-019B960494DF}">
-                <a14:hiddenLine xmlns="" xmlns:p14="http://schemas.microsoft.com/office/powerpoint/2010/main" xmlns:a14="http://schemas.microsoft.com/office/drawing/2010/main" w="9525">
+                <a14:hiddenLine xmlns:a14="http://schemas.microsoft.com/office/drawing/2010/main" xmlns:p14="http://schemas.microsoft.com/office/powerpoint/2010/main" xmlns="" w="9525">
                   <a:solidFill>
                     <a:srgbClr val="000000"/>
                   </a:solidFill>
@@ -24683,7 +24682,7 @@
             </a:ln>
             <a:extLst>
               <a:ext uri="{91240B29-F687-4f45-9708-019B960494DF}">
-                <a14:hiddenLine xmlns="" xmlns:p14="http://schemas.microsoft.com/office/powerpoint/2010/main" xmlns:a14="http://schemas.microsoft.com/office/drawing/2010/main" w="9525">
+                <a14:hiddenLine xmlns:a14="http://schemas.microsoft.com/office/drawing/2010/main" xmlns:p14="http://schemas.microsoft.com/office/powerpoint/2010/main" xmlns="" w="9525">
                   <a:solidFill>
                     <a:srgbClr val="000000"/>
                   </a:solidFill>
@@ -24815,7 +24814,7 @@
             </a:ln>
             <a:extLst>
               <a:ext uri="{91240B29-F687-4f45-9708-019B960494DF}">
-                <a14:hiddenLine xmlns="" xmlns:p14="http://schemas.microsoft.com/office/powerpoint/2010/main" xmlns:a14="http://schemas.microsoft.com/office/drawing/2010/main" w="9525">
+                <a14:hiddenLine xmlns:a14="http://schemas.microsoft.com/office/drawing/2010/main" xmlns:p14="http://schemas.microsoft.com/office/powerpoint/2010/main" xmlns="" w="9525">
                   <a:solidFill>
                     <a:srgbClr val="000000"/>
                   </a:solidFill>

</xml_diff>